<commit_message>
add: add all existed code (#1)
</commit_message>
<xml_diff>
--- a/Homeworks/Homework_1/H1_Proejct/docs/Images.pptx
+++ b/Homeworks/Homework_1/H1_Proejct/docs/Images.pptx
@@ -3344,10 +3344,10 @@
       </p:grpSpPr>
       <p:grpSp>
         <p:nvGrpSpPr>
-          <p:cNvPr id="63" name="Group 62">
+          <p:cNvPr id="158" name="Group 157">
             <a:extLst>
               <a:ext uri="{FF2B5EF4-FFF2-40B4-BE49-F238E27FC236}">
-                <a16:creationId xmlns:a16="http://schemas.microsoft.com/office/drawing/2014/main" id="{839F9037-A34E-484C-B7FB-919C5E00B101}"/>
+                <a16:creationId xmlns:a16="http://schemas.microsoft.com/office/drawing/2014/main" id="{731A4D0C-81B9-8147-A380-CBA611AD0E4C}"/>
               </a:ext>
             </a:extLst>
           </p:cNvPr>
@@ -3356,10 +3356,10 @@
         </p:nvGrpSpPr>
         <p:grpSpPr>
           <a:xfrm>
-            <a:off x="2591953" y="1194953"/>
-            <a:ext cx="1319645" cy="4047713"/>
-            <a:chOff x="1392381" y="1194953"/>
-            <a:chExt cx="1319645" cy="4047713"/>
+            <a:off x="2263916" y="1194953"/>
+            <a:ext cx="7387088" cy="4047713"/>
+            <a:chOff x="2263916" y="1194953"/>
+            <a:chExt cx="7387088" cy="4047713"/>
           </a:xfrm>
         </p:grpSpPr>
         <p:sp>
@@ -3376,7 +3376,7 @@
           </p:nvSpPr>
           <p:spPr>
             <a:xfrm>
-              <a:off x="1392381" y="4873334"/>
+              <a:off x="2591953" y="4873334"/>
               <a:ext cx="1319645" cy="369332"/>
             </a:xfrm>
             <a:prstGeom prst="rect">
@@ -3392,7 +3392,7 @@
             <a:p>
               <a:pPr algn="ctr"/>
               <a:r>
-                <a:rPr lang="en-CN" dirty="0">
+                <a:rPr lang="en-CN" b="1" dirty="0">
                   <a:latin typeface="Times New Roman" panose="02020603050405020304" pitchFamily="18" charset="0"/>
                   <a:cs typeface="Times New Roman" panose="02020603050405020304" pitchFamily="18" charset="0"/>
                 </a:rPr>
@@ -3415,7 +3415,7 @@
           </p:nvCxnSpPr>
           <p:spPr>
             <a:xfrm>
-              <a:off x="1392381" y="1506967"/>
+              <a:off x="2591953" y="1506967"/>
               <a:ext cx="1319645" cy="0"/>
             </a:xfrm>
             <a:prstGeom prst="line">
@@ -3456,7 +3456,7 @@
           </p:nvSpPr>
           <p:spPr>
             <a:xfrm>
-              <a:off x="1392381" y="1194955"/>
+              <a:off x="2591953" y="1194955"/>
               <a:ext cx="1319645" cy="3678381"/>
             </a:xfrm>
             <a:prstGeom prst="roundRect">
@@ -3513,7 +3513,7 @@
           </p:nvSpPr>
           <p:spPr>
             <a:xfrm>
-              <a:off x="1392381" y="1194953"/>
+              <a:off x="2591953" y="1194953"/>
               <a:ext cx="1319645" cy="323165"/>
             </a:xfrm>
             <a:prstGeom prst="rect">
@@ -3555,7 +3555,7 @@
           </p:nvSpPr>
           <p:spPr>
             <a:xfrm>
-              <a:off x="1578275" y="1769661"/>
+              <a:off x="2777847" y="1769661"/>
               <a:ext cx="947853" cy="1260087"/>
             </a:xfrm>
             <a:prstGeom prst="rect">
@@ -3564,7 +3564,7 @@
             <a:noFill/>
             <a:ln w="19050">
               <a:solidFill>
-                <a:schemeClr val="accent6"/>
+                <a:schemeClr val="accent2"/>
               </a:solidFill>
             </a:ln>
           </p:spPr>
@@ -3589,7 +3589,13 @@
             <a:lstStyle/>
             <a:p>
               <a:pPr algn="ctr"/>
-              <a:endParaRPr lang="en-CN"/>
+              <a:endParaRPr lang="en-CN">
+                <a:solidFill>
+                  <a:schemeClr val="accent2">
+                    <a:lumMod val="50000"/>
+                  </a:schemeClr>
+                </a:solidFill>
+              </a:endParaRPr>
             </a:p>
           </p:txBody>
         </p:sp>
@@ -3607,7 +3613,7 @@
           </p:nvSpPr>
           <p:spPr>
             <a:xfrm>
-              <a:off x="1578275" y="3318822"/>
+              <a:off x="2777847" y="3318822"/>
               <a:ext cx="947853" cy="1260087"/>
             </a:xfrm>
             <a:prstGeom prst="rect">
@@ -3659,7 +3665,7 @@
           </p:nvSpPr>
           <p:spPr>
             <a:xfrm>
-              <a:off x="1664508" y="1845137"/>
+              <a:off x="2864080" y="1845137"/>
               <a:ext cx="775386" cy="291737"/>
             </a:xfrm>
             <a:prstGeom prst="rect">
@@ -3668,7 +3674,7 @@
             <a:noFill/>
             <a:ln w="19050">
               <a:solidFill>
-                <a:schemeClr val="accent6"/>
+                <a:schemeClr val="accent2"/>
               </a:solidFill>
             </a:ln>
           </p:spPr>
@@ -3696,7 +3702,7 @@
               <a:r>
                 <a:rPr lang="en-CN" sz="1200" dirty="0">
                   <a:solidFill>
-                    <a:schemeClr val="accent6">
+                    <a:schemeClr val="accent2">
                       <a:lumMod val="50000"/>
                     </a:schemeClr>
                   </a:solidFill>
@@ -3706,7 +3712,7 @@
               <a:r>
                 <a:rPr lang="en-US" sz="1200" dirty="0">
                   <a:solidFill>
-                    <a:schemeClr val="accent6">
+                    <a:schemeClr val="accent2">
                       <a:lumMod val="50000"/>
                     </a:schemeClr>
                   </a:solidFill>
@@ -3715,7 +3721,7 @@
               </a:r>
               <a:endParaRPr lang="en-CN" sz="1200" dirty="0">
                 <a:solidFill>
-                  <a:schemeClr val="accent6">
+                  <a:schemeClr val="accent2">
                     <a:lumMod val="50000"/>
                   </a:schemeClr>
                 </a:solidFill>
@@ -3737,7 +3743,7 @@
           </p:nvSpPr>
           <p:spPr>
             <a:xfrm>
-              <a:off x="1664508" y="2253836"/>
+              <a:off x="2864080" y="2253836"/>
               <a:ext cx="775386" cy="291737"/>
             </a:xfrm>
             <a:prstGeom prst="rect">
@@ -3746,7 +3752,7 @@
             <a:noFill/>
             <a:ln w="19050">
               <a:solidFill>
-                <a:schemeClr val="accent6"/>
+                <a:schemeClr val="accent2"/>
               </a:solidFill>
             </a:ln>
           </p:spPr>
@@ -3774,7 +3780,7 @@
               <a:r>
                 <a:rPr lang="en-CN" sz="1200" dirty="0">
                   <a:solidFill>
-                    <a:schemeClr val="accent6">
+                    <a:schemeClr val="accent2">
                       <a:lumMod val="50000"/>
                     </a:schemeClr>
                   </a:solidFill>
@@ -3784,7 +3790,7 @@
               <a:r>
                 <a:rPr lang="en-US" sz="1200" dirty="0">
                   <a:solidFill>
-                    <a:schemeClr val="accent6">
+                    <a:schemeClr val="accent2">
                       <a:lumMod val="50000"/>
                     </a:schemeClr>
                   </a:solidFill>
@@ -3793,7 +3799,7 @@
               </a:r>
               <a:endParaRPr lang="en-CN" sz="1200" dirty="0">
                 <a:solidFill>
-                  <a:schemeClr val="accent6">
+                  <a:schemeClr val="accent2">
                     <a:lumMod val="50000"/>
                   </a:schemeClr>
                 </a:solidFill>
@@ -3815,7 +3821,7 @@
           </p:nvSpPr>
           <p:spPr>
             <a:xfrm>
-              <a:off x="1664508" y="2662535"/>
+              <a:off x="2864080" y="2662535"/>
               <a:ext cx="775386" cy="291737"/>
             </a:xfrm>
             <a:prstGeom prst="rect">
@@ -3824,7 +3830,7 @@
             <a:noFill/>
             <a:ln w="19050">
               <a:solidFill>
-                <a:schemeClr val="accent6"/>
+                <a:schemeClr val="accent2"/>
               </a:solidFill>
             </a:ln>
           </p:spPr>
@@ -3852,7 +3858,7 @@
               <a:r>
                 <a:rPr lang="en-CN" sz="1200" dirty="0">
                   <a:solidFill>
-                    <a:schemeClr val="accent6">
+                    <a:schemeClr val="accent2">
                       <a:lumMod val="50000"/>
                     </a:schemeClr>
                   </a:solidFill>
@@ -3862,7 +3868,7 @@
               <a:r>
                 <a:rPr lang="en-US" sz="1200" dirty="0">
                   <a:solidFill>
-                    <a:schemeClr val="accent6">
+                    <a:schemeClr val="accent2">
                       <a:lumMod val="50000"/>
                     </a:schemeClr>
                   </a:solidFill>
@@ -3871,7 +3877,7 @@
               </a:r>
               <a:endParaRPr lang="en-CN" sz="1200" dirty="0">
                 <a:solidFill>
-                  <a:schemeClr val="accent6">
+                  <a:schemeClr val="accent2">
                     <a:lumMod val="50000"/>
                   </a:schemeClr>
                 </a:solidFill>
@@ -3893,7 +3899,7 @@
           </p:nvSpPr>
           <p:spPr>
             <a:xfrm>
-              <a:off x="1664508" y="3396974"/>
+              <a:off x="2864080" y="3396974"/>
               <a:ext cx="775386" cy="291737"/>
             </a:xfrm>
             <a:prstGeom prst="rect">
@@ -3971,7 +3977,7 @@
           </p:nvSpPr>
           <p:spPr>
             <a:xfrm>
-              <a:off x="1664508" y="3805673"/>
+              <a:off x="2864080" y="3805673"/>
               <a:ext cx="775386" cy="291737"/>
             </a:xfrm>
             <a:prstGeom prst="rect">
@@ -4049,7 +4055,7 @@
           </p:nvSpPr>
           <p:spPr>
             <a:xfrm>
-              <a:off x="1664508" y="4214372"/>
+              <a:off x="2864080" y="4214372"/>
               <a:ext cx="775386" cy="291737"/>
             </a:xfrm>
             <a:prstGeom prst="rect">
@@ -4113,1378 +4119,2046 @@
             </a:p>
           </p:txBody>
         </p:sp>
-      </p:grpSp>
-      <p:sp>
-        <p:nvSpPr>
-          <p:cNvPr id="41" name="TextBox 40">
-            <a:extLst>
-              <a:ext uri="{FF2B5EF4-FFF2-40B4-BE49-F238E27FC236}">
-                <a16:creationId xmlns:a16="http://schemas.microsoft.com/office/drawing/2014/main" id="{7B3D1BE0-CF63-654C-8245-E74DF6F92B92}"/>
-              </a:ext>
-            </a:extLst>
-          </p:cNvPr>
-          <p:cNvSpPr txBox="1"/>
-          <p:nvPr/>
-        </p:nvSpPr>
-        <p:spPr>
-          <a:xfrm>
-            <a:off x="5187468" y="4873334"/>
-            <a:ext cx="1319645" cy="369332"/>
-          </a:xfrm>
-          <a:prstGeom prst="rect">
-            <a:avLst/>
-          </a:prstGeom>
-          <a:noFill/>
-        </p:spPr>
-        <p:txBody>
-          <a:bodyPr wrap="square" rtlCol="0">
-            <a:spAutoFit/>
-          </a:bodyPr>
-          <a:lstStyle/>
-          <a:p>
-            <a:pPr algn="ctr"/>
-            <a:r>
-              <a:rPr lang="en-CN" dirty="0">
+        <p:sp>
+          <p:nvSpPr>
+            <p:cNvPr id="41" name="TextBox 40">
+              <a:extLst>
+                <a:ext uri="{FF2B5EF4-FFF2-40B4-BE49-F238E27FC236}">
+                  <a16:creationId xmlns:a16="http://schemas.microsoft.com/office/drawing/2014/main" id="{7B3D1BE0-CF63-654C-8245-E74DF6F92B92}"/>
+                </a:ext>
+              </a:extLst>
+            </p:cNvPr>
+            <p:cNvSpPr txBox="1"/>
+            <p:nvPr/>
+          </p:nvSpPr>
+          <p:spPr>
+            <a:xfrm>
+              <a:off x="6419302" y="4873334"/>
+              <a:ext cx="1319645" cy="369332"/>
+            </a:xfrm>
+            <a:prstGeom prst="rect">
+              <a:avLst/>
+            </a:prstGeom>
+            <a:noFill/>
+          </p:spPr>
+          <p:txBody>
+            <a:bodyPr wrap="square" rtlCol="0">
+              <a:spAutoFit/>
+            </a:bodyPr>
+            <a:lstStyle/>
+            <a:p>
+              <a:pPr algn="ctr"/>
+              <a:r>
+                <a:rPr lang="en-CN" b="1" dirty="0">
+                  <a:latin typeface="Times New Roman" panose="02020603050405020304" pitchFamily="18" charset="0"/>
+                  <a:cs typeface="Times New Roman" panose="02020603050405020304" pitchFamily="18" charset="0"/>
+                </a:rPr>
+                <a:t>TX 2</a:t>
+              </a:r>
+            </a:p>
+          </p:txBody>
+        </p:sp>
+        <p:cxnSp>
+          <p:nvCxnSpPr>
+            <p:cNvPr id="42" name="Straight Connector 41">
+              <a:extLst>
+                <a:ext uri="{FF2B5EF4-FFF2-40B4-BE49-F238E27FC236}">
+                  <a16:creationId xmlns:a16="http://schemas.microsoft.com/office/drawing/2014/main" id="{A9DEB1A5-E7AF-7748-8B95-25730A80FF17}"/>
+                </a:ext>
+              </a:extLst>
+            </p:cNvPr>
+            <p:cNvCxnSpPr/>
+            <p:nvPr/>
+          </p:nvCxnSpPr>
+          <p:spPr>
+            <a:xfrm>
+              <a:off x="6419302" y="1506967"/>
+              <a:ext cx="1319645" cy="0"/>
+            </a:xfrm>
+            <a:prstGeom prst="line">
+              <a:avLst/>
+            </a:prstGeom>
+            <a:ln w="19050">
+              <a:solidFill>
+                <a:schemeClr val="tx1"/>
+              </a:solidFill>
+            </a:ln>
+          </p:spPr>
+          <p:style>
+            <a:lnRef idx="1">
+              <a:schemeClr val="accent1"/>
+            </a:lnRef>
+            <a:fillRef idx="0">
+              <a:schemeClr val="accent1"/>
+            </a:fillRef>
+            <a:effectRef idx="0">
+              <a:schemeClr val="accent1"/>
+            </a:effectRef>
+            <a:fontRef idx="minor">
+              <a:schemeClr val="tx1"/>
+            </a:fontRef>
+          </p:style>
+        </p:cxnSp>
+        <p:sp>
+          <p:nvSpPr>
+            <p:cNvPr id="43" name="Rounded Rectangle 42">
+              <a:extLst>
+                <a:ext uri="{FF2B5EF4-FFF2-40B4-BE49-F238E27FC236}">
+                  <a16:creationId xmlns:a16="http://schemas.microsoft.com/office/drawing/2014/main" id="{E86EC7F5-9F24-3048-862E-FD7711E64790}"/>
+                </a:ext>
+              </a:extLst>
+            </p:cNvPr>
+            <p:cNvSpPr/>
+            <p:nvPr/>
+          </p:nvSpPr>
+          <p:spPr>
+            <a:xfrm>
+              <a:off x="6419302" y="1194955"/>
+              <a:ext cx="1319645" cy="3678381"/>
+            </a:xfrm>
+            <a:prstGeom prst="roundRect">
+              <a:avLst>
+                <a:gd name="adj" fmla="val 6838"/>
+              </a:avLst>
+            </a:prstGeom>
+            <a:noFill/>
+            <a:ln w="19050">
+              <a:solidFill>
+                <a:schemeClr val="tx1"/>
+              </a:solidFill>
+            </a:ln>
+          </p:spPr>
+          <p:style>
+            <a:lnRef idx="2">
+              <a:schemeClr val="accent1">
+                <a:shade val="50000"/>
+              </a:schemeClr>
+            </a:lnRef>
+            <a:fillRef idx="1">
+              <a:schemeClr val="accent1"/>
+            </a:fillRef>
+            <a:effectRef idx="0">
+              <a:schemeClr val="accent1"/>
+            </a:effectRef>
+            <a:fontRef idx="minor">
+              <a:schemeClr val="lt1"/>
+            </a:fontRef>
+          </p:style>
+          <p:txBody>
+            <a:bodyPr rtlCol="0" anchor="ctr"/>
+            <a:lstStyle/>
+            <a:p>
+              <a:pPr algn="ctr"/>
+              <a:endParaRPr lang="en-CN">
                 <a:latin typeface="Times New Roman" panose="02020603050405020304" pitchFamily="18" charset="0"/>
                 <a:cs typeface="Times New Roman" panose="02020603050405020304" pitchFamily="18" charset="0"/>
-              </a:rPr>
-              <a:t>TX 2</a:t>
-            </a:r>
-          </a:p>
-        </p:txBody>
-      </p:sp>
-      <p:cxnSp>
-        <p:nvCxnSpPr>
-          <p:cNvPr id="42" name="Straight Connector 41">
-            <a:extLst>
-              <a:ext uri="{FF2B5EF4-FFF2-40B4-BE49-F238E27FC236}">
-                <a16:creationId xmlns:a16="http://schemas.microsoft.com/office/drawing/2014/main" id="{A9DEB1A5-E7AF-7748-8B95-25730A80FF17}"/>
-              </a:ext>
-            </a:extLst>
-          </p:cNvPr>
-          <p:cNvCxnSpPr/>
-          <p:nvPr/>
-        </p:nvCxnSpPr>
-        <p:spPr>
-          <a:xfrm>
-            <a:off x="5187468" y="1506967"/>
-            <a:ext cx="1319645" cy="0"/>
-          </a:xfrm>
-          <a:prstGeom prst="line">
-            <a:avLst/>
-          </a:prstGeom>
-          <a:ln w="19050">
-            <a:solidFill>
-              <a:schemeClr val="tx1"/>
-            </a:solidFill>
-          </a:ln>
-        </p:spPr>
-        <p:style>
-          <a:lnRef idx="1">
-            <a:schemeClr val="accent1"/>
-          </a:lnRef>
-          <a:fillRef idx="0">
-            <a:schemeClr val="accent1"/>
-          </a:fillRef>
-          <a:effectRef idx="0">
-            <a:schemeClr val="accent1"/>
-          </a:effectRef>
-          <a:fontRef idx="minor">
-            <a:schemeClr val="tx1"/>
-          </a:fontRef>
-        </p:style>
-      </p:cxnSp>
-      <p:sp>
-        <p:nvSpPr>
-          <p:cNvPr id="43" name="Rounded Rectangle 42">
-            <a:extLst>
-              <a:ext uri="{FF2B5EF4-FFF2-40B4-BE49-F238E27FC236}">
-                <a16:creationId xmlns:a16="http://schemas.microsoft.com/office/drawing/2014/main" id="{E86EC7F5-9F24-3048-862E-FD7711E64790}"/>
-              </a:ext>
-            </a:extLst>
-          </p:cNvPr>
-          <p:cNvSpPr/>
-          <p:nvPr/>
-        </p:nvSpPr>
-        <p:spPr>
-          <a:xfrm>
-            <a:off x="5187468" y="1194955"/>
-            <a:ext cx="1319645" cy="3678381"/>
-          </a:xfrm>
-          <a:prstGeom prst="roundRect">
-            <a:avLst>
-              <a:gd name="adj" fmla="val 6838"/>
-            </a:avLst>
-          </a:prstGeom>
-          <a:noFill/>
-          <a:ln w="19050">
-            <a:solidFill>
-              <a:schemeClr val="tx1"/>
-            </a:solidFill>
-          </a:ln>
-        </p:spPr>
-        <p:style>
-          <a:lnRef idx="2">
-            <a:schemeClr val="accent1">
-              <a:shade val="50000"/>
-            </a:schemeClr>
-          </a:lnRef>
-          <a:fillRef idx="1">
-            <a:schemeClr val="accent1"/>
-          </a:fillRef>
-          <a:effectRef idx="0">
-            <a:schemeClr val="accent1"/>
-          </a:effectRef>
-          <a:fontRef idx="minor">
-            <a:schemeClr val="lt1"/>
-          </a:fontRef>
-        </p:style>
-        <p:txBody>
-          <a:bodyPr rtlCol="0" anchor="ctr"/>
-          <a:lstStyle/>
-          <a:p>
-            <a:pPr algn="ctr"/>
-            <a:endParaRPr lang="en-CN">
-              <a:latin typeface="Times New Roman" panose="02020603050405020304" pitchFamily="18" charset="0"/>
-              <a:cs typeface="Times New Roman" panose="02020603050405020304" pitchFamily="18" charset="0"/>
-            </a:endParaRPr>
-          </a:p>
-        </p:txBody>
-      </p:sp>
-      <p:sp>
-        <p:nvSpPr>
-          <p:cNvPr id="44" name="TextBox 43">
-            <a:extLst>
-              <a:ext uri="{FF2B5EF4-FFF2-40B4-BE49-F238E27FC236}">
-                <a16:creationId xmlns:a16="http://schemas.microsoft.com/office/drawing/2014/main" id="{DB5F870E-A853-3B41-9901-2036E09E1252}"/>
-              </a:ext>
-            </a:extLst>
-          </p:cNvPr>
-          <p:cNvSpPr txBox="1"/>
-          <p:nvPr/>
-        </p:nvSpPr>
-        <p:spPr>
-          <a:xfrm>
-            <a:off x="5187468" y="1194953"/>
-            <a:ext cx="1319645" cy="323165"/>
-          </a:xfrm>
-          <a:prstGeom prst="rect">
-            <a:avLst/>
-          </a:prstGeom>
-          <a:noFill/>
-        </p:spPr>
-        <p:txBody>
-          <a:bodyPr wrap="square" rtlCol="0">
-            <a:spAutoFit/>
-          </a:bodyPr>
-          <a:lstStyle/>
-          <a:p>
-            <a:pPr algn="ctr"/>
-            <a:r>
-              <a:rPr lang="en-US" sz="1500" dirty="0"/>
-              <a:t>h</a:t>
-            </a:r>
-            <a:r>
-              <a:rPr lang="en-US" sz="1500" dirty="0">
-                <a:effectLst/>
-              </a:rPr>
-              <a:t>ash_2</a:t>
-            </a:r>
-          </a:p>
-        </p:txBody>
-      </p:sp>
-      <p:sp>
-        <p:nvSpPr>
-          <p:cNvPr id="45" name="Rectangle 44">
-            <a:extLst>
-              <a:ext uri="{FF2B5EF4-FFF2-40B4-BE49-F238E27FC236}">
-                <a16:creationId xmlns:a16="http://schemas.microsoft.com/office/drawing/2014/main" id="{E83CF83E-A8AB-824E-9ED4-CC27F7C4B1F0}"/>
-              </a:ext>
-            </a:extLst>
-          </p:cNvPr>
-          <p:cNvSpPr/>
-          <p:nvPr/>
-        </p:nvSpPr>
-        <p:spPr>
-          <a:xfrm>
-            <a:off x="5373362" y="1769661"/>
-            <a:ext cx="947853" cy="1260087"/>
-          </a:xfrm>
-          <a:prstGeom prst="rect">
-            <a:avLst/>
-          </a:prstGeom>
-          <a:noFill/>
-          <a:ln w="19050">
-            <a:solidFill>
-              <a:schemeClr val="accent6"/>
-            </a:solidFill>
-          </a:ln>
-        </p:spPr>
-        <p:style>
-          <a:lnRef idx="2">
-            <a:schemeClr val="accent1">
-              <a:shade val="50000"/>
-            </a:schemeClr>
-          </a:lnRef>
-          <a:fillRef idx="1">
-            <a:schemeClr val="accent1"/>
-          </a:fillRef>
-          <a:effectRef idx="0">
-            <a:schemeClr val="accent1"/>
-          </a:effectRef>
-          <a:fontRef idx="minor">
-            <a:schemeClr val="lt1"/>
-          </a:fontRef>
-        </p:style>
-        <p:txBody>
-          <a:bodyPr rtlCol="0" anchor="ctr"/>
-          <a:lstStyle/>
-          <a:p>
-            <a:pPr algn="ctr"/>
-            <a:endParaRPr lang="en-CN"/>
-          </a:p>
-        </p:txBody>
-      </p:sp>
-      <p:sp>
-        <p:nvSpPr>
-          <p:cNvPr id="46" name="Rectangle 45">
-            <a:extLst>
-              <a:ext uri="{FF2B5EF4-FFF2-40B4-BE49-F238E27FC236}">
-                <a16:creationId xmlns:a16="http://schemas.microsoft.com/office/drawing/2014/main" id="{6A09A708-2334-9940-AE71-FDA52C47110C}"/>
-              </a:ext>
-            </a:extLst>
-          </p:cNvPr>
-          <p:cNvSpPr/>
-          <p:nvPr/>
-        </p:nvSpPr>
-        <p:spPr>
-          <a:xfrm>
-            <a:off x="5373362" y="3318822"/>
-            <a:ext cx="947853" cy="1260087"/>
-          </a:xfrm>
-          <a:prstGeom prst="rect">
-            <a:avLst/>
-          </a:prstGeom>
-          <a:noFill/>
-          <a:ln w="19050">
-            <a:solidFill>
-              <a:schemeClr val="accent1"/>
-            </a:solidFill>
-          </a:ln>
-        </p:spPr>
-        <p:style>
-          <a:lnRef idx="2">
-            <a:schemeClr val="accent1">
-              <a:shade val="50000"/>
-            </a:schemeClr>
-          </a:lnRef>
-          <a:fillRef idx="1">
-            <a:schemeClr val="accent1"/>
-          </a:fillRef>
-          <a:effectRef idx="0">
-            <a:schemeClr val="accent1"/>
-          </a:effectRef>
-          <a:fontRef idx="minor">
-            <a:schemeClr val="lt1"/>
-          </a:fontRef>
-        </p:style>
-        <p:txBody>
-          <a:bodyPr rtlCol="0" anchor="ctr"/>
-          <a:lstStyle/>
-          <a:p>
-            <a:pPr algn="ctr"/>
-            <a:endParaRPr lang="en-CN"/>
-          </a:p>
-        </p:txBody>
-      </p:sp>
-      <p:sp>
-        <p:nvSpPr>
-          <p:cNvPr id="47" name="Rectangle 46">
-            <a:extLst>
-              <a:ext uri="{FF2B5EF4-FFF2-40B4-BE49-F238E27FC236}">
-                <a16:creationId xmlns:a16="http://schemas.microsoft.com/office/drawing/2014/main" id="{39068306-9C95-9645-B0C5-09DA4632C20F}"/>
-              </a:ext>
-            </a:extLst>
-          </p:cNvPr>
-          <p:cNvSpPr/>
-          <p:nvPr/>
-        </p:nvSpPr>
-        <p:spPr>
-          <a:xfrm>
-            <a:off x="5459595" y="1845137"/>
-            <a:ext cx="775386" cy="291737"/>
-          </a:xfrm>
-          <a:prstGeom prst="rect">
-            <a:avLst/>
-          </a:prstGeom>
-          <a:noFill/>
-          <a:ln w="19050">
-            <a:solidFill>
-              <a:schemeClr val="accent6"/>
-            </a:solidFill>
-          </a:ln>
-        </p:spPr>
-        <p:style>
-          <a:lnRef idx="2">
-            <a:schemeClr val="accent1">
-              <a:shade val="50000"/>
-            </a:schemeClr>
-          </a:lnRef>
-          <a:fillRef idx="1">
-            <a:schemeClr val="accent1"/>
-          </a:fillRef>
-          <a:effectRef idx="0">
-            <a:schemeClr val="accent1"/>
-          </a:effectRef>
-          <a:fontRef idx="minor">
-            <a:schemeClr val="lt1"/>
-          </a:fontRef>
-        </p:style>
-        <p:txBody>
-          <a:bodyPr rtlCol="0" anchor="ctr"/>
-          <a:lstStyle/>
-          <a:p>
-            <a:pPr algn="ctr"/>
-            <a:r>
-              <a:rPr lang="en-CN" sz="1200" dirty="0">
+              </a:endParaRPr>
+            </a:p>
+          </p:txBody>
+        </p:sp>
+        <p:sp>
+          <p:nvSpPr>
+            <p:cNvPr id="44" name="TextBox 43">
+              <a:extLst>
+                <a:ext uri="{FF2B5EF4-FFF2-40B4-BE49-F238E27FC236}">
+                  <a16:creationId xmlns:a16="http://schemas.microsoft.com/office/drawing/2014/main" id="{DB5F870E-A853-3B41-9901-2036E09E1252}"/>
+                </a:ext>
+              </a:extLst>
+            </p:cNvPr>
+            <p:cNvSpPr txBox="1"/>
+            <p:nvPr/>
+          </p:nvSpPr>
+          <p:spPr>
+            <a:xfrm>
+              <a:off x="6419302" y="1194953"/>
+              <a:ext cx="1319645" cy="323165"/>
+            </a:xfrm>
+            <a:prstGeom prst="rect">
+              <a:avLst/>
+            </a:prstGeom>
+            <a:noFill/>
+          </p:spPr>
+          <p:txBody>
+            <a:bodyPr wrap="square" rtlCol="0">
+              <a:spAutoFit/>
+            </a:bodyPr>
+            <a:lstStyle/>
+            <a:p>
+              <a:pPr algn="ctr"/>
+              <a:r>
+                <a:rPr lang="en-US" sz="1500" dirty="0"/>
+                <a:t>h</a:t>
+              </a:r>
+              <a:r>
+                <a:rPr lang="en-US" sz="1500" dirty="0">
+                  <a:effectLst/>
+                </a:rPr>
+                <a:t>ash_2</a:t>
+              </a:r>
+            </a:p>
+          </p:txBody>
+        </p:sp>
+        <p:sp>
+          <p:nvSpPr>
+            <p:cNvPr id="45" name="Rectangle 44">
+              <a:extLst>
+                <a:ext uri="{FF2B5EF4-FFF2-40B4-BE49-F238E27FC236}">
+                  <a16:creationId xmlns:a16="http://schemas.microsoft.com/office/drawing/2014/main" id="{E83CF83E-A8AB-824E-9ED4-CC27F7C4B1F0}"/>
+                </a:ext>
+              </a:extLst>
+            </p:cNvPr>
+            <p:cNvSpPr/>
+            <p:nvPr/>
+          </p:nvSpPr>
+          <p:spPr>
+            <a:xfrm>
+              <a:off x="6605196" y="1769661"/>
+              <a:ext cx="947853" cy="1260087"/>
+            </a:xfrm>
+            <a:prstGeom prst="rect">
+              <a:avLst/>
+            </a:prstGeom>
+            <a:noFill/>
+            <a:ln w="19050">
+              <a:solidFill>
+                <a:schemeClr val="accent2"/>
+              </a:solidFill>
+            </a:ln>
+          </p:spPr>
+          <p:style>
+            <a:lnRef idx="2">
+              <a:schemeClr val="accent1">
+                <a:shade val="50000"/>
+              </a:schemeClr>
+            </a:lnRef>
+            <a:fillRef idx="1">
+              <a:schemeClr val="accent1"/>
+            </a:fillRef>
+            <a:effectRef idx="0">
+              <a:schemeClr val="accent1"/>
+            </a:effectRef>
+            <a:fontRef idx="minor">
+              <a:schemeClr val="lt1"/>
+            </a:fontRef>
+          </p:style>
+          <p:txBody>
+            <a:bodyPr rtlCol="0" anchor="ctr"/>
+            <a:lstStyle/>
+            <a:p>
+              <a:pPr algn="ctr"/>
+              <a:endParaRPr lang="en-CN">
                 <a:solidFill>
-                  <a:schemeClr val="accent6">
+                  <a:schemeClr val="accent2">
                     <a:lumMod val="50000"/>
                   </a:schemeClr>
                 </a:solidFill>
-              </a:rPr>
-              <a:t>input_</a:t>
-            </a:r>
-            <a:r>
-              <a:rPr lang="en-US" sz="1200" dirty="0">
+              </a:endParaRPr>
+            </a:p>
+          </p:txBody>
+        </p:sp>
+        <p:sp>
+          <p:nvSpPr>
+            <p:cNvPr id="46" name="Rectangle 45">
+              <a:extLst>
+                <a:ext uri="{FF2B5EF4-FFF2-40B4-BE49-F238E27FC236}">
+                  <a16:creationId xmlns:a16="http://schemas.microsoft.com/office/drawing/2014/main" id="{6A09A708-2334-9940-AE71-FDA52C47110C}"/>
+                </a:ext>
+              </a:extLst>
+            </p:cNvPr>
+            <p:cNvSpPr/>
+            <p:nvPr/>
+          </p:nvSpPr>
+          <p:spPr>
+            <a:xfrm>
+              <a:off x="6605196" y="3318822"/>
+              <a:ext cx="947853" cy="1260087"/>
+            </a:xfrm>
+            <a:prstGeom prst="rect">
+              <a:avLst/>
+            </a:prstGeom>
+            <a:noFill/>
+            <a:ln w="19050">
+              <a:solidFill>
+                <a:schemeClr val="accent1"/>
+              </a:solidFill>
+            </a:ln>
+          </p:spPr>
+          <p:style>
+            <a:lnRef idx="2">
+              <a:schemeClr val="accent1">
+                <a:shade val="50000"/>
+              </a:schemeClr>
+            </a:lnRef>
+            <a:fillRef idx="1">
+              <a:schemeClr val="accent1"/>
+            </a:fillRef>
+            <a:effectRef idx="0">
+              <a:schemeClr val="accent1"/>
+            </a:effectRef>
+            <a:fontRef idx="minor">
+              <a:schemeClr val="lt1"/>
+            </a:fontRef>
+          </p:style>
+          <p:txBody>
+            <a:bodyPr rtlCol="0" anchor="ctr"/>
+            <a:lstStyle/>
+            <a:p>
+              <a:pPr algn="ctr"/>
+              <a:endParaRPr lang="en-CN"/>
+            </a:p>
+          </p:txBody>
+        </p:sp>
+        <p:sp>
+          <p:nvSpPr>
+            <p:cNvPr id="47" name="Rectangle 46">
+              <a:extLst>
+                <a:ext uri="{FF2B5EF4-FFF2-40B4-BE49-F238E27FC236}">
+                  <a16:creationId xmlns:a16="http://schemas.microsoft.com/office/drawing/2014/main" id="{39068306-9C95-9645-B0C5-09DA4632C20F}"/>
+                </a:ext>
+              </a:extLst>
+            </p:cNvPr>
+            <p:cNvSpPr/>
+            <p:nvPr/>
+          </p:nvSpPr>
+          <p:spPr>
+            <a:xfrm>
+              <a:off x="6691429" y="1845137"/>
+              <a:ext cx="775386" cy="291737"/>
+            </a:xfrm>
+            <a:prstGeom prst="rect">
+              <a:avLst/>
+            </a:prstGeom>
+            <a:noFill/>
+            <a:ln w="19050">
+              <a:solidFill>
+                <a:schemeClr val="accent2"/>
+              </a:solidFill>
+            </a:ln>
+          </p:spPr>
+          <p:style>
+            <a:lnRef idx="2">
+              <a:schemeClr val="accent1">
+                <a:shade val="50000"/>
+              </a:schemeClr>
+            </a:lnRef>
+            <a:fillRef idx="1">
+              <a:schemeClr val="accent1"/>
+            </a:fillRef>
+            <a:effectRef idx="0">
+              <a:schemeClr val="accent1"/>
+            </a:effectRef>
+            <a:fontRef idx="minor">
+              <a:schemeClr val="lt1"/>
+            </a:fontRef>
+          </p:style>
+          <p:txBody>
+            <a:bodyPr rtlCol="0" anchor="ctr"/>
+            <a:lstStyle/>
+            <a:p>
+              <a:pPr algn="ctr"/>
+              <a:r>
+                <a:rPr lang="en-CN" sz="1200" dirty="0">
+                  <a:solidFill>
+                    <a:schemeClr val="accent2">
+                      <a:lumMod val="50000"/>
+                    </a:schemeClr>
+                  </a:solidFill>
+                </a:rPr>
+                <a:t>input_</a:t>
+              </a:r>
+              <a:r>
+                <a:rPr lang="en-US" sz="1200" dirty="0">
+                  <a:solidFill>
+                    <a:schemeClr val="accent2">
+                      <a:lumMod val="50000"/>
+                    </a:schemeClr>
+                  </a:solidFill>
+                </a:rPr>
+                <a:t>0</a:t>
+              </a:r>
+              <a:endParaRPr lang="en-CN" sz="1200" dirty="0">
                 <a:solidFill>
-                  <a:schemeClr val="accent6">
+                  <a:schemeClr val="accent2">
                     <a:lumMod val="50000"/>
                   </a:schemeClr>
                 </a:solidFill>
-              </a:rPr>
-              <a:t>0</a:t>
-            </a:r>
-            <a:endParaRPr lang="en-CN" sz="1200" dirty="0">
+              </a:endParaRPr>
+            </a:p>
+          </p:txBody>
+        </p:sp>
+        <p:sp>
+          <p:nvSpPr>
+            <p:cNvPr id="48" name="Rectangle 47">
+              <a:extLst>
+                <a:ext uri="{FF2B5EF4-FFF2-40B4-BE49-F238E27FC236}">
+                  <a16:creationId xmlns:a16="http://schemas.microsoft.com/office/drawing/2014/main" id="{8F6832C2-D70C-1C45-ADAF-B768C3E732B5}"/>
+                </a:ext>
+              </a:extLst>
+            </p:cNvPr>
+            <p:cNvSpPr/>
+            <p:nvPr/>
+          </p:nvSpPr>
+          <p:spPr>
+            <a:xfrm>
+              <a:off x="6691429" y="2253836"/>
+              <a:ext cx="775386" cy="291737"/>
+            </a:xfrm>
+            <a:prstGeom prst="rect">
+              <a:avLst/>
+            </a:prstGeom>
+            <a:noFill/>
+            <a:ln w="19050">
               <a:solidFill>
-                <a:schemeClr val="accent6">
-                  <a:lumMod val="50000"/>
-                </a:schemeClr>
+                <a:schemeClr val="accent2"/>
               </a:solidFill>
-            </a:endParaRPr>
-          </a:p>
-        </p:txBody>
-      </p:sp>
-      <p:sp>
-        <p:nvSpPr>
-          <p:cNvPr id="48" name="Rectangle 47">
-            <a:extLst>
-              <a:ext uri="{FF2B5EF4-FFF2-40B4-BE49-F238E27FC236}">
-                <a16:creationId xmlns:a16="http://schemas.microsoft.com/office/drawing/2014/main" id="{8F6832C2-D70C-1C45-ADAF-B768C3E732B5}"/>
-              </a:ext>
-            </a:extLst>
-          </p:cNvPr>
-          <p:cNvSpPr/>
-          <p:nvPr/>
-        </p:nvSpPr>
-        <p:spPr>
-          <a:xfrm>
-            <a:off x="5459595" y="2253836"/>
-            <a:ext cx="775386" cy="291737"/>
-          </a:xfrm>
-          <a:prstGeom prst="rect">
-            <a:avLst/>
-          </a:prstGeom>
-          <a:noFill/>
-          <a:ln w="19050">
-            <a:solidFill>
-              <a:schemeClr val="accent6"/>
-            </a:solidFill>
-          </a:ln>
-        </p:spPr>
-        <p:style>
-          <a:lnRef idx="2">
-            <a:schemeClr val="accent1">
-              <a:shade val="50000"/>
-            </a:schemeClr>
-          </a:lnRef>
-          <a:fillRef idx="1">
-            <a:schemeClr val="accent1"/>
-          </a:fillRef>
-          <a:effectRef idx="0">
-            <a:schemeClr val="accent1"/>
-          </a:effectRef>
-          <a:fontRef idx="minor">
-            <a:schemeClr val="lt1"/>
-          </a:fontRef>
-        </p:style>
-        <p:txBody>
-          <a:bodyPr rtlCol="0" anchor="ctr"/>
-          <a:lstStyle/>
-          <a:p>
-            <a:pPr algn="ctr"/>
-            <a:r>
-              <a:rPr lang="en-CN" sz="1200" dirty="0">
+            </a:ln>
+          </p:spPr>
+          <p:style>
+            <a:lnRef idx="2">
+              <a:schemeClr val="accent1">
+                <a:shade val="50000"/>
+              </a:schemeClr>
+            </a:lnRef>
+            <a:fillRef idx="1">
+              <a:schemeClr val="accent1"/>
+            </a:fillRef>
+            <a:effectRef idx="0">
+              <a:schemeClr val="accent1"/>
+            </a:effectRef>
+            <a:fontRef idx="minor">
+              <a:schemeClr val="lt1"/>
+            </a:fontRef>
+          </p:style>
+          <p:txBody>
+            <a:bodyPr rtlCol="0" anchor="ctr"/>
+            <a:lstStyle/>
+            <a:p>
+              <a:pPr algn="ctr"/>
+              <a:r>
+                <a:rPr lang="en-CN" sz="1200" dirty="0">
+                  <a:solidFill>
+                    <a:schemeClr val="accent2">
+                      <a:lumMod val="50000"/>
+                    </a:schemeClr>
+                  </a:solidFill>
+                </a:rPr>
+                <a:t>input_</a:t>
+              </a:r>
+              <a:r>
+                <a:rPr lang="en-US" sz="1200" dirty="0">
+                  <a:solidFill>
+                    <a:schemeClr val="accent2">
+                      <a:lumMod val="50000"/>
+                    </a:schemeClr>
+                  </a:solidFill>
+                </a:rPr>
+                <a:t>1</a:t>
+              </a:r>
+              <a:endParaRPr lang="en-CN" sz="1200" dirty="0">
                 <a:solidFill>
-                  <a:schemeClr val="accent6">
+                  <a:schemeClr val="accent2">
                     <a:lumMod val="50000"/>
                   </a:schemeClr>
                 </a:solidFill>
-              </a:rPr>
-              <a:t>input_</a:t>
-            </a:r>
-            <a:r>
-              <a:rPr lang="en-US" sz="1200" dirty="0">
-                <a:solidFill>
-                  <a:schemeClr val="accent6">
-                    <a:lumMod val="50000"/>
-                  </a:schemeClr>
-                </a:solidFill>
-              </a:rPr>
-              <a:t>1</a:t>
-            </a:r>
-            <a:endParaRPr lang="en-CN" sz="1200" dirty="0">
+              </a:endParaRPr>
+            </a:p>
+          </p:txBody>
+        </p:sp>
+        <p:sp>
+          <p:nvSpPr>
+            <p:cNvPr id="50" name="Rectangle 49">
+              <a:extLst>
+                <a:ext uri="{FF2B5EF4-FFF2-40B4-BE49-F238E27FC236}">
+                  <a16:creationId xmlns:a16="http://schemas.microsoft.com/office/drawing/2014/main" id="{61E035E7-E472-F24F-BC65-122A1606152C}"/>
+                </a:ext>
+              </a:extLst>
+            </p:cNvPr>
+            <p:cNvSpPr/>
+            <p:nvPr/>
+          </p:nvSpPr>
+          <p:spPr>
+            <a:xfrm>
+              <a:off x="6691429" y="3396974"/>
+              <a:ext cx="775386" cy="291737"/>
+            </a:xfrm>
+            <a:prstGeom prst="rect">
+              <a:avLst/>
+            </a:prstGeom>
+            <a:noFill/>
+            <a:ln w="19050">
               <a:solidFill>
-                <a:schemeClr val="accent6">
-                  <a:lumMod val="50000"/>
-                </a:schemeClr>
+                <a:schemeClr val="accent1"/>
               </a:solidFill>
-            </a:endParaRPr>
-          </a:p>
-        </p:txBody>
-      </p:sp>
-      <p:sp>
-        <p:nvSpPr>
-          <p:cNvPr id="50" name="Rectangle 49">
-            <a:extLst>
-              <a:ext uri="{FF2B5EF4-FFF2-40B4-BE49-F238E27FC236}">
-                <a16:creationId xmlns:a16="http://schemas.microsoft.com/office/drawing/2014/main" id="{61E035E7-E472-F24F-BC65-122A1606152C}"/>
-              </a:ext>
-            </a:extLst>
-          </p:cNvPr>
-          <p:cNvSpPr/>
-          <p:nvPr/>
-        </p:nvSpPr>
-        <p:spPr>
-          <a:xfrm>
-            <a:off x="5459595" y="3396974"/>
-            <a:ext cx="775386" cy="291737"/>
-          </a:xfrm>
-          <a:prstGeom prst="rect">
-            <a:avLst/>
-          </a:prstGeom>
-          <a:noFill/>
-          <a:ln w="19050">
-            <a:solidFill>
-              <a:schemeClr val="accent1"/>
-            </a:solidFill>
-          </a:ln>
-        </p:spPr>
-        <p:style>
-          <a:lnRef idx="2">
-            <a:schemeClr val="accent1">
-              <a:shade val="50000"/>
-            </a:schemeClr>
-          </a:lnRef>
-          <a:fillRef idx="1">
-            <a:schemeClr val="accent1"/>
-          </a:fillRef>
-          <a:effectRef idx="0">
-            <a:schemeClr val="accent1"/>
-          </a:effectRef>
-          <a:fontRef idx="minor">
-            <a:schemeClr val="lt1"/>
-          </a:fontRef>
-        </p:style>
-        <p:txBody>
-          <a:bodyPr rtlCol="0" anchor="ctr"/>
-          <a:lstStyle/>
-          <a:p>
-            <a:pPr algn="ctr"/>
-            <a:r>
-              <a:rPr lang="en-CN" sz="1200" dirty="0">
+            </a:ln>
+          </p:spPr>
+          <p:style>
+            <a:lnRef idx="2">
+              <a:schemeClr val="accent1">
+                <a:shade val="50000"/>
+              </a:schemeClr>
+            </a:lnRef>
+            <a:fillRef idx="1">
+              <a:schemeClr val="accent1"/>
+            </a:fillRef>
+            <a:effectRef idx="0">
+              <a:schemeClr val="accent1"/>
+            </a:effectRef>
+            <a:fontRef idx="minor">
+              <a:schemeClr val="lt1"/>
+            </a:fontRef>
+          </p:style>
+          <p:txBody>
+            <a:bodyPr rtlCol="0" anchor="ctr"/>
+            <a:lstStyle/>
+            <a:p>
+              <a:pPr algn="ctr"/>
+              <a:r>
+                <a:rPr lang="en-CN" sz="1200" dirty="0">
+                  <a:solidFill>
+                    <a:schemeClr val="accent1">
+                      <a:lumMod val="50000"/>
+                    </a:schemeClr>
+                  </a:solidFill>
+                </a:rPr>
+                <a:t>output_</a:t>
+              </a:r>
+              <a:r>
+                <a:rPr lang="en-US" sz="1200" dirty="0">
+                  <a:solidFill>
+                    <a:schemeClr val="accent1">
+                      <a:lumMod val="50000"/>
+                    </a:schemeClr>
+                  </a:solidFill>
+                </a:rPr>
+                <a:t>0</a:t>
+              </a:r>
+              <a:endParaRPr lang="en-CN" sz="1200" dirty="0">
                 <a:solidFill>
                   <a:schemeClr val="accent1">
                     <a:lumMod val="50000"/>
                   </a:schemeClr>
                 </a:solidFill>
-              </a:rPr>
-              <a:t>output_</a:t>
-            </a:r>
-            <a:r>
-              <a:rPr lang="en-US" sz="1200" dirty="0">
+              </a:endParaRPr>
+            </a:p>
+          </p:txBody>
+        </p:sp>
+        <p:sp>
+          <p:nvSpPr>
+            <p:cNvPr id="51" name="Rectangle 50">
+              <a:extLst>
+                <a:ext uri="{FF2B5EF4-FFF2-40B4-BE49-F238E27FC236}">
+                  <a16:creationId xmlns:a16="http://schemas.microsoft.com/office/drawing/2014/main" id="{F217FD9D-B695-8F4C-87F1-A235B5399E81}"/>
+                </a:ext>
+              </a:extLst>
+            </p:cNvPr>
+            <p:cNvSpPr/>
+            <p:nvPr/>
+          </p:nvSpPr>
+          <p:spPr>
+            <a:xfrm>
+              <a:off x="6691429" y="3805673"/>
+              <a:ext cx="775386" cy="291737"/>
+            </a:xfrm>
+            <a:prstGeom prst="rect">
+              <a:avLst/>
+            </a:prstGeom>
+            <a:noFill/>
+            <a:ln w="19050">
+              <a:solidFill>
+                <a:schemeClr val="accent1"/>
+              </a:solidFill>
+            </a:ln>
+          </p:spPr>
+          <p:style>
+            <a:lnRef idx="2">
+              <a:schemeClr val="accent1">
+                <a:shade val="50000"/>
+              </a:schemeClr>
+            </a:lnRef>
+            <a:fillRef idx="1">
+              <a:schemeClr val="accent1"/>
+            </a:fillRef>
+            <a:effectRef idx="0">
+              <a:schemeClr val="accent1"/>
+            </a:effectRef>
+            <a:fontRef idx="minor">
+              <a:schemeClr val="lt1"/>
+            </a:fontRef>
+          </p:style>
+          <p:txBody>
+            <a:bodyPr rtlCol="0" anchor="ctr"/>
+            <a:lstStyle/>
+            <a:p>
+              <a:pPr algn="ctr"/>
+              <a:r>
+                <a:rPr lang="en-CN" sz="1200" dirty="0">
+                  <a:solidFill>
+                    <a:schemeClr val="accent1">
+                      <a:lumMod val="50000"/>
+                    </a:schemeClr>
+                  </a:solidFill>
+                </a:rPr>
+                <a:t>output_</a:t>
+              </a:r>
+              <a:r>
+                <a:rPr lang="en-US" sz="1200" dirty="0">
+                  <a:solidFill>
+                    <a:schemeClr val="accent1">
+                      <a:lumMod val="50000"/>
+                    </a:schemeClr>
+                  </a:solidFill>
+                </a:rPr>
+                <a:t>1</a:t>
+              </a:r>
+              <a:endParaRPr lang="en-CN" sz="1200" dirty="0">
                 <a:solidFill>
                   <a:schemeClr val="accent1">
                     <a:lumMod val="50000"/>
                   </a:schemeClr>
                 </a:solidFill>
-              </a:rPr>
-              <a:t>0</a:t>
-            </a:r>
-            <a:endParaRPr lang="en-CN" sz="1200" dirty="0">
+              </a:endParaRPr>
+            </a:p>
+          </p:txBody>
+        </p:sp>
+        <p:cxnSp>
+          <p:nvCxnSpPr>
+            <p:cNvPr id="37" name="Elbow Connector 36">
+              <a:extLst>
+                <a:ext uri="{FF2B5EF4-FFF2-40B4-BE49-F238E27FC236}">
+                  <a16:creationId xmlns:a16="http://schemas.microsoft.com/office/drawing/2014/main" id="{1D3822AB-5FA2-9F43-9823-EE1837E75F83}"/>
+                </a:ext>
+              </a:extLst>
+            </p:cNvPr>
+            <p:cNvCxnSpPr>
+              <a:cxnSpLocks/>
+              <a:stCxn id="102" idx="3"/>
+              <a:endCxn id="48" idx="1"/>
+            </p:cNvCxnSpPr>
+            <p:nvPr/>
+          </p:nvCxnSpPr>
+          <p:spPr>
+            <a:xfrm flipV="1">
+              <a:off x="5803949" y="2399705"/>
+              <a:ext cx="887480" cy="1551871"/>
+            </a:xfrm>
+            <a:prstGeom prst="bentConnector3">
+              <a:avLst>
+                <a:gd name="adj1" fmla="val 50000"/>
+              </a:avLst>
+            </a:prstGeom>
+            <a:ln w="12700">
               <a:solidFill>
-                <a:schemeClr val="accent1">
-                  <a:lumMod val="50000"/>
-                </a:schemeClr>
+                <a:schemeClr val="tx1"/>
               </a:solidFill>
-            </a:endParaRPr>
-          </a:p>
-        </p:txBody>
-      </p:sp>
-      <p:sp>
-        <p:nvSpPr>
-          <p:cNvPr id="51" name="Rectangle 50">
-            <a:extLst>
-              <a:ext uri="{FF2B5EF4-FFF2-40B4-BE49-F238E27FC236}">
-                <a16:creationId xmlns:a16="http://schemas.microsoft.com/office/drawing/2014/main" id="{F217FD9D-B695-8F4C-87F1-A235B5399E81}"/>
-              </a:ext>
-            </a:extLst>
-          </p:cNvPr>
-          <p:cNvSpPr/>
-          <p:nvPr/>
-        </p:nvSpPr>
-        <p:spPr>
-          <a:xfrm>
-            <a:off x="5459595" y="3805673"/>
-            <a:ext cx="775386" cy="291737"/>
-          </a:xfrm>
-          <a:prstGeom prst="rect">
-            <a:avLst/>
-          </a:prstGeom>
-          <a:noFill/>
-          <a:ln w="19050">
-            <a:solidFill>
-              <a:schemeClr val="accent1"/>
-            </a:solidFill>
-          </a:ln>
-        </p:spPr>
-        <p:style>
-          <a:lnRef idx="2">
-            <a:schemeClr val="accent1">
-              <a:shade val="50000"/>
-            </a:schemeClr>
-          </a:lnRef>
-          <a:fillRef idx="1">
-            <a:schemeClr val="accent1"/>
-          </a:fillRef>
-          <a:effectRef idx="0">
-            <a:schemeClr val="accent1"/>
-          </a:effectRef>
-          <a:fontRef idx="minor">
-            <a:schemeClr val="lt1"/>
-          </a:fontRef>
-        </p:style>
-        <p:txBody>
-          <a:bodyPr rtlCol="0" anchor="ctr"/>
-          <a:lstStyle/>
-          <a:p>
-            <a:pPr algn="ctr"/>
-            <a:r>
-              <a:rPr lang="en-CN" sz="1200" dirty="0">
+              <a:tailEnd type="stealth" w="lg" len="lg"/>
+            </a:ln>
+          </p:spPr>
+          <p:style>
+            <a:lnRef idx="1">
+              <a:schemeClr val="accent1"/>
+            </a:lnRef>
+            <a:fillRef idx="0">
+              <a:schemeClr val="accent1"/>
+            </a:fillRef>
+            <a:effectRef idx="0">
+              <a:schemeClr val="accent1"/>
+            </a:effectRef>
+            <a:fontRef idx="minor">
+              <a:schemeClr val="tx1"/>
+            </a:fontRef>
+          </p:style>
+        </p:cxnSp>
+        <p:cxnSp>
+          <p:nvCxnSpPr>
+            <p:cNvPr id="56" name="Straight Arrow Connector 55">
+              <a:extLst>
+                <a:ext uri="{FF2B5EF4-FFF2-40B4-BE49-F238E27FC236}">
+                  <a16:creationId xmlns:a16="http://schemas.microsoft.com/office/drawing/2014/main" id="{263F9595-391D-4646-9774-5382D9E62DD0}"/>
+                </a:ext>
+              </a:extLst>
+            </p:cNvPr>
+            <p:cNvCxnSpPr>
+              <a:cxnSpLocks/>
+              <a:stCxn id="48" idx="3"/>
+              <a:endCxn id="57" idx="1"/>
+            </p:cNvCxnSpPr>
+            <p:nvPr/>
+          </p:nvCxnSpPr>
+          <p:spPr>
+            <a:xfrm flipV="1">
+              <a:off x="7466815" y="2399704"/>
+              <a:ext cx="540328" cy="1"/>
+            </a:xfrm>
+            <a:prstGeom prst="straightConnector1">
+              <a:avLst/>
+            </a:prstGeom>
+            <a:ln w="12700">
+              <a:solidFill>
+                <a:schemeClr val="accent2"/>
+              </a:solidFill>
+              <a:prstDash val="sysDash"/>
+              <a:tailEnd type="stealth" w="lg" len="lg"/>
+            </a:ln>
+          </p:spPr>
+          <p:style>
+            <a:lnRef idx="1">
+              <a:schemeClr val="accent1"/>
+            </a:lnRef>
+            <a:fillRef idx="0">
+              <a:schemeClr val="accent1"/>
+            </a:fillRef>
+            <a:effectRef idx="0">
+              <a:schemeClr val="accent1"/>
+            </a:effectRef>
+            <a:fontRef idx="minor">
+              <a:schemeClr val="tx1"/>
+            </a:fontRef>
+          </p:style>
+        </p:cxnSp>
+        <p:sp>
+          <p:nvSpPr>
+            <p:cNvPr id="57" name="Rectangle 56">
+              <a:extLst>
+                <a:ext uri="{FF2B5EF4-FFF2-40B4-BE49-F238E27FC236}">
+                  <a16:creationId xmlns:a16="http://schemas.microsoft.com/office/drawing/2014/main" id="{C8DC3330-54F3-A84B-AAE3-4BA879B641CA}"/>
+                </a:ext>
+              </a:extLst>
+            </p:cNvPr>
+            <p:cNvSpPr/>
+            <p:nvPr/>
+          </p:nvSpPr>
+          <p:spPr>
+            <a:xfrm>
+              <a:off x="8007143" y="2067119"/>
+              <a:ext cx="1643861" cy="665170"/>
+            </a:xfrm>
+            <a:prstGeom prst="rect">
+              <a:avLst/>
+            </a:prstGeom>
+            <a:noFill/>
+            <a:ln w="19050">
+              <a:solidFill>
+                <a:schemeClr val="accent2"/>
+              </a:solidFill>
+              <a:prstDash val="sysDash"/>
+            </a:ln>
+          </p:spPr>
+          <p:style>
+            <a:lnRef idx="2">
+              <a:schemeClr val="accent1">
+                <a:shade val="50000"/>
+              </a:schemeClr>
+            </a:lnRef>
+            <a:fillRef idx="1">
+              <a:schemeClr val="accent1"/>
+            </a:fillRef>
+            <a:effectRef idx="0">
+              <a:schemeClr val="accent1"/>
+            </a:effectRef>
+            <a:fontRef idx="minor">
+              <a:schemeClr val="lt1"/>
+            </a:fontRef>
+          </p:style>
+          <p:txBody>
+            <a:bodyPr rtlCol="0" anchor="ctr"/>
+            <a:lstStyle/>
+            <a:p>
+              <a:pPr algn="ctr"/>
+              <a:r>
+                <a:rPr lang="en-US" sz="1200" b="1" u="sng" dirty="0">
+                  <a:solidFill>
+                    <a:schemeClr val="accent2">
+                      <a:lumMod val="50000"/>
+                    </a:schemeClr>
+                  </a:solidFill>
+                  <a:effectLst/>
+                </a:rPr>
+                <a:t>prevTxHash</a:t>
+              </a:r>
+              <a:r>
+                <a:rPr lang="en-US" sz="1200" dirty="0">
+                  <a:solidFill>
+                    <a:schemeClr val="accent2">
+                      <a:lumMod val="50000"/>
+                    </a:schemeClr>
+                  </a:solidFill>
+                  <a:effectLst/>
+                </a:rPr>
+                <a:t>=hash_1</a:t>
+              </a:r>
+            </a:p>
+            <a:p>
+              <a:pPr algn="ctr"/>
+              <a:r>
+                <a:rPr lang="en-US" sz="1200" b="1" u="sng" dirty="0">
+                  <a:solidFill>
+                    <a:schemeClr val="accent2">
+                      <a:lumMod val="50000"/>
+                    </a:schemeClr>
+                  </a:solidFill>
+                  <a:effectLst/>
+                </a:rPr>
+                <a:t>outputIndex</a:t>
+              </a:r>
+              <a:r>
+                <a:rPr lang="en-US" sz="1200" dirty="0">
+                  <a:solidFill>
+                    <a:schemeClr val="accent2">
+                      <a:lumMod val="50000"/>
+                    </a:schemeClr>
+                  </a:solidFill>
+                </a:rPr>
+                <a:t>=1</a:t>
+              </a:r>
+            </a:p>
+            <a:p>
+              <a:pPr algn="ctr"/>
+              <a:r>
+                <a:rPr lang="en-US" sz="1200" b="1" u="sng" dirty="0">
+                  <a:solidFill>
+                    <a:schemeClr val="accent2">
+                      <a:lumMod val="50000"/>
+                    </a:schemeClr>
+                  </a:solidFill>
+                </a:rPr>
+                <a:t>s</a:t>
+              </a:r>
+              <a:r>
+                <a:rPr lang="en-US" sz="1200" b="1" u="sng" dirty="0">
+                  <a:solidFill>
+                    <a:schemeClr val="accent2">
+                      <a:lumMod val="50000"/>
+                    </a:schemeClr>
+                  </a:solidFill>
+                  <a:effectLst/>
+                </a:rPr>
+                <a:t>ignature</a:t>
+              </a:r>
+              <a:r>
+                <a:rPr lang="en-US" sz="1200" dirty="0">
+                  <a:solidFill>
+                    <a:schemeClr val="accent2">
+                      <a:lumMod val="50000"/>
+                    </a:schemeClr>
+                  </a:solidFill>
+                </a:rPr>
+                <a:t>=?</a:t>
+              </a:r>
+              <a:endParaRPr lang="en-US" sz="1200" dirty="0">
                 <a:solidFill>
-                  <a:schemeClr val="accent1">
-                    <a:lumMod val="50000"/>
-                  </a:schemeClr>
-                </a:solidFill>
-              </a:rPr>
-              <a:t>output_</a:t>
-            </a:r>
-            <a:r>
-              <a:rPr lang="en-US" sz="1200" dirty="0">
-                <a:solidFill>
-                  <a:schemeClr val="accent1">
-                    <a:lumMod val="50000"/>
-                  </a:schemeClr>
-                </a:solidFill>
-              </a:rPr>
-              <a:t>1</a:t>
-            </a:r>
-            <a:endParaRPr lang="en-CN" sz="1200" dirty="0">
-              <a:solidFill>
-                <a:schemeClr val="accent1">
-                  <a:lumMod val="50000"/>
-                </a:schemeClr>
-              </a:solidFill>
-            </a:endParaRPr>
-          </a:p>
-        </p:txBody>
-      </p:sp>
-      <p:cxnSp>
-        <p:nvCxnSpPr>
-          <p:cNvPr id="37" name="Elbow Connector 36">
-            <a:extLst>
-              <a:ext uri="{FF2B5EF4-FFF2-40B4-BE49-F238E27FC236}">
-                <a16:creationId xmlns:a16="http://schemas.microsoft.com/office/drawing/2014/main" id="{1D3822AB-5FA2-9F43-9823-EE1837E75F83}"/>
-              </a:ext>
-            </a:extLst>
-          </p:cNvPr>
-          <p:cNvCxnSpPr>
-            <a:cxnSpLocks/>
-            <a:stCxn id="27" idx="3"/>
-            <a:endCxn id="48" idx="1"/>
-          </p:cNvCxnSpPr>
-          <p:nvPr/>
-        </p:nvCxnSpPr>
-        <p:spPr>
-          <a:xfrm flipV="1">
-            <a:off x="3639466" y="2399705"/>
-            <a:ext cx="1820129" cy="1143138"/>
-          </a:xfrm>
-          <a:prstGeom prst="bentConnector3">
-            <a:avLst>
-              <a:gd name="adj1" fmla="val 50000"/>
-            </a:avLst>
-          </a:prstGeom>
-          <a:ln w="12700">
-            <a:solidFill>
-              <a:schemeClr val="tx1"/>
-            </a:solidFill>
-            <a:tailEnd type="stealth" w="lg" len="lg"/>
-          </a:ln>
-        </p:spPr>
-        <p:style>
-          <a:lnRef idx="1">
-            <a:schemeClr val="accent1"/>
-          </a:lnRef>
-          <a:fillRef idx="0">
-            <a:schemeClr val="accent1"/>
-          </a:fillRef>
-          <a:effectRef idx="0">
-            <a:schemeClr val="accent1"/>
-          </a:effectRef>
-          <a:fontRef idx="minor">
-            <a:schemeClr val="tx1"/>
-          </a:fontRef>
-        </p:style>
-      </p:cxnSp>
-      <p:cxnSp>
-        <p:nvCxnSpPr>
-          <p:cNvPr id="56" name="Straight Arrow Connector 55">
-            <a:extLst>
-              <a:ext uri="{FF2B5EF4-FFF2-40B4-BE49-F238E27FC236}">
-                <a16:creationId xmlns:a16="http://schemas.microsoft.com/office/drawing/2014/main" id="{263F9595-391D-4646-9774-5382D9E62DD0}"/>
-              </a:ext>
-            </a:extLst>
-          </p:cNvPr>
-          <p:cNvCxnSpPr>
-            <a:cxnSpLocks/>
-            <a:stCxn id="48" idx="3"/>
-            <a:endCxn id="57" idx="1"/>
-          </p:cNvCxnSpPr>
-          <p:nvPr/>
-        </p:nvCxnSpPr>
-        <p:spPr>
-          <a:xfrm flipV="1">
-            <a:off x="6234981" y="2399704"/>
-            <a:ext cx="540328" cy="1"/>
-          </a:xfrm>
-          <a:prstGeom prst="straightConnector1">
-            <a:avLst/>
-          </a:prstGeom>
-          <a:ln w="12700">
-            <a:solidFill>
-              <a:schemeClr val="accent6"/>
-            </a:solidFill>
-            <a:prstDash val="sysDash"/>
-            <a:tailEnd type="stealth" w="lg" len="lg"/>
-          </a:ln>
-        </p:spPr>
-        <p:style>
-          <a:lnRef idx="1">
-            <a:schemeClr val="accent1"/>
-          </a:lnRef>
-          <a:fillRef idx="0">
-            <a:schemeClr val="accent1"/>
-          </a:fillRef>
-          <a:effectRef idx="0">
-            <a:schemeClr val="accent1"/>
-          </a:effectRef>
-          <a:fontRef idx="minor">
-            <a:schemeClr val="tx1"/>
-          </a:fontRef>
-        </p:style>
-      </p:cxnSp>
-      <p:sp>
-        <p:nvSpPr>
-          <p:cNvPr id="57" name="Rectangle 56">
-            <a:extLst>
-              <a:ext uri="{FF2B5EF4-FFF2-40B4-BE49-F238E27FC236}">
-                <a16:creationId xmlns:a16="http://schemas.microsoft.com/office/drawing/2014/main" id="{C8DC3330-54F3-A84B-AAE3-4BA879B641CA}"/>
-              </a:ext>
-            </a:extLst>
-          </p:cNvPr>
-          <p:cNvSpPr/>
-          <p:nvPr/>
-        </p:nvSpPr>
-        <p:spPr>
-          <a:xfrm>
-            <a:off x="6775309" y="2067119"/>
-            <a:ext cx="1643861" cy="665170"/>
-          </a:xfrm>
-          <a:prstGeom prst="rect">
-            <a:avLst/>
-          </a:prstGeom>
-          <a:noFill/>
-          <a:ln w="19050">
-            <a:solidFill>
-              <a:schemeClr val="accent6"/>
-            </a:solidFill>
-            <a:prstDash val="sysDash"/>
-          </a:ln>
-        </p:spPr>
-        <p:style>
-          <a:lnRef idx="2">
-            <a:schemeClr val="accent1">
-              <a:shade val="50000"/>
-            </a:schemeClr>
-          </a:lnRef>
-          <a:fillRef idx="1">
-            <a:schemeClr val="accent1"/>
-          </a:fillRef>
-          <a:effectRef idx="0">
-            <a:schemeClr val="accent1"/>
-          </a:effectRef>
-          <a:fontRef idx="minor">
-            <a:schemeClr val="lt1"/>
-          </a:fontRef>
-        </p:style>
-        <p:txBody>
-          <a:bodyPr rtlCol="0" anchor="ctr"/>
-          <a:lstStyle/>
-          <a:p>
-            <a:pPr algn="ctr"/>
-            <a:r>
-              <a:rPr lang="en-US" sz="1200" dirty="0">
-                <a:solidFill>
-                  <a:schemeClr val="accent6">
+                  <a:schemeClr val="accent2">
                     <a:lumMod val="50000"/>
                   </a:schemeClr>
                 </a:solidFill>
                 <a:effectLst/>
-              </a:rPr>
-              <a:t>prevTxHash=hash_1</a:t>
-            </a:r>
-          </a:p>
-          <a:p>
-            <a:pPr algn="ctr"/>
-            <a:r>
-              <a:rPr lang="en-US" sz="1200" dirty="0">
+              </a:endParaRPr>
+            </a:p>
+          </p:txBody>
+        </p:sp>
+        <p:sp>
+          <p:nvSpPr>
+            <p:cNvPr id="64" name="TextBox 63">
+              <a:extLst>
+                <a:ext uri="{FF2B5EF4-FFF2-40B4-BE49-F238E27FC236}">
+                  <a16:creationId xmlns:a16="http://schemas.microsoft.com/office/drawing/2014/main" id="{A1A2DAD1-840C-CA4F-92A9-1C9EBD577CD0}"/>
+                </a:ext>
+              </a:extLst>
+            </p:cNvPr>
+            <p:cNvSpPr txBox="1"/>
+            <p:nvPr/>
+          </p:nvSpPr>
+          <p:spPr>
+            <a:xfrm>
+              <a:off x="6900227" y="2623737"/>
+              <a:ext cx="357790" cy="369332"/>
+            </a:xfrm>
+            <a:prstGeom prst="rect">
+              <a:avLst/>
+            </a:prstGeom>
+            <a:noFill/>
+          </p:spPr>
+          <p:txBody>
+            <a:bodyPr wrap="none" rtlCol="0">
+              <a:spAutoFit/>
+            </a:bodyPr>
+            <a:lstStyle/>
+            <a:p>
+              <a:r>
+                <a:rPr lang="en-US" dirty="0">
+                  <a:solidFill>
+                    <a:schemeClr val="accent2">
+                      <a:lumMod val="50000"/>
+                    </a:schemeClr>
+                  </a:solidFill>
+                </a:rPr>
+                <a:t>·</a:t>
+              </a:r>
+              <a:r>
+                <a:rPr lang="en-US" altLang="zh-CN" dirty="0">
+                  <a:solidFill>
+                    <a:schemeClr val="accent2">
+                      <a:lumMod val="50000"/>
+                    </a:schemeClr>
+                  </a:solidFill>
+                </a:rPr>
+                <a:t>··</a:t>
+              </a:r>
+              <a:endParaRPr lang="en-CN" dirty="0">
                 <a:solidFill>
-                  <a:schemeClr val="accent6">
+                  <a:schemeClr val="accent2">
                     <a:lumMod val="50000"/>
                   </a:schemeClr>
                 </a:solidFill>
-                <a:effectLst/>
-              </a:rPr>
-              <a:t>outputIndex</a:t>
-            </a:r>
-            <a:r>
-              <a:rPr lang="en-US" sz="1200" dirty="0">
-                <a:solidFill>
-                  <a:schemeClr val="accent6">
-                    <a:lumMod val="50000"/>
-                  </a:schemeClr>
-                </a:solidFill>
-              </a:rPr>
-              <a:t>=0</a:t>
-            </a:r>
-          </a:p>
-          <a:p>
-            <a:pPr algn="ctr"/>
-            <a:r>
-              <a:rPr lang="en-US" sz="1200" dirty="0">
-                <a:solidFill>
-                  <a:schemeClr val="accent6">
-                    <a:lumMod val="50000"/>
-                  </a:schemeClr>
-                </a:solidFill>
-              </a:rPr>
-              <a:t>s</a:t>
-            </a:r>
-            <a:r>
-              <a:rPr lang="en-US" sz="1200" dirty="0">
-                <a:solidFill>
-                  <a:schemeClr val="accent6">
-                    <a:lumMod val="50000"/>
-                  </a:schemeClr>
-                </a:solidFill>
-                <a:effectLst/>
-              </a:rPr>
-              <a:t>ignature</a:t>
-            </a:r>
-            <a:r>
-              <a:rPr lang="en-US" sz="1200" dirty="0">
-                <a:solidFill>
-                  <a:schemeClr val="accent6">
-                    <a:lumMod val="50000"/>
-                  </a:schemeClr>
-                </a:solidFill>
-              </a:rPr>
-              <a:t>=?</a:t>
-            </a:r>
-            <a:endParaRPr lang="en-US" sz="1200" dirty="0">
+              </a:endParaRPr>
+            </a:p>
+          </p:txBody>
+        </p:sp>
+        <p:cxnSp>
+          <p:nvCxnSpPr>
+            <p:cNvPr id="65" name="Straight Arrow Connector 64">
+              <a:extLst>
+                <a:ext uri="{FF2B5EF4-FFF2-40B4-BE49-F238E27FC236}">
+                  <a16:creationId xmlns:a16="http://schemas.microsoft.com/office/drawing/2014/main" id="{00666833-DD83-E742-A51D-3EE37E7999C3}"/>
+                </a:ext>
+              </a:extLst>
+            </p:cNvPr>
+            <p:cNvCxnSpPr>
+              <a:cxnSpLocks/>
+              <a:stCxn id="51" idx="3"/>
+              <a:endCxn id="66" idx="1"/>
+            </p:cNvCxnSpPr>
+            <p:nvPr/>
+          </p:nvCxnSpPr>
+          <p:spPr>
+            <a:xfrm flipV="1">
+              <a:off x="7466815" y="3948865"/>
+              <a:ext cx="540328" cy="2677"/>
+            </a:xfrm>
+            <a:prstGeom prst="straightConnector1">
+              <a:avLst/>
+            </a:prstGeom>
+            <a:ln w="12700">
               <a:solidFill>
-                <a:schemeClr val="accent6">
-                  <a:lumMod val="50000"/>
-                </a:schemeClr>
+                <a:schemeClr val="accent1"/>
               </a:solidFill>
-              <a:effectLst/>
-            </a:endParaRPr>
-          </a:p>
-        </p:txBody>
-      </p:sp>
-      <p:sp>
-        <p:nvSpPr>
-          <p:cNvPr id="64" name="TextBox 63">
-            <a:extLst>
-              <a:ext uri="{FF2B5EF4-FFF2-40B4-BE49-F238E27FC236}">
-                <a16:creationId xmlns:a16="http://schemas.microsoft.com/office/drawing/2014/main" id="{A1A2DAD1-840C-CA4F-92A9-1C9EBD577CD0}"/>
-              </a:ext>
-            </a:extLst>
-          </p:cNvPr>
-          <p:cNvSpPr txBox="1"/>
-          <p:nvPr/>
-        </p:nvSpPr>
-        <p:spPr>
-          <a:xfrm>
-            <a:off x="5668393" y="2623737"/>
-            <a:ext cx="357790" cy="369332"/>
-          </a:xfrm>
-          <a:prstGeom prst="rect">
-            <a:avLst/>
-          </a:prstGeom>
-          <a:noFill/>
-        </p:spPr>
-        <p:txBody>
-          <a:bodyPr wrap="none" rtlCol="0">
-            <a:spAutoFit/>
-          </a:bodyPr>
-          <a:lstStyle/>
-          <a:p>
-            <a:r>
-              <a:rPr lang="en-US" dirty="0">
-                <a:solidFill>
-                  <a:schemeClr val="accent6">
-                    <a:lumMod val="50000"/>
-                  </a:schemeClr>
-                </a:solidFill>
-              </a:rPr>
-              <a:t>·</a:t>
-            </a:r>
-            <a:r>
-              <a:rPr lang="en-US" altLang="zh-CN" dirty="0">
-                <a:solidFill>
-                  <a:schemeClr val="accent6">
-                    <a:lumMod val="50000"/>
-                  </a:schemeClr>
-                </a:solidFill>
-              </a:rPr>
-              <a:t>··</a:t>
-            </a:r>
-            <a:endParaRPr lang="en-CN" dirty="0">
+              <a:prstDash val="sysDash"/>
+              <a:tailEnd type="stealth" w="lg" len="lg"/>
+            </a:ln>
+          </p:spPr>
+          <p:style>
+            <a:lnRef idx="1">
+              <a:schemeClr val="accent1"/>
+            </a:lnRef>
+            <a:fillRef idx="0">
+              <a:schemeClr val="accent1"/>
+            </a:fillRef>
+            <a:effectRef idx="0">
+              <a:schemeClr val="accent1"/>
+            </a:effectRef>
+            <a:fontRef idx="minor">
+              <a:schemeClr val="tx1"/>
+            </a:fontRef>
+          </p:style>
+        </p:cxnSp>
+        <p:sp>
+          <p:nvSpPr>
+            <p:cNvPr id="66" name="Rectangle 65">
+              <a:extLst>
+                <a:ext uri="{FF2B5EF4-FFF2-40B4-BE49-F238E27FC236}">
+                  <a16:creationId xmlns:a16="http://schemas.microsoft.com/office/drawing/2014/main" id="{ACA93623-DA3C-054B-B1A0-D3BEC6B5C33A}"/>
+                </a:ext>
+              </a:extLst>
+            </p:cNvPr>
+            <p:cNvSpPr/>
+            <p:nvPr/>
+          </p:nvSpPr>
+          <p:spPr>
+            <a:xfrm>
+              <a:off x="8007143" y="3616280"/>
+              <a:ext cx="1643861" cy="665170"/>
+            </a:xfrm>
+            <a:prstGeom prst="rect">
+              <a:avLst/>
+            </a:prstGeom>
+            <a:noFill/>
+            <a:ln w="19050">
               <a:solidFill>
-                <a:schemeClr val="accent6">
-                  <a:lumMod val="50000"/>
-                </a:schemeClr>
+                <a:schemeClr val="accent1"/>
               </a:solidFill>
-            </a:endParaRPr>
-          </a:p>
-        </p:txBody>
-      </p:sp>
-      <p:cxnSp>
-        <p:nvCxnSpPr>
-          <p:cNvPr id="65" name="Straight Arrow Connector 64">
-            <a:extLst>
-              <a:ext uri="{FF2B5EF4-FFF2-40B4-BE49-F238E27FC236}">
-                <a16:creationId xmlns:a16="http://schemas.microsoft.com/office/drawing/2014/main" id="{00666833-DD83-E742-A51D-3EE37E7999C3}"/>
-              </a:ext>
-            </a:extLst>
-          </p:cNvPr>
-          <p:cNvCxnSpPr>
-            <a:cxnSpLocks/>
-            <a:stCxn id="51" idx="3"/>
-            <a:endCxn id="66" idx="1"/>
-          </p:cNvCxnSpPr>
-          <p:nvPr/>
-        </p:nvCxnSpPr>
-        <p:spPr>
-          <a:xfrm flipV="1">
-            <a:off x="6234981" y="3948865"/>
-            <a:ext cx="540328" cy="2677"/>
-          </a:xfrm>
-          <a:prstGeom prst="straightConnector1">
-            <a:avLst/>
-          </a:prstGeom>
-          <a:ln w="12700">
-            <a:solidFill>
-              <a:schemeClr val="accent1"/>
-            </a:solidFill>
-            <a:prstDash val="sysDash"/>
-            <a:tailEnd type="stealth" w="lg" len="lg"/>
-          </a:ln>
-        </p:spPr>
-        <p:style>
-          <a:lnRef idx="1">
-            <a:schemeClr val="accent1"/>
-          </a:lnRef>
-          <a:fillRef idx="0">
-            <a:schemeClr val="accent1"/>
-          </a:fillRef>
-          <a:effectRef idx="0">
-            <a:schemeClr val="accent1"/>
-          </a:effectRef>
-          <a:fontRef idx="minor">
-            <a:schemeClr val="tx1"/>
-          </a:fontRef>
-        </p:style>
-      </p:cxnSp>
-      <p:sp>
-        <p:nvSpPr>
-          <p:cNvPr id="66" name="Rectangle 65">
-            <a:extLst>
-              <a:ext uri="{FF2B5EF4-FFF2-40B4-BE49-F238E27FC236}">
-                <a16:creationId xmlns:a16="http://schemas.microsoft.com/office/drawing/2014/main" id="{ACA93623-DA3C-054B-B1A0-D3BEC6B5C33A}"/>
-              </a:ext>
-            </a:extLst>
-          </p:cNvPr>
-          <p:cNvSpPr/>
-          <p:nvPr/>
-        </p:nvSpPr>
-        <p:spPr>
-          <a:xfrm>
-            <a:off x="6775309" y="3616280"/>
-            <a:ext cx="1643861" cy="665170"/>
-          </a:xfrm>
-          <a:prstGeom prst="rect">
-            <a:avLst/>
-          </a:prstGeom>
-          <a:noFill/>
-          <a:ln w="19050">
-            <a:solidFill>
-              <a:schemeClr val="accent1"/>
-            </a:solidFill>
-            <a:prstDash val="sysDash"/>
-          </a:ln>
-        </p:spPr>
-        <p:style>
-          <a:lnRef idx="2">
-            <a:schemeClr val="accent1">
-              <a:shade val="50000"/>
-            </a:schemeClr>
-          </a:lnRef>
-          <a:fillRef idx="1">
-            <a:schemeClr val="accent1"/>
-          </a:fillRef>
-          <a:effectRef idx="0">
-            <a:schemeClr val="accent1"/>
-          </a:effectRef>
-          <a:fontRef idx="minor">
-            <a:schemeClr val="lt1"/>
-          </a:fontRef>
-        </p:style>
-        <p:txBody>
-          <a:bodyPr rtlCol="0" anchor="ctr"/>
-          <a:lstStyle/>
-          <a:p>
-            <a:pPr algn="ctr"/>
-            <a:r>
-              <a:rPr lang="en-US" sz="1200" dirty="0">
+              <a:prstDash val="sysDash"/>
+            </a:ln>
+          </p:spPr>
+          <p:style>
+            <a:lnRef idx="2">
+              <a:schemeClr val="accent1">
+                <a:shade val="50000"/>
+              </a:schemeClr>
+            </a:lnRef>
+            <a:fillRef idx="1">
+              <a:schemeClr val="accent1"/>
+            </a:fillRef>
+            <a:effectRef idx="0">
+              <a:schemeClr val="accent1"/>
+            </a:effectRef>
+            <a:fontRef idx="minor">
+              <a:schemeClr val="lt1"/>
+            </a:fontRef>
+          </p:style>
+          <p:txBody>
+            <a:bodyPr rtlCol="0" anchor="ctr"/>
+            <a:lstStyle/>
+            <a:p>
+              <a:pPr algn="ctr"/>
+              <a:r>
+                <a:rPr lang="en-US" sz="1200" b="1" u="sng" dirty="0">
+                  <a:solidFill>
+                    <a:schemeClr val="accent1">
+                      <a:lumMod val="50000"/>
+                    </a:schemeClr>
+                  </a:solidFill>
+                  <a:effectLst/>
+                </a:rPr>
+                <a:t>value</a:t>
+              </a:r>
+              <a:r>
+                <a:rPr lang="en-US" altLang="zh-CN" sz="1200" dirty="0">
+                  <a:solidFill>
+                    <a:schemeClr val="accent1">
+                      <a:lumMod val="50000"/>
+                    </a:schemeClr>
+                  </a:solidFill>
+                  <a:effectLst/>
+                </a:rPr>
+                <a:t>=10</a:t>
+              </a:r>
+              <a:endParaRPr lang="en-US" sz="1200" dirty="0">
                 <a:solidFill>
                   <a:schemeClr val="accent1">
                     <a:lumMod val="50000"/>
                   </a:schemeClr>
                 </a:solidFill>
                 <a:effectLst/>
-              </a:rPr>
-              <a:t>value</a:t>
-            </a:r>
-            <a:r>
-              <a:rPr lang="en-US" altLang="zh-CN" sz="1200" dirty="0">
+              </a:endParaRPr>
+            </a:p>
+            <a:p>
+              <a:pPr algn="ctr"/>
+              <a:r>
+                <a:rPr lang="en-US" sz="1200" b="1" u="sng" dirty="0">
+                  <a:solidFill>
+                    <a:schemeClr val="accent1">
+                      <a:lumMod val="50000"/>
+                    </a:schemeClr>
+                  </a:solidFill>
+                  <a:effectLst/>
+                </a:rPr>
+                <a:t>address</a:t>
+              </a:r>
+              <a:r>
+                <a:rPr lang="en-US" altLang="zh-CN" sz="1200" dirty="0">
+                  <a:solidFill>
+                    <a:schemeClr val="accent1">
+                      <a:lumMod val="50000"/>
+                    </a:schemeClr>
+                  </a:solidFill>
+                  <a:effectLst/>
+                </a:rPr>
+                <a:t>=?</a:t>
+              </a:r>
+              <a:endParaRPr lang="en-US" sz="1200" dirty="0">
                 <a:solidFill>
                   <a:schemeClr val="accent1">
                     <a:lumMod val="50000"/>
                   </a:schemeClr>
                 </a:solidFill>
                 <a:effectLst/>
-              </a:rPr>
-              <a:t>=10</a:t>
-            </a:r>
-            <a:endParaRPr lang="en-US" sz="1200" dirty="0">
-              <a:solidFill>
-                <a:schemeClr val="accent1">
-                  <a:lumMod val="50000"/>
-                </a:schemeClr>
-              </a:solidFill>
-              <a:effectLst/>
-            </a:endParaRPr>
-          </a:p>
-          <a:p>
-            <a:pPr algn="ctr"/>
-            <a:r>
-              <a:rPr lang="en-US" sz="1200" dirty="0">
+              </a:endParaRPr>
+            </a:p>
+          </p:txBody>
+        </p:sp>
+        <p:sp>
+          <p:nvSpPr>
+            <p:cNvPr id="70" name="TextBox 69">
+              <a:extLst>
+                <a:ext uri="{FF2B5EF4-FFF2-40B4-BE49-F238E27FC236}">
+                  <a16:creationId xmlns:a16="http://schemas.microsoft.com/office/drawing/2014/main" id="{5DD17A14-847F-F94B-9973-663F47403485}"/>
+                </a:ext>
+              </a:extLst>
+            </p:cNvPr>
+            <p:cNvSpPr txBox="1"/>
+            <p:nvPr/>
+          </p:nvSpPr>
+          <p:spPr>
+            <a:xfrm>
+              <a:off x="6900227" y="4172124"/>
+              <a:ext cx="357790" cy="369332"/>
+            </a:xfrm>
+            <a:prstGeom prst="rect">
+              <a:avLst/>
+            </a:prstGeom>
+            <a:noFill/>
+          </p:spPr>
+          <p:txBody>
+            <a:bodyPr wrap="none" rtlCol="0">
+              <a:spAutoFit/>
+            </a:bodyPr>
+            <a:lstStyle/>
+            <a:p>
+              <a:r>
+                <a:rPr lang="en-US" dirty="0">
+                  <a:solidFill>
+                    <a:schemeClr val="accent1">
+                      <a:lumMod val="50000"/>
+                    </a:schemeClr>
+                  </a:solidFill>
+                </a:rPr>
+                <a:t>·</a:t>
+              </a:r>
+              <a:r>
+                <a:rPr lang="en-US" altLang="zh-CN" dirty="0">
+                  <a:solidFill>
+                    <a:schemeClr val="accent1">
+                      <a:lumMod val="50000"/>
+                    </a:schemeClr>
+                  </a:solidFill>
+                </a:rPr>
+                <a:t>··</a:t>
+              </a:r>
+              <a:endParaRPr lang="en-CN" dirty="0">
                 <a:solidFill>
                   <a:schemeClr val="accent1">
                     <a:lumMod val="50000"/>
                   </a:schemeClr>
                 </a:solidFill>
-                <a:effectLst/>
-              </a:rPr>
-              <a:t>address</a:t>
-            </a:r>
-            <a:r>
-              <a:rPr lang="en-US" altLang="zh-CN" sz="1200" dirty="0">
+              </a:endParaRPr>
+            </a:p>
+          </p:txBody>
+        </p:sp>
+        <p:cxnSp>
+          <p:nvCxnSpPr>
+            <p:cNvPr id="81" name="Straight Arrow Connector 80">
+              <a:extLst>
+                <a:ext uri="{FF2B5EF4-FFF2-40B4-BE49-F238E27FC236}">
+                  <a16:creationId xmlns:a16="http://schemas.microsoft.com/office/drawing/2014/main" id="{F4750DA7-F8A2-9A4D-B455-B34DB5B653ED}"/>
+                </a:ext>
+              </a:extLst>
+            </p:cNvPr>
+            <p:cNvCxnSpPr>
+              <a:cxnSpLocks/>
+              <a:endCxn id="20" idx="1"/>
+            </p:cNvCxnSpPr>
+            <p:nvPr/>
+          </p:nvCxnSpPr>
+          <p:spPr>
+            <a:xfrm>
+              <a:off x="2263916" y="1991006"/>
+              <a:ext cx="600164" cy="0"/>
+            </a:xfrm>
+            <a:prstGeom prst="straightConnector1">
+              <a:avLst/>
+            </a:prstGeom>
+            <a:ln w="12700">
+              <a:solidFill>
+                <a:schemeClr val="tx1"/>
+              </a:solidFill>
+              <a:prstDash val="solid"/>
+              <a:tailEnd type="stealth" w="lg" len="lg"/>
+            </a:ln>
+          </p:spPr>
+          <p:style>
+            <a:lnRef idx="1">
+              <a:schemeClr val="accent1"/>
+            </a:lnRef>
+            <a:fillRef idx="0">
+              <a:schemeClr val="accent1"/>
+            </a:fillRef>
+            <a:effectRef idx="0">
+              <a:schemeClr val="accent1"/>
+            </a:effectRef>
+            <a:fontRef idx="minor">
+              <a:schemeClr val="tx1"/>
+            </a:fontRef>
+          </p:style>
+        </p:cxnSp>
+        <p:cxnSp>
+          <p:nvCxnSpPr>
+            <p:cNvPr id="88" name="Straight Arrow Connector 87">
+              <a:extLst>
+                <a:ext uri="{FF2B5EF4-FFF2-40B4-BE49-F238E27FC236}">
+                  <a16:creationId xmlns:a16="http://schemas.microsoft.com/office/drawing/2014/main" id="{E10AE211-ED01-A34B-93AA-DAC410F0333F}"/>
+                </a:ext>
+              </a:extLst>
+            </p:cNvPr>
+            <p:cNvCxnSpPr>
+              <a:cxnSpLocks/>
+              <a:endCxn id="47" idx="1"/>
+            </p:cNvCxnSpPr>
+            <p:nvPr/>
+          </p:nvCxnSpPr>
+          <p:spPr>
+            <a:xfrm>
+              <a:off x="6096000" y="1991005"/>
+              <a:ext cx="595429" cy="1"/>
+            </a:xfrm>
+            <a:prstGeom prst="straightConnector1">
+              <a:avLst/>
+            </a:prstGeom>
+            <a:ln w="12700">
+              <a:solidFill>
+                <a:schemeClr val="tx1"/>
+              </a:solidFill>
+              <a:prstDash val="solid"/>
+              <a:tailEnd type="stealth" w="lg" len="lg"/>
+            </a:ln>
+          </p:spPr>
+          <p:style>
+            <a:lnRef idx="1">
+              <a:schemeClr val="accent1"/>
+            </a:lnRef>
+            <a:fillRef idx="0">
+              <a:schemeClr val="accent1"/>
+            </a:fillRef>
+            <a:effectRef idx="0">
+              <a:schemeClr val="accent1"/>
+            </a:effectRef>
+            <a:fontRef idx="minor">
+              <a:schemeClr val="tx1"/>
+            </a:fontRef>
+          </p:style>
+        </p:cxnSp>
+        <p:cxnSp>
+          <p:nvCxnSpPr>
+            <p:cNvPr id="93" name="Straight Arrow Connector 92">
+              <a:extLst>
+                <a:ext uri="{FF2B5EF4-FFF2-40B4-BE49-F238E27FC236}">
+                  <a16:creationId xmlns:a16="http://schemas.microsoft.com/office/drawing/2014/main" id="{96F9657D-CFA4-E948-909D-FA4CB62C5083}"/>
+                </a:ext>
+              </a:extLst>
+            </p:cNvPr>
+            <p:cNvCxnSpPr>
+              <a:cxnSpLocks/>
+            </p:cNvCxnSpPr>
+            <p:nvPr/>
+          </p:nvCxnSpPr>
+          <p:spPr>
+            <a:xfrm>
+              <a:off x="2263916" y="2399704"/>
+              <a:ext cx="600164" cy="0"/>
+            </a:xfrm>
+            <a:prstGeom prst="straightConnector1">
+              <a:avLst/>
+            </a:prstGeom>
+            <a:ln w="12700">
+              <a:solidFill>
+                <a:schemeClr val="tx1"/>
+              </a:solidFill>
+              <a:prstDash val="solid"/>
+              <a:tailEnd type="stealth" w="lg" len="lg"/>
+            </a:ln>
+          </p:spPr>
+          <p:style>
+            <a:lnRef idx="1">
+              <a:schemeClr val="accent1"/>
+            </a:lnRef>
+            <a:fillRef idx="0">
+              <a:schemeClr val="accent1"/>
+            </a:fillRef>
+            <a:effectRef idx="0">
+              <a:schemeClr val="accent1"/>
+            </a:effectRef>
+            <a:fontRef idx="minor">
+              <a:schemeClr val="tx1"/>
+            </a:fontRef>
+          </p:style>
+        </p:cxnSp>
+        <p:cxnSp>
+          <p:nvCxnSpPr>
+            <p:cNvPr id="94" name="Straight Arrow Connector 93">
+              <a:extLst>
+                <a:ext uri="{FF2B5EF4-FFF2-40B4-BE49-F238E27FC236}">
+                  <a16:creationId xmlns:a16="http://schemas.microsoft.com/office/drawing/2014/main" id="{855E2B35-0E9F-0240-86B6-8E8F2F629225}"/>
+                </a:ext>
+              </a:extLst>
+            </p:cNvPr>
+            <p:cNvCxnSpPr>
+              <a:cxnSpLocks/>
+            </p:cNvCxnSpPr>
+            <p:nvPr/>
+          </p:nvCxnSpPr>
+          <p:spPr>
+            <a:xfrm>
+              <a:off x="2264008" y="2808403"/>
+              <a:ext cx="600164" cy="0"/>
+            </a:xfrm>
+            <a:prstGeom prst="straightConnector1">
+              <a:avLst/>
+            </a:prstGeom>
+            <a:ln w="12700">
+              <a:solidFill>
+                <a:schemeClr val="tx1"/>
+              </a:solidFill>
+              <a:prstDash val="solid"/>
+              <a:tailEnd type="stealth" w="lg" len="lg"/>
+            </a:ln>
+          </p:spPr>
+          <p:style>
+            <a:lnRef idx="1">
+              <a:schemeClr val="accent1"/>
+            </a:lnRef>
+            <a:fillRef idx="0">
+              <a:schemeClr val="accent1"/>
+            </a:fillRef>
+            <a:effectRef idx="0">
+              <a:schemeClr val="accent1"/>
+            </a:effectRef>
+            <a:fontRef idx="minor">
+              <a:schemeClr val="tx1"/>
+            </a:fontRef>
+          </p:style>
+        </p:cxnSp>
+        <p:sp>
+          <p:nvSpPr>
+            <p:cNvPr id="100" name="Rectangle 99">
+              <a:extLst>
+                <a:ext uri="{FF2B5EF4-FFF2-40B4-BE49-F238E27FC236}">
+                  <a16:creationId xmlns:a16="http://schemas.microsoft.com/office/drawing/2014/main" id="{7C977875-8EB8-6344-A902-5ADF96A38CF9}"/>
+                </a:ext>
+              </a:extLst>
+            </p:cNvPr>
+            <p:cNvSpPr/>
+            <p:nvPr/>
+          </p:nvSpPr>
+          <p:spPr>
+            <a:xfrm>
+              <a:off x="4237627" y="3318822"/>
+              <a:ext cx="1846180" cy="1554512"/>
+            </a:xfrm>
+            <a:prstGeom prst="rect">
+              <a:avLst/>
+            </a:prstGeom>
+            <a:noFill/>
+            <a:ln w="19050">
+              <a:solidFill>
+                <a:schemeClr val="accent6"/>
+              </a:solidFill>
+            </a:ln>
+          </p:spPr>
+          <p:style>
+            <a:lnRef idx="2">
+              <a:schemeClr val="accent1">
+                <a:shade val="50000"/>
+              </a:schemeClr>
+            </a:lnRef>
+            <a:fillRef idx="1">
+              <a:schemeClr val="accent1"/>
+            </a:fillRef>
+            <a:effectRef idx="0">
+              <a:schemeClr val="accent1"/>
+            </a:effectRef>
+            <a:fontRef idx="minor">
+              <a:schemeClr val="lt1"/>
+            </a:fontRef>
+          </p:style>
+          <p:txBody>
+            <a:bodyPr rtlCol="0" anchor="ctr"/>
+            <a:lstStyle/>
+            <a:p>
+              <a:pPr algn="ctr"/>
+              <a:endParaRPr lang="en-CN">
                 <a:solidFill>
-                  <a:schemeClr val="accent1">
+                  <a:schemeClr val="accent6">
                     <a:lumMod val="50000"/>
                   </a:schemeClr>
                 </a:solidFill>
-                <a:effectLst/>
-              </a:rPr>
-              <a:t>=?</a:t>
-            </a:r>
-            <a:endParaRPr lang="en-US" sz="1200" dirty="0">
+              </a:endParaRPr>
+            </a:p>
+          </p:txBody>
+        </p:sp>
+        <p:sp>
+          <p:nvSpPr>
+            <p:cNvPr id="101" name="Rectangle 100">
+              <a:extLst>
+                <a:ext uri="{FF2B5EF4-FFF2-40B4-BE49-F238E27FC236}">
+                  <a16:creationId xmlns:a16="http://schemas.microsoft.com/office/drawing/2014/main" id="{3F711A4F-24A0-B94E-8746-BDD3737EF0E3}"/>
+                </a:ext>
+              </a:extLst>
+            </p:cNvPr>
+            <p:cNvSpPr/>
+            <p:nvPr/>
+          </p:nvSpPr>
+          <p:spPr>
+            <a:xfrm>
+              <a:off x="4522315" y="3397333"/>
+              <a:ext cx="1281634" cy="291737"/>
+            </a:xfrm>
+            <a:prstGeom prst="rect">
+              <a:avLst/>
+            </a:prstGeom>
+            <a:noFill/>
+            <a:ln w="19050">
               <a:solidFill>
-                <a:schemeClr val="accent1">
+                <a:schemeClr val="accent6"/>
+              </a:solidFill>
+            </a:ln>
+          </p:spPr>
+          <p:style>
+            <a:lnRef idx="2">
+              <a:schemeClr val="accent1">
+                <a:shade val="50000"/>
+              </a:schemeClr>
+            </a:lnRef>
+            <a:fillRef idx="1">
+              <a:schemeClr val="accent1"/>
+            </a:fillRef>
+            <a:effectRef idx="0">
+              <a:schemeClr val="accent1"/>
+            </a:effectRef>
+            <a:fontRef idx="minor">
+              <a:schemeClr val="lt1"/>
+            </a:fontRef>
+          </p:style>
+          <p:txBody>
+            <a:bodyPr rtlCol="0" anchor="ctr"/>
+            <a:lstStyle/>
+            <a:p>
+              <a:pPr algn="ctr"/>
+              <a:r>
+                <a:rPr lang="en-CN" sz="1200" dirty="0">
+                  <a:solidFill>
+                    <a:schemeClr val="accent6">
+                      <a:lumMod val="50000"/>
+                    </a:schemeClr>
+                  </a:solidFill>
+                </a:rPr>
+                <a:t>utxo_</a:t>
+              </a:r>
+              <a:r>
+                <a:rPr lang="en-US" sz="1200" dirty="0">
+                  <a:solidFill>
+                    <a:schemeClr val="accent6">
+                      <a:lumMod val="50000"/>
+                    </a:schemeClr>
+                  </a:solidFill>
+                </a:rPr>
+                <a:t>a: output_0</a:t>
+              </a:r>
+              <a:endParaRPr lang="en-CN" sz="1200" dirty="0">
+                <a:solidFill>
+                  <a:schemeClr val="accent6">
+                    <a:lumMod val="50000"/>
+                  </a:schemeClr>
+                </a:solidFill>
+              </a:endParaRPr>
+            </a:p>
+          </p:txBody>
+        </p:sp>
+        <p:sp>
+          <p:nvSpPr>
+            <p:cNvPr id="102" name="Rectangle 101">
+              <a:extLst>
+                <a:ext uri="{FF2B5EF4-FFF2-40B4-BE49-F238E27FC236}">
+                  <a16:creationId xmlns:a16="http://schemas.microsoft.com/office/drawing/2014/main" id="{3AAB5757-F3E7-1945-BE2D-0715ED1312A7}"/>
+                </a:ext>
+              </a:extLst>
+            </p:cNvPr>
+            <p:cNvSpPr/>
+            <p:nvPr/>
+          </p:nvSpPr>
+          <p:spPr>
+            <a:xfrm>
+              <a:off x="4522315" y="3805707"/>
+              <a:ext cx="1281634" cy="291737"/>
+            </a:xfrm>
+            <a:prstGeom prst="rect">
+              <a:avLst/>
+            </a:prstGeom>
+            <a:noFill/>
+            <a:ln w="19050">
+              <a:solidFill>
+                <a:schemeClr val="accent6"/>
+              </a:solidFill>
+            </a:ln>
+          </p:spPr>
+          <p:style>
+            <a:lnRef idx="2">
+              <a:schemeClr val="accent1">
+                <a:shade val="50000"/>
+              </a:schemeClr>
+            </a:lnRef>
+            <a:fillRef idx="1">
+              <a:schemeClr val="accent1"/>
+            </a:fillRef>
+            <a:effectRef idx="0">
+              <a:schemeClr val="accent1"/>
+            </a:effectRef>
+            <a:fontRef idx="minor">
+              <a:schemeClr val="lt1"/>
+            </a:fontRef>
+          </p:style>
+          <p:txBody>
+            <a:bodyPr rtlCol="0" anchor="ctr"/>
+            <a:lstStyle/>
+            <a:p>
+              <a:pPr algn="ctr"/>
+              <a:r>
+                <a:rPr lang="en-CN" sz="1200" dirty="0">
+                  <a:solidFill>
+                    <a:schemeClr val="accent6">
+                      <a:lumMod val="50000"/>
+                    </a:schemeClr>
+                  </a:solidFill>
+                </a:rPr>
+                <a:t>utxo_</a:t>
+              </a:r>
+              <a:r>
+                <a:rPr lang="en-US" sz="1200" dirty="0">
+                  <a:solidFill>
+                    <a:schemeClr val="accent6">
+                      <a:lumMod val="50000"/>
+                    </a:schemeClr>
+                  </a:solidFill>
+                </a:rPr>
+                <a:t>b: output_1</a:t>
+              </a:r>
+              <a:endParaRPr lang="en-CN" sz="1200" dirty="0">
+                <a:solidFill>
+                  <a:schemeClr val="accent6">
+                    <a:lumMod val="50000"/>
+                  </a:schemeClr>
+                </a:solidFill>
+              </a:endParaRPr>
+            </a:p>
+          </p:txBody>
+        </p:sp>
+        <p:sp>
+          <p:nvSpPr>
+            <p:cNvPr id="103" name="Rectangle 102">
+              <a:extLst>
+                <a:ext uri="{FF2B5EF4-FFF2-40B4-BE49-F238E27FC236}">
+                  <a16:creationId xmlns:a16="http://schemas.microsoft.com/office/drawing/2014/main" id="{B92EDF7C-B88A-D64E-BEF0-6ABFAEC5E211}"/>
+                </a:ext>
+              </a:extLst>
+            </p:cNvPr>
+            <p:cNvSpPr/>
+            <p:nvPr/>
+          </p:nvSpPr>
+          <p:spPr>
+            <a:xfrm>
+              <a:off x="4522314" y="4214372"/>
+              <a:ext cx="1281633" cy="291737"/>
+            </a:xfrm>
+            <a:prstGeom prst="rect">
+              <a:avLst/>
+            </a:prstGeom>
+            <a:noFill/>
+            <a:ln w="19050">
+              <a:solidFill>
+                <a:schemeClr val="accent6"/>
+              </a:solidFill>
+            </a:ln>
+          </p:spPr>
+          <p:style>
+            <a:lnRef idx="2">
+              <a:schemeClr val="accent1">
+                <a:shade val="50000"/>
+              </a:schemeClr>
+            </a:lnRef>
+            <a:fillRef idx="1">
+              <a:schemeClr val="accent1"/>
+            </a:fillRef>
+            <a:effectRef idx="0">
+              <a:schemeClr val="accent1"/>
+            </a:effectRef>
+            <a:fontRef idx="minor">
+              <a:schemeClr val="lt1"/>
+            </a:fontRef>
+          </p:style>
+          <p:txBody>
+            <a:bodyPr rtlCol="0" anchor="ctr"/>
+            <a:lstStyle/>
+            <a:p>
+              <a:pPr algn="ctr"/>
+              <a:r>
+                <a:rPr lang="en-CN" sz="1200" dirty="0">
+                  <a:solidFill>
+                    <a:schemeClr val="accent6">
+                      <a:lumMod val="50000"/>
+                    </a:schemeClr>
+                  </a:solidFill>
+                </a:rPr>
+                <a:t>utxo</a:t>
+              </a:r>
+              <a:r>
+                <a:rPr lang="en-US" sz="1200" dirty="0">
+                  <a:solidFill>
+                    <a:schemeClr val="accent6">
+                      <a:lumMod val="50000"/>
+                    </a:schemeClr>
+                  </a:solidFill>
+                </a:rPr>
+                <a:t>_c: </a:t>
+              </a:r>
+              <a:r>
+                <a:rPr lang="en-US" sz="1200" dirty="0" err="1">
+                  <a:solidFill>
+                    <a:schemeClr val="accent6">
+                      <a:lumMod val="50000"/>
+                    </a:schemeClr>
+                  </a:solidFill>
+                </a:rPr>
+                <a:t>output_n</a:t>
+              </a:r>
+              <a:endParaRPr lang="en-CN" sz="1200" dirty="0">
+                <a:solidFill>
+                  <a:schemeClr val="accent6">
+                    <a:lumMod val="50000"/>
+                  </a:schemeClr>
+                </a:solidFill>
+              </a:endParaRPr>
+            </a:p>
+          </p:txBody>
+        </p:sp>
+        <p:cxnSp>
+          <p:nvCxnSpPr>
+            <p:cNvPr id="74" name="Straight Arrow Connector 73">
+              <a:extLst>
+                <a:ext uri="{FF2B5EF4-FFF2-40B4-BE49-F238E27FC236}">
+                  <a16:creationId xmlns:a16="http://schemas.microsoft.com/office/drawing/2014/main" id="{A16412D8-FDE4-5F42-A360-6D892189EF06}"/>
+                </a:ext>
+              </a:extLst>
+            </p:cNvPr>
+            <p:cNvCxnSpPr>
+              <a:cxnSpLocks/>
+              <a:stCxn id="28" idx="3"/>
+              <a:endCxn id="102" idx="1"/>
+            </p:cNvCxnSpPr>
+            <p:nvPr/>
+          </p:nvCxnSpPr>
+          <p:spPr>
+            <a:xfrm>
+              <a:off x="3639466" y="3951542"/>
+              <a:ext cx="882849" cy="34"/>
+            </a:xfrm>
+            <a:prstGeom prst="straightConnector1">
+              <a:avLst/>
+            </a:prstGeom>
+            <a:ln w="12700">
+              <a:solidFill>
+                <a:schemeClr val="tx1"/>
+              </a:solidFill>
+              <a:prstDash val="solid"/>
+              <a:tailEnd type="stealth" w="lg" len="lg"/>
+            </a:ln>
+          </p:spPr>
+          <p:style>
+            <a:lnRef idx="1">
+              <a:schemeClr val="accent1"/>
+            </a:lnRef>
+            <a:fillRef idx="0">
+              <a:schemeClr val="accent1"/>
+            </a:fillRef>
+            <a:effectRef idx="0">
+              <a:schemeClr val="accent1"/>
+            </a:effectRef>
+            <a:fontRef idx="minor">
+              <a:schemeClr val="tx1"/>
+            </a:fontRef>
+          </p:style>
+        </p:cxnSp>
+        <p:cxnSp>
+          <p:nvCxnSpPr>
+            <p:cNvPr id="79" name="Straight Arrow Connector 78">
+              <a:extLst>
+                <a:ext uri="{FF2B5EF4-FFF2-40B4-BE49-F238E27FC236}">
+                  <a16:creationId xmlns:a16="http://schemas.microsoft.com/office/drawing/2014/main" id="{C07CB2F5-FBC1-FF41-9A98-C19E4B9E12C2}"/>
+                </a:ext>
+              </a:extLst>
+            </p:cNvPr>
+            <p:cNvCxnSpPr>
+              <a:cxnSpLocks/>
+              <a:stCxn id="29" idx="3"/>
+              <a:endCxn id="103" idx="1"/>
+            </p:cNvCxnSpPr>
+            <p:nvPr/>
+          </p:nvCxnSpPr>
+          <p:spPr>
+            <a:xfrm>
+              <a:off x="3639466" y="4360241"/>
+              <a:ext cx="882848" cy="0"/>
+            </a:xfrm>
+            <a:prstGeom prst="straightConnector1">
+              <a:avLst/>
+            </a:prstGeom>
+            <a:ln w="12700">
+              <a:solidFill>
+                <a:schemeClr val="tx1"/>
+              </a:solidFill>
+              <a:prstDash val="solid"/>
+              <a:tailEnd type="stealth" w="lg" len="lg"/>
+            </a:ln>
+          </p:spPr>
+          <p:style>
+            <a:lnRef idx="1">
+              <a:schemeClr val="accent1"/>
+            </a:lnRef>
+            <a:fillRef idx="0">
+              <a:schemeClr val="accent1"/>
+            </a:fillRef>
+            <a:effectRef idx="0">
+              <a:schemeClr val="accent1"/>
+            </a:effectRef>
+            <a:fontRef idx="minor">
+              <a:schemeClr val="tx1"/>
+            </a:fontRef>
+          </p:style>
+        </p:cxnSp>
+        <p:cxnSp>
+          <p:nvCxnSpPr>
+            <p:cNvPr id="97" name="Straight Arrow Connector 96">
+              <a:extLst>
+                <a:ext uri="{FF2B5EF4-FFF2-40B4-BE49-F238E27FC236}">
+                  <a16:creationId xmlns:a16="http://schemas.microsoft.com/office/drawing/2014/main" id="{217F1349-D5FC-CB4C-AC96-7E8EB44B0124}"/>
+                </a:ext>
+              </a:extLst>
+            </p:cNvPr>
+            <p:cNvCxnSpPr>
+              <a:cxnSpLocks/>
+              <a:stCxn id="27" idx="3"/>
+              <a:endCxn id="101" idx="1"/>
+            </p:cNvCxnSpPr>
+            <p:nvPr/>
+          </p:nvCxnSpPr>
+          <p:spPr>
+            <a:xfrm>
+              <a:off x="3639466" y="3542843"/>
+              <a:ext cx="882849" cy="359"/>
+            </a:xfrm>
+            <a:prstGeom prst="straightConnector1">
+              <a:avLst/>
+            </a:prstGeom>
+            <a:ln w="12700">
+              <a:solidFill>
+                <a:schemeClr val="tx1"/>
+              </a:solidFill>
+              <a:prstDash val="solid"/>
+              <a:tailEnd type="stealth" w="lg" len="lg"/>
+            </a:ln>
+          </p:spPr>
+          <p:style>
+            <a:lnRef idx="1">
+              <a:schemeClr val="accent1"/>
+            </a:lnRef>
+            <a:fillRef idx="0">
+              <a:schemeClr val="accent1"/>
+            </a:fillRef>
+            <a:effectRef idx="0">
+              <a:schemeClr val="accent1"/>
+            </a:effectRef>
+            <a:fontRef idx="minor">
+              <a:schemeClr val="tx1"/>
+            </a:fontRef>
+          </p:style>
+        </p:cxnSp>
+        <p:sp>
+          <p:nvSpPr>
+            <p:cNvPr id="107" name="TextBox 106">
+              <a:extLst>
+                <a:ext uri="{FF2B5EF4-FFF2-40B4-BE49-F238E27FC236}">
+                  <a16:creationId xmlns:a16="http://schemas.microsoft.com/office/drawing/2014/main" id="{ABB619D8-E4BB-354D-87CD-F8E256CC5F5E}"/>
+                </a:ext>
+              </a:extLst>
+            </p:cNvPr>
+            <p:cNvSpPr txBox="1"/>
+            <p:nvPr/>
+          </p:nvSpPr>
+          <p:spPr>
+            <a:xfrm>
+              <a:off x="4503311" y="4873334"/>
+              <a:ext cx="1319645" cy="369332"/>
+            </a:xfrm>
+            <a:prstGeom prst="rect">
+              <a:avLst/>
+            </a:prstGeom>
+            <a:noFill/>
+          </p:spPr>
+          <p:txBody>
+            <a:bodyPr wrap="square" rtlCol="0">
+              <a:spAutoFit/>
+            </a:bodyPr>
+            <a:lstStyle/>
+            <a:p>
+              <a:pPr algn="ctr"/>
+              <a:r>
+                <a:rPr lang="en-CN" b="1" dirty="0">
+                  <a:latin typeface="Times New Roman" panose="02020603050405020304" pitchFamily="18" charset="0"/>
+                  <a:cs typeface="Times New Roman" panose="02020603050405020304" pitchFamily="18" charset="0"/>
+                </a:rPr>
+                <a:t>UTXOPool</a:t>
+              </a:r>
+            </a:p>
+          </p:txBody>
+        </p:sp>
+        <p:sp>
+          <p:nvSpPr>
+            <p:cNvPr id="127" name="Cross 126">
+              <a:extLst>
+                <a:ext uri="{FF2B5EF4-FFF2-40B4-BE49-F238E27FC236}">
+                  <a16:creationId xmlns:a16="http://schemas.microsoft.com/office/drawing/2014/main" id="{BB9EBC05-B146-1740-BCCB-C2D60D23B198}"/>
+                </a:ext>
+              </a:extLst>
+            </p:cNvPr>
+            <p:cNvSpPr/>
+            <p:nvPr/>
+          </p:nvSpPr>
+          <p:spPr>
+            <a:xfrm rot="13526020">
+              <a:off x="5704573" y="3702671"/>
+              <a:ext cx="206001" cy="206001"/>
+            </a:xfrm>
+            <a:prstGeom prst="plus">
+              <a:avLst>
+                <a:gd name="adj" fmla="val 39750"/>
+              </a:avLst>
+            </a:prstGeom>
+            <a:solidFill>
+              <a:schemeClr val="accent2"/>
+            </a:solidFill>
+            <a:ln>
+              <a:solidFill>
+                <a:schemeClr val="accent2">
                   <a:lumMod val="50000"/>
                 </a:schemeClr>
               </a:solidFill>
-              <a:effectLst/>
-            </a:endParaRPr>
-          </a:p>
-        </p:txBody>
-      </p:sp>
-      <p:sp>
-        <p:nvSpPr>
-          <p:cNvPr id="70" name="TextBox 69">
-            <a:extLst>
-              <a:ext uri="{FF2B5EF4-FFF2-40B4-BE49-F238E27FC236}">
-                <a16:creationId xmlns:a16="http://schemas.microsoft.com/office/drawing/2014/main" id="{5DD17A14-847F-F94B-9973-663F47403485}"/>
-              </a:ext>
-            </a:extLst>
-          </p:cNvPr>
-          <p:cNvSpPr txBox="1"/>
-          <p:nvPr/>
-        </p:nvSpPr>
-        <p:spPr>
-          <a:xfrm>
-            <a:off x="5668393" y="4172124"/>
-            <a:ext cx="357790" cy="369332"/>
-          </a:xfrm>
-          <a:prstGeom prst="rect">
-            <a:avLst/>
-          </a:prstGeom>
-          <a:noFill/>
-        </p:spPr>
-        <p:txBody>
-          <a:bodyPr wrap="none" rtlCol="0">
-            <a:spAutoFit/>
-          </a:bodyPr>
-          <a:lstStyle/>
-          <a:p>
-            <a:r>
-              <a:rPr lang="en-US" dirty="0">
+            </a:ln>
+          </p:spPr>
+          <p:style>
+            <a:lnRef idx="2">
+              <a:schemeClr val="accent1">
+                <a:shade val="50000"/>
+              </a:schemeClr>
+            </a:lnRef>
+            <a:fillRef idx="1">
+              <a:schemeClr val="accent1"/>
+            </a:fillRef>
+            <a:effectRef idx="0">
+              <a:schemeClr val="accent1"/>
+            </a:effectRef>
+            <a:fontRef idx="minor">
+              <a:schemeClr val="lt1"/>
+            </a:fontRef>
+          </p:style>
+          <p:txBody>
+            <a:bodyPr rtlCol="0" anchor="ctr"/>
+            <a:lstStyle/>
+            <a:p>
+              <a:pPr algn="ctr"/>
+              <a:endParaRPr lang="en-CN"/>
+            </a:p>
+          </p:txBody>
+        </p:sp>
+        <p:sp>
+          <p:nvSpPr>
+            <p:cNvPr id="128" name="Rectangle 127">
+              <a:extLst>
+                <a:ext uri="{FF2B5EF4-FFF2-40B4-BE49-F238E27FC236}">
+                  <a16:creationId xmlns:a16="http://schemas.microsoft.com/office/drawing/2014/main" id="{62F95F47-2B6B-0C4C-8491-28BDA523E7F6}"/>
+                </a:ext>
+              </a:extLst>
+            </p:cNvPr>
+            <p:cNvSpPr/>
+            <p:nvPr/>
+          </p:nvSpPr>
+          <p:spPr>
+            <a:xfrm>
+              <a:off x="4522314" y="2521160"/>
+              <a:ext cx="1281633" cy="510001"/>
+            </a:xfrm>
+            <a:prstGeom prst="rect">
+              <a:avLst/>
+            </a:prstGeom>
+            <a:noFill/>
+            <a:ln w="19050">
+              <a:solidFill>
+                <a:schemeClr val="accent6"/>
+              </a:solidFill>
+              <a:prstDash val="sysDash"/>
+            </a:ln>
+          </p:spPr>
+          <p:style>
+            <a:lnRef idx="2">
+              <a:schemeClr val="accent1">
+                <a:shade val="50000"/>
+              </a:schemeClr>
+            </a:lnRef>
+            <a:fillRef idx="1">
+              <a:schemeClr val="accent1"/>
+            </a:fillRef>
+            <a:effectRef idx="0">
+              <a:schemeClr val="accent1"/>
+            </a:effectRef>
+            <a:fontRef idx="minor">
+              <a:schemeClr val="lt1"/>
+            </a:fontRef>
+          </p:style>
+          <p:txBody>
+            <a:bodyPr rtlCol="0" anchor="ctr"/>
+            <a:lstStyle/>
+            <a:p>
+              <a:pPr algn="ctr"/>
+              <a:r>
+                <a:rPr lang="en-US" sz="1200" b="1" u="sng" dirty="0">
+                  <a:solidFill>
+                    <a:schemeClr val="accent6">
+                      <a:lumMod val="50000"/>
+                    </a:schemeClr>
+                  </a:solidFill>
+                  <a:effectLst/>
+                </a:rPr>
+                <a:t>txHash</a:t>
+              </a:r>
+              <a:r>
+                <a:rPr lang="en-US" sz="1200" dirty="0">
+                  <a:solidFill>
+                    <a:schemeClr val="accent6">
+                      <a:lumMod val="50000"/>
+                    </a:schemeClr>
+                  </a:solidFill>
+                  <a:effectLst/>
+                </a:rPr>
+                <a:t>=hash_1</a:t>
+              </a:r>
+            </a:p>
+            <a:p>
+              <a:pPr algn="ctr"/>
+              <a:r>
+                <a:rPr lang="en-US" sz="1200" b="1" u="sng" dirty="0">
+                  <a:solidFill>
+                    <a:schemeClr val="accent6">
+                      <a:lumMod val="50000"/>
+                    </a:schemeClr>
+                  </a:solidFill>
+                  <a:effectLst/>
+                </a:rPr>
+                <a:t>index</a:t>
+              </a:r>
+              <a:r>
+                <a:rPr lang="en-US" sz="1200" dirty="0">
+                  <a:solidFill>
+                    <a:schemeClr val="accent6">
+                      <a:lumMod val="50000"/>
+                    </a:schemeClr>
+                  </a:solidFill>
+                </a:rPr>
+                <a:t>=0</a:t>
+              </a:r>
+            </a:p>
+          </p:txBody>
+        </p:sp>
+        <p:cxnSp>
+          <p:nvCxnSpPr>
+            <p:cNvPr id="129" name="Straight Arrow Connector 128">
+              <a:extLst>
+                <a:ext uri="{FF2B5EF4-FFF2-40B4-BE49-F238E27FC236}">
+                  <a16:creationId xmlns:a16="http://schemas.microsoft.com/office/drawing/2014/main" id="{8ADA839C-1631-A74C-B0BC-6393530C3180}"/>
+                </a:ext>
+              </a:extLst>
+            </p:cNvPr>
+            <p:cNvCxnSpPr>
+              <a:cxnSpLocks/>
+              <a:stCxn id="101" idx="0"/>
+              <a:endCxn id="128" idx="2"/>
+            </p:cNvCxnSpPr>
+            <p:nvPr/>
+          </p:nvCxnSpPr>
+          <p:spPr>
+            <a:xfrm flipH="1" flipV="1">
+              <a:off x="5163131" y="3031161"/>
+              <a:ext cx="1" cy="366172"/>
+            </a:xfrm>
+            <a:prstGeom prst="straightConnector1">
+              <a:avLst/>
+            </a:prstGeom>
+            <a:ln w="12700">
+              <a:solidFill>
+                <a:schemeClr val="accent6"/>
+              </a:solidFill>
+              <a:prstDash val="sysDash"/>
+              <a:tailEnd type="stealth" w="lg" len="lg"/>
+            </a:ln>
+          </p:spPr>
+          <p:style>
+            <a:lnRef idx="1">
+              <a:schemeClr val="accent1"/>
+            </a:lnRef>
+            <a:fillRef idx="0">
+              <a:schemeClr val="accent1"/>
+            </a:fillRef>
+            <a:effectRef idx="0">
+              <a:schemeClr val="accent1"/>
+            </a:effectRef>
+            <a:fontRef idx="minor">
+              <a:schemeClr val="tx1"/>
+            </a:fontRef>
+          </p:style>
+        </p:cxnSp>
+        <p:sp>
+          <p:nvSpPr>
+            <p:cNvPr id="142" name="TextBox 141">
+              <a:extLst>
+                <a:ext uri="{FF2B5EF4-FFF2-40B4-BE49-F238E27FC236}">
+                  <a16:creationId xmlns:a16="http://schemas.microsoft.com/office/drawing/2014/main" id="{0FE699C2-A542-ED4D-BBD3-17F225FD2FAF}"/>
+                </a:ext>
+              </a:extLst>
+            </p:cNvPr>
+            <p:cNvSpPr txBox="1"/>
+            <p:nvPr/>
+          </p:nvSpPr>
+          <p:spPr>
+            <a:xfrm>
+              <a:off x="4984237" y="4502949"/>
+              <a:ext cx="357790" cy="369332"/>
+            </a:xfrm>
+            <a:prstGeom prst="rect">
+              <a:avLst/>
+            </a:prstGeom>
+            <a:noFill/>
+          </p:spPr>
+          <p:txBody>
+            <a:bodyPr wrap="none" rtlCol="0">
+              <a:spAutoFit/>
+            </a:bodyPr>
+            <a:lstStyle/>
+            <a:p>
+              <a:r>
+                <a:rPr lang="en-US" dirty="0">
+                  <a:solidFill>
+                    <a:schemeClr val="accent6">
+                      <a:lumMod val="50000"/>
+                    </a:schemeClr>
+                  </a:solidFill>
+                </a:rPr>
+                <a:t>·</a:t>
+              </a:r>
+              <a:r>
+                <a:rPr lang="en-US" altLang="zh-CN" dirty="0">
+                  <a:solidFill>
+                    <a:schemeClr val="accent6">
+                      <a:lumMod val="50000"/>
+                    </a:schemeClr>
+                  </a:solidFill>
+                </a:rPr>
+                <a:t>··</a:t>
+              </a:r>
+              <a:endParaRPr lang="en-CN" dirty="0">
                 <a:solidFill>
-                  <a:schemeClr val="accent1">
+                  <a:schemeClr val="accent6">
                     <a:lumMod val="50000"/>
                   </a:schemeClr>
                 </a:solidFill>
-              </a:rPr>
-              <a:t>·</a:t>
-            </a:r>
-            <a:r>
-              <a:rPr lang="en-US" altLang="zh-CN" dirty="0">
-                <a:solidFill>
-                  <a:schemeClr val="accent1">
-                    <a:lumMod val="50000"/>
-                  </a:schemeClr>
-                </a:solidFill>
-              </a:rPr>
-              <a:t>··</a:t>
-            </a:r>
-            <a:endParaRPr lang="en-CN" dirty="0">
-              <a:solidFill>
-                <a:schemeClr val="accent1">
-                  <a:lumMod val="50000"/>
-                </a:schemeClr>
-              </a:solidFill>
-            </a:endParaRPr>
-          </a:p>
-        </p:txBody>
-      </p:sp>
-      <p:cxnSp>
-        <p:nvCxnSpPr>
-          <p:cNvPr id="74" name="Straight Arrow Connector 73">
-            <a:extLst>
-              <a:ext uri="{FF2B5EF4-FFF2-40B4-BE49-F238E27FC236}">
-                <a16:creationId xmlns:a16="http://schemas.microsoft.com/office/drawing/2014/main" id="{A16412D8-FDE4-5F42-A360-6D892189EF06}"/>
-              </a:ext>
-            </a:extLst>
-          </p:cNvPr>
-          <p:cNvCxnSpPr>
-            <a:cxnSpLocks/>
-            <a:stCxn id="28" idx="3"/>
-          </p:cNvCxnSpPr>
-          <p:nvPr/>
-        </p:nvCxnSpPr>
-        <p:spPr>
-          <a:xfrm>
-            <a:off x="3639466" y="3951542"/>
-            <a:ext cx="595429" cy="0"/>
-          </a:xfrm>
-          <a:prstGeom prst="straightConnector1">
-            <a:avLst/>
-          </a:prstGeom>
-          <a:ln w="12700">
-            <a:solidFill>
-              <a:schemeClr val="tx1"/>
-            </a:solidFill>
-            <a:prstDash val="solid"/>
-            <a:tailEnd type="stealth" w="lg" len="lg"/>
-          </a:ln>
-        </p:spPr>
-        <p:style>
-          <a:lnRef idx="1">
-            <a:schemeClr val="accent1"/>
-          </a:lnRef>
-          <a:fillRef idx="0">
-            <a:schemeClr val="accent1"/>
-          </a:fillRef>
-          <a:effectRef idx="0">
-            <a:schemeClr val="accent1"/>
-          </a:effectRef>
-          <a:fontRef idx="minor">
-            <a:schemeClr val="tx1"/>
-          </a:fontRef>
-        </p:style>
-      </p:cxnSp>
-      <p:cxnSp>
-        <p:nvCxnSpPr>
-          <p:cNvPr id="79" name="Straight Arrow Connector 78">
-            <a:extLst>
-              <a:ext uri="{FF2B5EF4-FFF2-40B4-BE49-F238E27FC236}">
-                <a16:creationId xmlns:a16="http://schemas.microsoft.com/office/drawing/2014/main" id="{C07CB2F5-FBC1-FF41-9A98-C19E4B9E12C2}"/>
-              </a:ext>
-            </a:extLst>
-          </p:cNvPr>
-          <p:cNvCxnSpPr>
-            <a:cxnSpLocks/>
-            <a:stCxn id="29" idx="3"/>
-          </p:cNvCxnSpPr>
-          <p:nvPr/>
-        </p:nvCxnSpPr>
-        <p:spPr>
-          <a:xfrm flipV="1">
-            <a:off x="3639466" y="4356790"/>
-            <a:ext cx="598415" cy="3451"/>
-          </a:xfrm>
-          <a:prstGeom prst="straightConnector1">
-            <a:avLst/>
-          </a:prstGeom>
-          <a:ln w="12700">
-            <a:solidFill>
-              <a:schemeClr val="tx1"/>
-            </a:solidFill>
-            <a:prstDash val="solid"/>
-            <a:tailEnd type="stealth" w="lg" len="lg"/>
-          </a:ln>
-        </p:spPr>
-        <p:style>
-          <a:lnRef idx="1">
-            <a:schemeClr val="accent1"/>
-          </a:lnRef>
-          <a:fillRef idx="0">
-            <a:schemeClr val="accent1"/>
-          </a:fillRef>
-          <a:effectRef idx="0">
-            <a:schemeClr val="accent1"/>
-          </a:effectRef>
-          <a:fontRef idx="minor">
-            <a:schemeClr val="tx1"/>
-          </a:fontRef>
-        </p:style>
-      </p:cxnSp>
-      <p:cxnSp>
-        <p:nvCxnSpPr>
-          <p:cNvPr id="81" name="Straight Arrow Connector 80">
-            <a:extLst>
-              <a:ext uri="{FF2B5EF4-FFF2-40B4-BE49-F238E27FC236}">
-                <a16:creationId xmlns:a16="http://schemas.microsoft.com/office/drawing/2014/main" id="{F4750DA7-F8A2-9A4D-B455-B34DB5B653ED}"/>
-              </a:ext>
-            </a:extLst>
-          </p:cNvPr>
-          <p:cNvCxnSpPr>
-            <a:cxnSpLocks/>
-            <a:endCxn id="20" idx="1"/>
-          </p:cNvCxnSpPr>
-          <p:nvPr/>
-        </p:nvCxnSpPr>
-        <p:spPr>
-          <a:xfrm>
-            <a:off x="2263916" y="1991006"/>
-            <a:ext cx="600164" cy="0"/>
-          </a:xfrm>
-          <a:prstGeom prst="straightConnector1">
-            <a:avLst/>
-          </a:prstGeom>
-          <a:ln w="12700">
-            <a:solidFill>
-              <a:schemeClr val="tx1"/>
-            </a:solidFill>
-            <a:prstDash val="solid"/>
-            <a:tailEnd type="stealth" w="lg" len="lg"/>
-          </a:ln>
-        </p:spPr>
-        <p:style>
-          <a:lnRef idx="1">
-            <a:schemeClr val="accent1"/>
-          </a:lnRef>
-          <a:fillRef idx="0">
-            <a:schemeClr val="accent1"/>
-          </a:fillRef>
-          <a:effectRef idx="0">
-            <a:schemeClr val="accent1"/>
-          </a:effectRef>
-          <a:fontRef idx="minor">
-            <a:schemeClr val="tx1"/>
-          </a:fontRef>
-        </p:style>
-      </p:cxnSp>
-      <p:cxnSp>
-        <p:nvCxnSpPr>
-          <p:cNvPr id="88" name="Straight Arrow Connector 87">
-            <a:extLst>
-              <a:ext uri="{FF2B5EF4-FFF2-40B4-BE49-F238E27FC236}">
-                <a16:creationId xmlns:a16="http://schemas.microsoft.com/office/drawing/2014/main" id="{E10AE211-ED01-A34B-93AA-DAC410F0333F}"/>
-              </a:ext>
-            </a:extLst>
-          </p:cNvPr>
-          <p:cNvCxnSpPr>
-            <a:cxnSpLocks/>
-            <a:endCxn id="47" idx="1"/>
-          </p:cNvCxnSpPr>
-          <p:nvPr/>
-        </p:nvCxnSpPr>
-        <p:spPr>
-          <a:xfrm>
-            <a:off x="4864166" y="1991005"/>
-            <a:ext cx="595429" cy="1"/>
-          </a:xfrm>
-          <a:prstGeom prst="straightConnector1">
-            <a:avLst/>
-          </a:prstGeom>
-          <a:ln w="12700">
-            <a:solidFill>
-              <a:schemeClr val="tx1"/>
-            </a:solidFill>
-            <a:prstDash val="solid"/>
-            <a:tailEnd type="stealth" w="lg" len="lg"/>
-          </a:ln>
-        </p:spPr>
-        <p:style>
-          <a:lnRef idx="1">
-            <a:schemeClr val="accent1"/>
-          </a:lnRef>
-          <a:fillRef idx="0">
-            <a:schemeClr val="accent1"/>
-          </a:fillRef>
-          <a:effectRef idx="0">
-            <a:schemeClr val="accent1"/>
-          </a:effectRef>
-          <a:fontRef idx="minor">
-            <a:schemeClr val="tx1"/>
-          </a:fontRef>
-        </p:style>
-      </p:cxnSp>
-      <p:cxnSp>
-        <p:nvCxnSpPr>
-          <p:cNvPr id="93" name="Straight Arrow Connector 92">
-            <a:extLst>
-              <a:ext uri="{FF2B5EF4-FFF2-40B4-BE49-F238E27FC236}">
-                <a16:creationId xmlns:a16="http://schemas.microsoft.com/office/drawing/2014/main" id="{96F9657D-CFA4-E948-909D-FA4CB62C5083}"/>
-              </a:ext>
-            </a:extLst>
-          </p:cNvPr>
-          <p:cNvCxnSpPr>
-            <a:cxnSpLocks/>
-          </p:cNvCxnSpPr>
-          <p:nvPr/>
-        </p:nvCxnSpPr>
-        <p:spPr>
-          <a:xfrm>
-            <a:off x="2263916" y="2399704"/>
-            <a:ext cx="600164" cy="0"/>
-          </a:xfrm>
-          <a:prstGeom prst="straightConnector1">
-            <a:avLst/>
-          </a:prstGeom>
-          <a:ln w="12700">
-            <a:solidFill>
-              <a:schemeClr val="tx1"/>
-            </a:solidFill>
-            <a:prstDash val="solid"/>
-            <a:tailEnd type="stealth" w="lg" len="lg"/>
-          </a:ln>
-        </p:spPr>
-        <p:style>
-          <a:lnRef idx="1">
-            <a:schemeClr val="accent1"/>
-          </a:lnRef>
-          <a:fillRef idx="0">
-            <a:schemeClr val="accent1"/>
-          </a:fillRef>
-          <a:effectRef idx="0">
-            <a:schemeClr val="accent1"/>
-          </a:effectRef>
-          <a:fontRef idx="minor">
-            <a:schemeClr val="tx1"/>
-          </a:fontRef>
-        </p:style>
-      </p:cxnSp>
-      <p:cxnSp>
-        <p:nvCxnSpPr>
-          <p:cNvPr id="94" name="Straight Arrow Connector 93">
-            <a:extLst>
-              <a:ext uri="{FF2B5EF4-FFF2-40B4-BE49-F238E27FC236}">
-                <a16:creationId xmlns:a16="http://schemas.microsoft.com/office/drawing/2014/main" id="{855E2B35-0E9F-0240-86B6-8E8F2F629225}"/>
-              </a:ext>
-            </a:extLst>
-          </p:cNvPr>
-          <p:cNvCxnSpPr>
-            <a:cxnSpLocks/>
-          </p:cNvCxnSpPr>
-          <p:nvPr/>
-        </p:nvCxnSpPr>
-        <p:spPr>
-          <a:xfrm>
-            <a:off x="2264008" y="2808403"/>
-            <a:ext cx="600164" cy="0"/>
-          </a:xfrm>
-          <a:prstGeom prst="straightConnector1">
-            <a:avLst/>
-          </a:prstGeom>
-          <a:ln w="12700">
-            <a:solidFill>
-              <a:schemeClr val="tx1"/>
-            </a:solidFill>
-            <a:prstDash val="solid"/>
-            <a:tailEnd type="stealth" w="lg" len="lg"/>
-          </a:ln>
-        </p:spPr>
-        <p:style>
-          <a:lnRef idx="1">
-            <a:schemeClr val="accent1"/>
-          </a:lnRef>
-          <a:fillRef idx="0">
-            <a:schemeClr val="accent1"/>
-          </a:fillRef>
-          <a:effectRef idx="0">
-            <a:schemeClr val="accent1"/>
-          </a:effectRef>
-          <a:fontRef idx="minor">
-            <a:schemeClr val="tx1"/>
-          </a:fontRef>
-        </p:style>
-      </p:cxnSp>
+              </a:endParaRPr>
+            </a:p>
+          </p:txBody>
+        </p:sp>
+      </p:grpSp>
     </p:spTree>
     <p:extLst>
       <p:ext uri="{BB962C8B-B14F-4D97-AF65-F5344CB8AC3E}">

</xml_diff>

<commit_message>
add: finish handler code (#1)
</commit_message>
<xml_diff>
--- a/Homeworks/Homework_1/H1_Proejct/docs/Images.pptx
+++ b/Homeworks/Homework_1/H1_Proejct/docs/Images.pptx
@@ -6,6 +6,7 @@
   </p:sldMasterIdLst>
   <p:sldIdLst>
     <p:sldId id="256" r:id="rId2"/>
+    <p:sldId id="257" r:id="rId3"/>
   </p:sldIdLst>
   <p:sldSz cx="12192000" cy="6858000"/>
   <p:notesSz cx="6858000" cy="9144000"/>
@@ -3344,10 +3345,10 @@
       </p:grpSpPr>
       <p:grpSp>
         <p:nvGrpSpPr>
-          <p:cNvPr id="158" name="Group 157">
+          <p:cNvPr id="236" name="Group 235">
             <a:extLst>
               <a:ext uri="{FF2B5EF4-FFF2-40B4-BE49-F238E27FC236}">
-                <a16:creationId xmlns:a16="http://schemas.microsoft.com/office/drawing/2014/main" id="{731A4D0C-81B9-8147-A380-CBA611AD0E4C}"/>
+                <a16:creationId xmlns:a16="http://schemas.microsoft.com/office/drawing/2014/main" id="{95EE327C-9534-B54B-9CBA-DB1DA06B8D7A}"/>
               </a:ext>
             </a:extLst>
           </p:cNvPr>
@@ -3356,10 +3357,10 @@
         </p:nvGrpSpPr>
         <p:grpSpPr>
           <a:xfrm>
-            <a:off x="2263916" y="1194953"/>
-            <a:ext cx="7387088" cy="4047713"/>
-            <a:chOff x="2263916" y="1194953"/>
-            <a:chExt cx="7387088" cy="4047713"/>
+            <a:off x="2397706" y="167935"/>
+            <a:ext cx="8974933" cy="6146540"/>
+            <a:chOff x="2248862" y="148503"/>
+            <a:chExt cx="8974933" cy="6146540"/>
           </a:xfrm>
         </p:grpSpPr>
         <p:sp>
@@ -3376,7 +3377,7 @@
           </p:nvSpPr>
           <p:spPr>
             <a:xfrm>
-              <a:off x="2591953" y="4873334"/>
+              <a:off x="2576899" y="3833090"/>
               <a:ext cx="1319645" cy="369332"/>
             </a:xfrm>
             <a:prstGeom prst="rect">
@@ -3415,7 +3416,7 @@
           </p:nvCxnSpPr>
           <p:spPr>
             <a:xfrm>
-              <a:off x="2591953" y="1506967"/>
+              <a:off x="2576899" y="466723"/>
               <a:ext cx="1319645" cy="0"/>
             </a:xfrm>
             <a:prstGeom prst="line">
@@ -3442,63 +3443,6 @@
             </a:fontRef>
           </p:style>
         </p:cxnSp>
-        <p:sp>
-          <p:nvSpPr>
-            <p:cNvPr id="4" name="Rounded Rectangle 3">
-              <a:extLst>
-                <a:ext uri="{FF2B5EF4-FFF2-40B4-BE49-F238E27FC236}">
-                  <a16:creationId xmlns:a16="http://schemas.microsoft.com/office/drawing/2014/main" id="{482D10D5-6611-A447-BBFF-36C5496E39A4}"/>
-                </a:ext>
-              </a:extLst>
-            </p:cNvPr>
-            <p:cNvSpPr/>
-            <p:nvPr/>
-          </p:nvSpPr>
-          <p:spPr>
-            <a:xfrm>
-              <a:off x="2591953" y="1194955"/>
-              <a:ext cx="1319645" cy="3678381"/>
-            </a:xfrm>
-            <a:prstGeom prst="roundRect">
-              <a:avLst>
-                <a:gd name="adj" fmla="val 6838"/>
-              </a:avLst>
-            </a:prstGeom>
-            <a:noFill/>
-            <a:ln w="19050">
-              <a:solidFill>
-                <a:schemeClr val="tx1"/>
-              </a:solidFill>
-            </a:ln>
-          </p:spPr>
-          <p:style>
-            <a:lnRef idx="2">
-              <a:schemeClr val="accent1">
-                <a:shade val="50000"/>
-              </a:schemeClr>
-            </a:lnRef>
-            <a:fillRef idx="1">
-              <a:schemeClr val="accent1"/>
-            </a:fillRef>
-            <a:effectRef idx="0">
-              <a:schemeClr val="accent1"/>
-            </a:effectRef>
-            <a:fontRef idx="minor">
-              <a:schemeClr val="lt1"/>
-            </a:fontRef>
-          </p:style>
-          <p:txBody>
-            <a:bodyPr rtlCol="0" anchor="ctr"/>
-            <a:lstStyle/>
-            <a:p>
-              <a:pPr algn="ctr"/>
-              <a:endParaRPr lang="en-CN">
-                <a:latin typeface="Times New Roman" panose="02020603050405020304" pitchFamily="18" charset="0"/>
-                <a:cs typeface="Times New Roman" panose="02020603050405020304" pitchFamily="18" charset="0"/>
-              </a:endParaRPr>
-            </a:p>
-          </p:txBody>
-        </p:sp>
         <p:sp>
           <p:nvSpPr>
             <p:cNvPr id="15" name="TextBox 14">
@@ -3513,7 +3457,7 @@
           </p:nvSpPr>
           <p:spPr>
             <a:xfrm>
-              <a:off x="2591953" y="1194953"/>
+              <a:off x="2576899" y="154709"/>
               <a:ext cx="1319645" cy="323165"/>
             </a:xfrm>
             <a:prstGeom prst="rect">
@@ -3555,7 +3499,7 @@
           </p:nvSpPr>
           <p:spPr>
             <a:xfrm>
-              <a:off x="2777847" y="1769661"/>
+              <a:off x="2762793" y="729417"/>
               <a:ext cx="947853" cy="1260087"/>
             </a:xfrm>
             <a:prstGeom prst="rect">
@@ -3613,7 +3557,7 @@
           </p:nvSpPr>
           <p:spPr>
             <a:xfrm>
-              <a:off x="2777847" y="3318822"/>
+              <a:off x="2762793" y="2278578"/>
               <a:ext cx="947853" cy="1260087"/>
             </a:xfrm>
             <a:prstGeom prst="rect">
@@ -3665,7 +3609,7 @@
           </p:nvSpPr>
           <p:spPr>
             <a:xfrm>
-              <a:off x="2864080" y="1845137"/>
+              <a:off x="2849026" y="804893"/>
               <a:ext cx="775386" cy="291737"/>
             </a:xfrm>
             <a:prstGeom prst="rect">
@@ -3743,7 +3687,7 @@
           </p:nvSpPr>
           <p:spPr>
             <a:xfrm>
-              <a:off x="2864080" y="2253836"/>
+              <a:off x="2849026" y="1213592"/>
               <a:ext cx="775386" cy="291737"/>
             </a:xfrm>
             <a:prstGeom prst="rect">
@@ -3821,7 +3765,7 @@
           </p:nvSpPr>
           <p:spPr>
             <a:xfrm>
-              <a:off x="2864080" y="2662535"/>
+              <a:off x="2849026" y="1622291"/>
               <a:ext cx="775386" cy="291737"/>
             </a:xfrm>
             <a:prstGeom prst="rect">
@@ -3899,7 +3843,7 @@
           </p:nvSpPr>
           <p:spPr>
             <a:xfrm>
-              <a:off x="2864080" y="3396974"/>
+              <a:off x="2849026" y="2356730"/>
               <a:ext cx="775386" cy="291737"/>
             </a:xfrm>
             <a:prstGeom prst="rect">
@@ -3977,7 +3921,7 @@
           </p:nvSpPr>
           <p:spPr>
             <a:xfrm>
-              <a:off x="2864080" y="3805673"/>
+              <a:off x="2849026" y="2765429"/>
               <a:ext cx="775386" cy="291737"/>
             </a:xfrm>
             <a:prstGeom prst="rect">
@@ -4055,7 +3999,7 @@
           </p:nvSpPr>
           <p:spPr>
             <a:xfrm>
-              <a:off x="2864080" y="4214372"/>
+              <a:off x="2849026" y="3174128"/>
               <a:ext cx="775386" cy="291737"/>
             </a:xfrm>
             <a:prstGeom prst="rect">
@@ -4133,7 +4077,7 @@
           </p:nvSpPr>
           <p:spPr>
             <a:xfrm>
-              <a:off x="6419302" y="4873334"/>
+              <a:off x="6404248" y="3833090"/>
               <a:ext cx="1319645" cy="369332"/>
             </a:xfrm>
             <a:prstGeom prst="rect">
@@ -4172,7 +4116,7 @@
           </p:nvCxnSpPr>
           <p:spPr>
             <a:xfrm>
-              <a:off x="6419302" y="1506967"/>
+              <a:off x="6404248" y="466723"/>
               <a:ext cx="1319645" cy="0"/>
             </a:xfrm>
             <a:prstGeom prst="line">
@@ -4213,7 +4157,7 @@
           </p:nvSpPr>
           <p:spPr>
             <a:xfrm>
-              <a:off x="6419302" y="1194955"/>
+              <a:off x="6404248" y="154711"/>
               <a:ext cx="1319645" cy="3678381"/>
             </a:xfrm>
             <a:prstGeom prst="roundRect">
@@ -4270,7 +4214,7 @@
           </p:nvSpPr>
           <p:spPr>
             <a:xfrm>
-              <a:off x="6419302" y="1194953"/>
+              <a:off x="6404248" y="154709"/>
               <a:ext cx="1319645" cy="323165"/>
             </a:xfrm>
             <a:prstGeom prst="rect">
@@ -4312,7 +4256,7 @@
           </p:nvSpPr>
           <p:spPr>
             <a:xfrm>
-              <a:off x="6605196" y="1769661"/>
+              <a:off x="6590142" y="729417"/>
               <a:ext cx="947853" cy="1260087"/>
             </a:xfrm>
             <a:prstGeom prst="rect">
@@ -4370,7 +4314,7 @@
           </p:nvSpPr>
           <p:spPr>
             <a:xfrm>
-              <a:off x="6605196" y="3318822"/>
+              <a:off x="6590142" y="2278578"/>
               <a:ext cx="947853" cy="1260087"/>
             </a:xfrm>
             <a:prstGeom prst="rect">
@@ -4422,7 +4366,7 @@
           </p:nvSpPr>
           <p:spPr>
             <a:xfrm>
-              <a:off x="6691429" y="1845137"/>
+              <a:off x="6676375" y="804893"/>
               <a:ext cx="775386" cy="291737"/>
             </a:xfrm>
             <a:prstGeom prst="rect">
@@ -4500,7 +4444,7 @@
           </p:nvSpPr>
           <p:spPr>
             <a:xfrm>
-              <a:off x="6691429" y="2253836"/>
+              <a:off x="6676375" y="1213592"/>
               <a:ext cx="775386" cy="291737"/>
             </a:xfrm>
             <a:prstGeom prst="rect">
@@ -4578,7 +4522,7 @@
           </p:nvSpPr>
           <p:spPr>
             <a:xfrm>
-              <a:off x="6691429" y="3396974"/>
+              <a:off x="6676375" y="2356730"/>
               <a:ext cx="775386" cy="291737"/>
             </a:xfrm>
             <a:prstGeom prst="rect">
@@ -4656,7 +4600,7 @@
           </p:nvSpPr>
           <p:spPr>
             <a:xfrm>
-              <a:off x="6691429" y="3805673"/>
+              <a:off x="6676375" y="2765429"/>
               <a:ext cx="775386" cy="291737"/>
             </a:xfrm>
             <a:prstGeom prst="rect">
@@ -4738,7 +4682,7 @@
           </p:nvCxnSpPr>
           <p:spPr>
             <a:xfrm flipV="1">
-              <a:off x="5803949" y="2399705"/>
+              <a:off x="5788895" y="1359461"/>
               <a:ext cx="887480" cy="1551871"/>
             </a:xfrm>
             <a:prstGeom prst="bentConnector3">
@@ -4786,7 +4730,7 @@
           </p:nvCxnSpPr>
           <p:spPr>
             <a:xfrm flipV="1">
-              <a:off x="7466815" y="2399704"/>
+              <a:off x="7451761" y="1359460"/>
               <a:ext cx="540328" cy="1"/>
             </a:xfrm>
             <a:prstGeom prst="straightConnector1">
@@ -4829,7 +4773,7 @@
           </p:nvSpPr>
           <p:spPr>
             <a:xfrm>
-              <a:off x="8007143" y="2067119"/>
+              <a:off x="7992089" y="1026875"/>
               <a:ext cx="1643861" cy="665170"/>
             </a:xfrm>
             <a:prstGeom prst="rect">
@@ -4969,7 +4913,7 @@
           </p:nvSpPr>
           <p:spPr>
             <a:xfrm>
-              <a:off x="6900227" y="2623737"/>
+              <a:off x="6885173" y="1583493"/>
               <a:ext cx="357790" cy="369332"/>
             </a:xfrm>
             <a:prstGeom prst="rect">
@@ -5031,7 +4975,7 @@
           </p:nvCxnSpPr>
           <p:spPr>
             <a:xfrm flipV="1">
-              <a:off x="7466815" y="3948865"/>
+              <a:off x="7451761" y="2908621"/>
               <a:ext cx="540328" cy="2677"/>
             </a:xfrm>
             <a:prstGeom prst="straightConnector1">
@@ -5074,7 +5018,7 @@
           </p:nvSpPr>
           <p:spPr>
             <a:xfrm>
-              <a:off x="8007143" y="3616280"/>
+              <a:off x="7992089" y="2576036"/>
               <a:ext cx="1643861" cy="665170"/>
             </a:xfrm>
             <a:prstGeom prst="rect">
@@ -5189,7 +5133,7 @@
           </p:nvSpPr>
           <p:spPr>
             <a:xfrm>
-              <a:off x="6900227" y="4172124"/>
+              <a:off x="6885173" y="3131880"/>
               <a:ext cx="357790" cy="369332"/>
             </a:xfrm>
             <a:prstGeom prst="rect">
@@ -5250,7 +5194,7 @@
           </p:nvCxnSpPr>
           <p:spPr>
             <a:xfrm>
-              <a:off x="2263916" y="1991006"/>
+              <a:off x="2248862" y="950762"/>
               <a:ext cx="600164" cy="0"/>
             </a:xfrm>
             <a:prstGeom prst="straightConnector1">
@@ -5296,7 +5240,7 @@
           </p:nvCxnSpPr>
           <p:spPr>
             <a:xfrm>
-              <a:off x="6096000" y="1991005"/>
+              <a:off x="6080946" y="950761"/>
               <a:ext cx="595429" cy="1"/>
             </a:xfrm>
             <a:prstGeom prst="straightConnector1">
@@ -5341,7 +5285,7 @@
           </p:nvCxnSpPr>
           <p:spPr>
             <a:xfrm>
-              <a:off x="2263916" y="2399704"/>
+              <a:off x="2248862" y="1359460"/>
               <a:ext cx="600164" cy="0"/>
             </a:xfrm>
             <a:prstGeom prst="straightConnector1">
@@ -5386,7 +5330,7 @@
           </p:nvCxnSpPr>
           <p:spPr>
             <a:xfrm>
-              <a:off x="2264008" y="2808403"/>
+              <a:off x="2248954" y="1768159"/>
               <a:ext cx="600164" cy="0"/>
             </a:xfrm>
             <a:prstGeom prst="straightConnector1">
@@ -5429,7 +5373,7 @@
           </p:nvSpPr>
           <p:spPr>
             <a:xfrm>
-              <a:off x="4237627" y="3318822"/>
+              <a:off x="4222573" y="2278578"/>
               <a:ext cx="1846180" cy="1554512"/>
             </a:xfrm>
             <a:prstGeom prst="rect">
@@ -5487,7 +5431,7 @@
           </p:nvSpPr>
           <p:spPr>
             <a:xfrm>
-              <a:off x="4522315" y="3397333"/>
+              <a:off x="4507261" y="2357089"/>
               <a:ext cx="1281634" cy="291737"/>
             </a:xfrm>
             <a:prstGeom prst="rect">
@@ -5565,7 +5509,7 @@
           </p:nvSpPr>
           <p:spPr>
             <a:xfrm>
-              <a:off x="4522315" y="3805707"/>
+              <a:off x="4507261" y="2765463"/>
               <a:ext cx="1281634" cy="291737"/>
             </a:xfrm>
             <a:prstGeom prst="rect">
@@ -5643,7 +5587,7 @@
           </p:nvSpPr>
           <p:spPr>
             <a:xfrm>
-              <a:off x="4522314" y="4214372"/>
+              <a:off x="4507260" y="3174128"/>
               <a:ext cx="1281633" cy="291737"/>
             </a:xfrm>
             <a:prstGeom prst="rect">
@@ -5735,7 +5679,7 @@
           </p:nvCxnSpPr>
           <p:spPr>
             <a:xfrm>
-              <a:off x="3639466" y="3951542"/>
+              <a:off x="3624412" y="2911298"/>
               <a:ext cx="882849" cy="34"/>
             </a:xfrm>
             <a:prstGeom prst="straightConnector1">
@@ -5782,7 +5726,7 @@
           </p:nvCxnSpPr>
           <p:spPr>
             <a:xfrm>
-              <a:off x="3639466" y="4360241"/>
+              <a:off x="3624412" y="3319997"/>
               <a:ext cx="882848" cy="0"/>
             </a:xfrm>
             <a:prstGeom prst="straightConnector1">
@@ -5829,7 +5773,7 @@
           </p:nvCxnSpPr>
           <p:spPr>
             <a:xfrm>
-              <a:off x="3639466" y="3542843"/>
+              <a:off x="3624412" y="2502599"/>
               <a:ext cx="882849" cy="359"/>
             </a:xfrm>
             <a:prstGeom prst="straightConnector1">
@@ -5872,7 +5816,7 @@
           </p:nvSpPr>
           <p:spPr>
             <a:xfrm>
-              <a:off x="4503311" y="4873334"/>
+              <a:off x="4488257" y="3833090"/>
               <a:ext cx="1319645" cy="369332"/>
             </a:xfrm>
             <a:prstGeom prst="rect">
@@ -5911,7 +5855,7 @@
           </p:nvSpPr>
           <p:spPr>
             <a:xfrm rot="13526020">
-              <a:off x="5704573" y="3702671"/>
+              <a:off x="5689519" y="2662427"/>
               <a:ext cx="206001" cy="206001"/>
             </a:xfrm>
             <a:prstGeom prst="plus">
@@ -5969,7 +5913,7 @@
           </p:nvSpPr>
           <p:spPr>
             <a:xfrm>
-              <a:off x="4522314" y="2521160"/>
+              <a:off x="4507260" y="1480916"/>
               <a:ext cx="1281633" cy="510001"/>
             </a:xfrm>
             <a:prstGeom prst="rect">
@@ -6071,7 +6015,7 @@
           </p:nvCxnSpPr>
           <p:spPr>
             <a:xfrm flipH="1" flipV="1">
-              <a:off x="5163131" y="3031161"/>
+              <a:off x="5148077" y="1990917"/>
               <a:ext cx="1" cy="366172"/>
             </a:xfrm>
             <a:prstGeom prst="straightConnector1">
@@ -6114,7 +6058,7 @@
           </p:nvSpPr>
           <p:spPr>
             <a:xfrm>
-              <a:off x="4984237" y="4502949"/>
+              <a:off x="4969183" y="3462705"/>
               <a:ext cx="357790" cy="369332"/>
             </a:xfrm>
             <a:prstGeom prst="rect">
@@ -6158,11 +6102,1471 @@
             </a:p>
           </p:txBody>
         </p:sp>
+        <p:cxnSp>
+          <p:nvCxnSpPr>
+            <p:cNvPr id="160" name="Straight Connector 159">
+              <a:extLst>
+                <a:ext uri="{FF2B5EF4-FFF2-40B4-BE49-F238E27FC236}">
+                  <a16:creationId xmlns:a16="http://schemas.microsoft.com/office/drawing/2014/main" id="{ADF1AC3F-12A1-194B-A5A0-76D182166E46}"/>
+                </a:ext>
+              </a:extLst>
+            </p:cNvPr>
+            <p:cNvCxnSpPr/>
+            <p:nvPr/>
+          </p:nvCxnSpPr>
+          <p:spPr>
+            <a:xfrm>
+              <a:off x="9904146" y="466723"/>
+              <a:ext cx="1319645" cy="0"/>
+            </a:xfrm>
+            <a:prstGeom prst="line">
+              <a:avLst/>
+            </a:prstGeom>
+            <a:ln w="19050">
+              <a:solidFill>
+                <a:schemeClr val="tx1"/>
+              </a:solidFill>
+            </a:ln>
+          </p:spPr>
+          <p:style>
+            <a:lnRef idx="1">
+              <a:schemeClr val="accent1"/>
+            </a:lnRef>
+            <a:fillRef idx="0">
+              <a:schemeClr val="accent1"/>
+            </a:fillRef>
+            <a:effectRef idx="0">
+              <a:schemeClr val="accent1"/>
+            </a:effectRef>
+            <a:fontRef idx="minor">
+              <a:schemeClr val="tx1"/>
+            </a:fontRef>
+          </p:style>
+        </p:cxnSp>
+        <p:sp>
+          <p:nvSpPr>
+            <p:cNvPr id="161" name="Rounded Rectangle 160">
+              <a:extLst>
+                <a:ext uri="{FF2B5EF4-FFF2-40B4-BE49-F238E27FC236}">
+                  <a16:creationId xmlns:a16="http://schemas.microsoft.com/office/drawing/2014/main" id="{318E53DF-A2E9-5C44-8530-79190B34A16E}"/>
+                </a:ext>
+              </a:extLst>
+            </p:cNvPr>
+            <p:cNvSpPr/>
+            <p:nvPr/>
+          </p:nvSpPr>
+          <p:spPr>
+            <a:xfrm>
+              <a:off x="9904150" y="154709"/>
+              <a:ext cx="1319645" cy="3677328"/>
+            </a:xfrm>
+            <a:prstGeom prst="roundRect">
+              <a:avLst>
+                <a:gd name="adj" fmla="val 6838"/>
+              </a:avLst>
+            </a:prstGeom>
+            <a:noFill/>
+            <a:ln w="19050">
+              <a:solidFill>
+                <a:schemeClr val="tx1"/>
+              </a:solidFill>
+            </a:ln>
+          </p:spPr>
+          <p:style>
+            <a:lnRef idx="2">
+              <a:schemeClr val="accent1">
+                <a:shade val="50000"/>
+              </a:schemeClr>
+            </a:lnRef>
+            <a:fillRef idx="1">
+              <a:schemeClr val="accent1"/>
+            </a:fillRef>
+            <a:effectRef idx="0">
+              <a:schemeClr val="accent1"/>
+            </a:effectRef>
+            <a:fontRef idx="minor">
+              <a:schemeClr val="lt1"/>
+            </a:fontRef>
+          </p:style>
+          <p:txBody>
+            <a:bodyPr rtlCol="0" anchor="ctr"/>
+            <a:lstStyle/>
+            <a:p>
+              <a:pPr algn="ctr"/>
+              <a:endParaRPr lang="en-CN">
+                <a:latin typeface="Times New Roman" panose="02020603050405020304" pitchFamily="18" charset="0"/>
+                <a:cs typeface="Times New Roman" panose="02020603050405020304" pitchFamily="18" charset="0"/>
+              </a:endParaRPr>
+            </a:p>
+          </p:txBody>
+        </p:sp>
+        <p:sp>
+          <p:nvSpPr>
+            <p:cNvPr id="162" name="TextBox 161">
+              <a:extLst>
+                <a:ext uri="{FF2B5EF4-FFF2-40B4-BE49-F238E27FC236}">
+                  <a16:creationId xmlns:a16="http://schemas.microsoft.com/office/drawing/2014/main" id="{36B8152B-5234-6447-98AE-DE2AA44311CF}"/>
+                </a:ext>
+              </a:extLst>
+            </p:cNvPr>
+            <p:cNvSpPr txBox="1"/>
+            <p:nvPr/>
+          </p:nvSpPr>
+          <p:spPr>
+            <a:xfrm>
+              <a:off x="9904146" y="148503"/>
+              <a:ext cx="1319645" cy="323165"/>
+            </a:xfrm>
+            <a:prstGeom prst="rect">
+              <a:avLst/>
+            </a:prstGeom>
+            <a:noFill/>
+          </p:spPr>
+          <p:txBody>
+            <a:bodyPr wrap="square" rtlCol="0">
+              <a:spAutoFit/>
+            </a:bodyPr>
+            <a:lstStyle/>
+            <a:p>
+              <a:pPr algn="ctr"/>
+              <a:r>
+                <a:rPr lang="en-US" sz="1500" dirty="0"/>
+                <a:t>h</a:t>
+              </a:r>
+              <a:r>
+                <a:rPr lang="en-US" sz="1500" dirty="0">
+                  <a:effectLst/>
+                </a:rPr>
+                <a:t>ash_</a:t>
+              </a:r>
+              <a:r>
+                <a:rPr lang="en-US" altLang="zh-CN" sz="1500" dirty="0">
+                  <a:effectLst/>
+                </a:rPr>
+                <a:t>3</a:t>
+              </a:r>
+              <a:endParaRPr lang="en-US" sz="1500" dirty="0">
+                <a:effectLst/>
+              </a:endParaRPr>
+            </a:p>
+          </p:txBody>
+        </p:sp>
+        <p:sp>
+          <p:nvSpPr>
+            <p:cNvPr id="163" name="Rectangle 162">
+              <a:extLst>
+                <a:ext uri="{FF2B5EF4-FFF2-40B4-BE49-F238E27FC236}">
+                  <a16:creationId xmlns:a16="http://schemas.microsoft.com/office/drawing/2014/main" id="{891B56CA-7676-CC4E-80A2-E43622E0E2BA}"/>
+                </a:ext>
+              </a:extLst>
+            </p:cNvPr>
+            <p:cNvSpPr/>
+            <p:nvPr/>
+          </p:nvSpPr>
+          <p:spPr>
+            <a:xfrm>
+              <a:off x="10090044" y="729418"/>
+              <a:ext cx="947853" cy="1260086"/>
+            </a:xfrm>
+            <a:prstGeom prst="rect">
+              <a:avLst/>
+            </a:prstGeom>
+            <a:noFill/>
+            <a:ln w="19050">
+              <a:solidFill>
+                <a:schemeClr val="accent2"/>
+              </a:solidFill>
+            </a:ln>
+          </p:spPr>
+          <p:style>
+            <a:lnRef idx="2">
+              <a:schemeClr val="accent1">
+                <a:shade val="50000"/>
+              </a:schemeClr>
+            </a:lnRef>
+            <a:fillRef idx="1">
+              <a:schemeClr val="accent1"/>
+            </a:fillRef>
+            <a:effectRef idx="0">
+              <a:schemeClr val="accent1"/>
+            </a:effectRef>
+            <a:fontRef idx="minor">
+              <a:schemeClr val="lt1"/>
+            </a:fontRef>
+          </p:style>
+          <p:txBody>
+            <a:bodyPr rtlCol="0" anchor="ctr"/>
+            <a:lstStyle/>
+            <a:p>
+              <a:pPr algn="ctr"/>
+              <a:endParaRPr lang="en-CN">
+                <a:solidFill>
+                  <a:schemeClr val="accent2">
+                    <a:lumMod val="50000"/>
+                  </a:schemeClr>
+                </a:solidFill>
+              </a:endParaRPr>
+            </a:p>
+          </p:txBody>
+        </p:sp>
+        <p:sp>
+          <p:nvSpPr>
+            <p:cNvPr id="165" name="Rectangle 164">
+              <a:extLst>
+                <a:ext uri="{FF2B5EF4-FFF2-40B4-BE49-F238E27FC236}">
+                  <a16:creationId xmlns:a16="http://schemas.microsoft.com/office/drawing/2014/main" id="{E6ED6404-08C7-9A4A-9BAB-94A5BBBBEF4C}"/>
+                </a:ext>
+              </a:extLst>
+            </p:cNvPr>
+            <p:cNvSpPr/>
+            <p:nvPr/>
+          </p:nvSpPr>
+          <p:spPr>
+            <a:xfrm>
+              <a:off x="10176275" y="1618352"/>
+              <a:ext cx="775386" cy="291737"/>
+            </a:xfrm>
+            <a:prstGeom prst="rect">
+              <a:avLst/>
+            </a:prstGeom>
+            <a:noFill/>
+            <a:ln w="19050">
+              <a:solidFill>
+                <a:schemeClr val="accent2"/>
+              </a:solidFill>
+            </a:ln>
+          </p:spPr>
+          <p:style>
+            <a:lnRef idx="2">
+              <a:schemeClr val="accent1">
+                <a:shade val="50000"/>
+              </a:schemeClr>
+            </a:lnRef>
+            <a:fillRef idx="1">
+              <a:schemeClr val="accent1"/>
+            </a:fillRef>
+            <a:effectRef idx="0">
+              <a:schemeClr val="accent1"/>
+            </a:effectRef>
+            <a:fontRef idx="minor">
+              <a:schemeClr val="lt1"/>
+            </a:fontRef>
+          </p:style>
+          <p:txBody>
+            <a:bodyPr rtlCol="0" anchor="ctr"/>
+            <a:lstStyle/>
+            <a:p>
+              <a:pPr algn="ctr"/>
+              <a:r>
+                <a:rPr lang="en-CN" sz="1200" dirty="0">
+                  <a:solidFill>
+                    <a:schemeClr val="accent2">
+                      <a:lumMod val="50000"/>
+                    </a:schemeClr>
+                  </a:solidFill>
+                </a:rPr>
+                <a:t>input_</a:t>
+              </a:r>
+              <a:r>
+                <a:rPr lang="en-US" sz="1200" dirty="0">
+                  <a:solidFill>
+                    <a:schemeClr val="accent2">
+                      <a:lumMod val="50000"/>
+                    </a:schemeClr>
+                  </a:solidFill>
+                </a:rPr>
+                <a:t>0</a:t>
+              </a:r>
+              <a:endParaRPr lang="en-CN" sz="1200" dirty="0">
+                <a:solidFill>
+                  <a:schemeClr val="accent2">
+                    <a:lumMod val="50000"/>
+                  </a:schemeClr>
+                </a:solidFill>
+              </a:endParaRPr>
+            </a:p>
+          </p:txBody>
+        </p:sp>
+        <p:sp>
+          <p:nvSpPr>
+            <p:cNvPr id="175" name="TextBox 174">
+              <a:extLst>
+                <a:ext uri="{FF2B5EF4-FFF2-40B4-BE49-F238E27FC236}">
+                  <a16:creationId xmlns:a16="http://schemas.microsoft.com/office/drawing/2014/main" id="{8A0EB7E7-8A57-2242-8EB4-511BAF683A95}"/>
+                </a:ext>
+              </a:extLst>
+            </p:cNvPr>
+            <p:cNvSpPr txBox="1"/>
+            <p:nvPr/>
+          </p:nvSpPr>
+          <p:spPr>
+            <a:xfrm>
+              <a:off x="9904147" y="3833090"/>
+              <a:ext cx="1319645" cy="369332"/>
+            </a:xfrm>
+            <a:prstGeom prst="rect">
+              <a:avLst/>
+            </a:prstGeom>
+            <a:noFill/>
+          </p:spPr>
+          <p:txBody>
+            <a:bodyPr wrap="square" rtlCol="0">
+              <a:spAutoFit/>
+            </a:bodyPr>
+            <a:lstStyle/>
+            <a:p>
+              <a:pPr algn="ctr"/>
+              <a:r>
+                <a:rPr lang="en-CN" b="1" dirty="0">
+                  <a:latin typeface="Times New Roman" panose="02020603050405020304" pitchFamily="18" charset="0"/>
+                  <a:cs typeface="Times New Roman" panose="02020603050405020304" pitchFamily="18" charset="0"/>
+                </a:rPr>
+                <a:t>TX </a:t>
+              </a:r>
+              <a:r>
+                <a:rPr lang="en-US" altLang="zh-CN" b="1" dirty="0">
+                  <a:latin typeface="Times New Roman" panose="02020603050405020304" pitchFamily="18" charset="0"/>
+                  <a:cs typeface="Times New Roman" panose="02020603050405020304" pitchFamily="18" charset="0"/>
+                </a:rPr>
+                <a:t>3</a:t>
+              </a:r>
+            </a:p>
+          </p:txBody>
+        </p:sp>
+        <p:cxnSp>
+          <p:nvCxnSpPr>
+            <p:cNvPr id="176" name="Elbow Connector 175">
+              <a:extLst>
+                <a:ext uri="{FF2B5EF4-FFF2-40B4-BE49-F238E27FC236}">
+                  <a16:creationId xmlns:a16="http://schemas.microsoft.com/office/drawing/2014/main" id="{5C933200-6652-9B4E-8B22-A5F211E21E05}"/>
+                </a:ext>
+              </a:extLst>
+            </p:cNvPr>
+            <p:cNvCxnSpPr>
+              <a:cxnSpLocks/>
+              <a:stCxn id="50" idx="3"/>
+              <a:endCxn id="165" idx="1"/>
+            </p:cNvCxnSpPr>
+            <p:nvPr/>
+          </p:nvCxnSpPr>
+          <p:spPr>
+            <a:xfrm flipV="1">
+              <a:off x="7451761" y="1764221"/>
+              <a:ext cx="2724514" cy="738378"/>
+            </a:xfrm>
+            <a:prstGeom prst="bentConnector3">
+              <a:avLst>
+                <a:gd name="adj1" fmla="val 16438"/>
+              </a:avLst>
+            </a:prstGeom>
+            <a:ln w="12700">
+              <a:solidFill>
+                <a:schemeClr val="tx1"/>
+              </a:solidFill>
+              <a:tailEnd type="stealth" w="lg" len="lg"/>
+            </a:ln>
+          </p:spPr>
+          <p:style>
+            <a:lnRef idx="1">
+              <a:schemeClr val="accent1"/>
+            </a:lnRef>
+            <a:fillRef idx="0">
+              <a:schemeClr val="accent1"/>
+            </a:fillRef>
+            <a:effectRef idx="0">
+              <a:schemeClr val="accent1"/>
+            </a:effectRef>
+            <a:fontRef idx="minor">
+              <a:schemeClr val="tx1"/>
+            </a:fontRef>
+          </p:style>
+        </p:cxnSp>
+        <p:sp>
+          <p:nvSpPr>
+            <p:cNvPr id="207" name="Rectangle 206">
+              <a:extLst>
+                <a:ext uri="{FF2B5EF4-FFF2-40B4-BE49-F238E27FC236}">
+                  <a16:creationId xmlns:a16="http://schemas.microsoft.com/office/drawing/2014/main" id="{529ED4D3-85D9-8F4D-A293-2719A08D4360}"/>
+                </a:ext>
+              </a:extLst>
+            </p:cNvPr>
+            <p:cNvSpPr/>
+            <p:nvPr/>
+          </p:nvSpPr>
+          <p:spPr>
+            <a:xfrm>
+              <a:off x="10172346" y="1213592"/>
+              <a:ext cx="775386" cy="291737"/>
+            </a:xfrm>
+            <a:prstGeom prst="rect">
+              <a:avLst/>
+            </a:prstGeom>
+            <a:noFill/>
+            <a:ln w="19050">
+              <a:solidFill>
+                <a:schemeClr val="accent2"/>
+              </a:solidFill>
+            </a:ln>
+          </p:spPr>
+          <p:style>
+            <a:lnRef idx="2">
+              <a:schemeClr val="accent1">
+                <a:shade val="50000"/>
+              </a:schemeClr>
+            </a:lnRef>
+            <a:fillRef idx="1">
+              <a:schemeClr val="accent1"/>
+            </a:fillRef>
+            <a:effectRef idx="0">
+              <a:schemeClr val="accent1"/>
+            </a:effectRef>
+            <a:fontRef idx="minor">
+              <a:schemeClr val="lt1"/>
+            </a:fontRef>
+          </p:style>
+          <p:txBody>
+            <a:bodyPr rtlCol="0" anchor="ctr"/>
+            <a:lstStyle/>
+            <a:p>
+              <a:pPr algn="ctr"/>
+              <a:r>
+                <a:rPr lang="en-CN" sz="1200" dirty="0">
+                  <a:solidFill>
+                    <a:schemeClr val="accent2">
+                      <a:lumMod val="50000"/>
+                    </a:schemeClr>
+                  </a:solidFill>
+                </a:rPr>
+                <a:t>input_</a:t>
+              </a:r>
+              <a:r>
+                <a:rPr lang="en-US" altLang="zh-CN" sz="1200" dirty="0">
+                  <a:solidFill>
+                    <a:schemeClr val="accent2">
+                      <a:lumMod val="50000"/>
+                    </a:schemeClr>
+                  </a:solidFill>
+                </a:rPr>
+                <a:t>1</a:t>
+              </a:r>
+              <a:endParaRPr lang="en-CN" sz="1200" dirty="0">
+                <a:solidFill>
+                  <a:schemeClr val="accent2">
+                    <a:lumMod val="50000"/>
+                  </a:schemeClr>
+                </a:solidFill>
+              </a:endParaRPr>
+            </a:p>
+          </p:txBody>
+        </p:sp>
+        <p:sp>
+          <p:nvSpPr>
+            <p:cNvPr id="212" name="TextBox 211">
+              <a:extLst>
+                <a:ext uri="{FF2B5EF4-FFF2-40B4-BE49-F238E27FC236}">
+                  <a16:creationId xmlns:a16="http://schemas.microsoft.com/office/drawing/2014/main" id="{3841A8D2-DB7E-814A-80A0-AA23E018B328}"/>
+                </a:ext>
+              </a:extLst>
+            </p:cNvPr>
+            <p:cNvSpPr txBox="1"/>
+            <p:nvPr/>
+          </p:nvSpPr>
+          <p:spPr>
+            <a:xfrm>
+              <a:off x="10381144" y="766095"/>
+              <a:ext cx="357790" cy="369332"/>
+            </a:xfrm>
+            <a:prstGeom prst="rect">
+              <a:avLst/>
+            </a:prstGeom>
+            <a:noFill/>
+          </p:spPr>
+          <p:txBody>
+            <a:bodyPr wrap="none" rtlCol="0">
+              <a:spAutoFit/>
+            </a:bodyPr>
+            <a:lstStyle/>
+            <a:p>
+              <a:r>
+                <a:rPr lang="en-US" dirty="0">
+                  <a:solidFill>
+                    <a:schemeClr val="accent2">
+                      <a:lumMod val="50000"/>
+                    </a:schemeClr>
+                  </a:solidFill>
+                </a:rPr>
+                <a:t>·</a:t>
+              </a:r>
+              <a:r>
+                <a:rPr lang="en-US" altLang="zh-CN" dirty="0">
+                  <a:solidFill>
+                    <a:schemeClr val="accent2">
+                      <a:lumMod val="50000"/>
+                    </a:schemeClr>
+                  </a:solidFill>
+                </a:rPr>
+                <a:t>··</a:t>
+              </a:r>
+              <a:endParaRPr lang="en-CN" dirty="0">
+                <a:solidFill>
+                  <a:schemeClr val="accent2">
+                    <a:lumMod val="50000"/>
+                  </a:schemeClr>
+                </a:solidFill>
+              </a:endParaRPr>
+            </a:p>
+          </p:txBody>
+        </p:sp>
+        <p:sp>
+          <p:nvSpPr>
+            <p:cNvPr id="213" name="Rectangle 212">
+              <a:extLst>
+                <a:ext uri="{FF2B5EF4-FFF2-40B4-BE49-F238E27FC236}">
+                  <a16:creationId xmlns:a16="http://schemas.microsoft.com/office/drawing/2014/main" id="{7E51612E-9CBB-C24E-8812-48936A9923D4}"/>
+                </a:ext>
+              </a:extLst>
+            </p:cNvPr>
+            <p:cNvSpPr/>
+            <p:nvPr/>
+          </p:nvSpPr>
+          <p:spPr>
+            <a:xfrm>
+              <a:off x="10090044" y="2280959"/>
+              <a:ext cx="947853" cy="1260087"/>
+            </a:xfrm>
+            <a:prstGeom prst="rect">
+              <a:avLst/>
+            </a:prstGeom>
+            <a:noFill/>
+            <a:ln w="19050">
+              <a:solidFill>
+                <a:schemeClr val="accent1"/>
+              </a:solidFill>
+            </a:ln>
+          </p:spPr>
+          <p:style>
+            <a:lnRef idx="2">
+              <a:schemeClr val="accent1">
+                <a:shade val="50000"/>
+              </a:schemeClr>
+            </a:lnRef>
+            <a:fillRef idx="1">
+              <a:schemeClr val="accent1"/>
+            </a:fillRef>
+            <a:effectRef idx="0">
+              <a:schemeClr val="accent1"/>
+            </a:effectRef>
+            <a:fontRef idx="minor">
+              <a:schemeClr val="lt1"/>
+            </a:fontRef>
+          </p:style>
+          <p:txBody>
+            <a:bodyPr rtlCol="0" anchor="ctr"/>
+            <a:lstStyle/>
+            <a:p>
+              <a:pPr algn="ctr"/>
+              <a:endParaRPr lang="en-CN"/>
+            </a:p>
+          </p:txBody>
+        </p:sp>
+        <p:sp>
+          <p:nvSpPr>
+            <p:cNvPr id="214" name="Rectangle 213">
+              <a:extLst>
+                <a:ext uri="{FF2B5EF4-FFF2-40B4-BE49-F238E27FC236}">
+                  <a16:creationId xmlns:a16="http://schemas.microsoft.com/office/drawing/2014/main" id="{2DDE09FB-4CDA-794C-B996-C4CA484BDD8C}"/>
+                </a:ext>
+              </a:extLst>
+            </p:cNvPr>
+            <p:cNvSpPr/>
+            <p:nvPr/>
+          </p:nvSpPr>
+          <p:spPr>
+            <a:xfrm>
+              <a:off x="10176277" y="2359111"/>
+              <a:ext cx="775386" cy="291737"/>
+            </a:xfrm>
+            <a:prstGeom prst="rect">
+              <a:avLst/>
+            </a:prstGeom>
+            <a:noFill/>
+            <a:ln w="19050">
+              <a:solidFill>
+                <a:schemeClr val="accent1"/>
+              </a:solidFill>
+            </a:ln>
+          </p:spPr>
+          <p:style>
+            <a:lnRef idx="2">
+              <a:schemeClr val="accent1">
+                <a:shade val="50000"/>
+              </a:schemeClr>
+            </a:lnRef>
+            <a:fillRef idx="1">
+              <a:schemeClr val="accent1"/>
+            </a:fillRef>
+            <a:effectRef idx="0">
+              <a:schemeClr val="accent1"/>
+            </a:effectRef>
+            <a:fontRef idx="minor">
+              <a:schemeClr val="lt1"/>
+            </a:fontRef>
+          </p:style>
+          <p:txBody>
+            <a:bodyPr rtlCol="0" anchor="ctr"/>
+            <a:lstStyle/>
+            <a:p>
+              <a:pPr algn="ctr"/>
+              <a:r>
+                <a:rPr lang="en-CN" sz="1200" dirty="0">
+                  <a:solidFill>
+                    <a:schemeClr val="accent1">
+                      <a:lumMod val="50000"/>
+                    </a:schemeClr>
+                  </a:solidFill>
+                </a:rPr>
+                <a:t>output_</a:t>
+              </a:r>
+              <a:r>
+                <a:rPr lang="en-US" sz="1200" dirty="0">
+                  <a:solidFill>
+                    <a:schemeClr val="accent1">
+                      <a:lumMod val="50000"/>
+                    </a:schemeClr>
+                  </a:solidFill>
+                </a:rPr>
+                <a:t>0</a:t>
+              </a:r>
+              <a:endParaRPr lang="en-CN" sz="1200" dirty="0">
+                <a:solidFill>
+                  <a:schemeClr val="accent1">
+                    <a:lumMod val="50000"/>
+                  </a:schemeClr>
+                </a:solidFill>
+              </a:endParaRPr>
+            </a:p>
+          </p:txBody>
+        </p:sp>
+        <p:sp>
+          <p:nvSpPr>
+            <p:cNvPr id="215" name="Rectangle 214">
+              <a:extLst>
+                <a:ext uri="{FF2B5EF4-FFF2-40B4-BE49-F238E27FC236}">
+                  <a16:creationId xmlns:a16="http://schemas.microsoft.com/office/drawing/2014/main" id="{2EE586FF-B607-3C4C-8F65-BC325659DED5}"/>
+                </a:ext>
+              </a:extLst>
+            </p:cNvPr>
+            <p:cNvSpPr/>
+            <p:nvPr/>
+          </p:nvSpPr>
+          <p:spPr>
+            <a:xfrm>
+              <a:off x="10176277" y="2767810"/>
+              <a:ext cx="775386" cy="291737"/>
+            </a:xfrm>
+            <a:prstGeom prst="rect">
+              <a:avLst/>
+            </a:prstGeom>
+            <a:noFill/>
+            <a:ln w="19050">
+              <a:solidFill>
+                <a:schemeClr val="accent1"/>
+              </a:solidFill>
+            </a:ln>
+          </p:spPr>
+          <p:style>
+            <a:lnRef idx="2">
+              <a:schemeClr val="accent1">
+                <a:shade val="50000"/>
+              </a:schemeClr>
+            </a:lnRef>
+            <a:fillRef idx="1">
+              <a:schemeClr val="accent1"/>
+            </a:fillRef>
+            <a:effectRef idx="0">
+              <a:schemeClr val="accent1"/>
+            </a:effectRef>
+            <a:fontRef idx="minor">
+              <a:schemeClr val="lt1"/>
+            </a:fontRef>
+          </p:style>
+          <p:txBody>
+            <a:bodyPr rtlCol="0" anchor="ctr"/>
+            <a:lstStyle/>
+            <a:p>
+              <a:pPr algn="ctr"/>
+              <a:r>
+                <a:rPr lang="en-CN" sz="1200" dirty="0">
+                  <a:solidFill>
+                    <a:schemeClr val="accent1">
+                      <a:lumMod val="50000"/>
+                    </a:schemeClr>
+                  </a:solidFill>
+                </a:rPr>
+                <a:t>output_</a:t>
+              </a:r>
+              <a:r>
+                <a:rPr lang="en-US" sz="1200" dirty="0">
+                  <a:solidFill>
+                    <a:schemeClr val="accent1">
+                      <a:lumMod val="50000"/>
+                    </a:schemeClr>
+                  </a:solidFill>
+                </a:rPr>
+                <a:t>1</a:t>
+              </a:r>
+              <a:endParaRPr lang="en-CN" sz="1200" dirty="0">
+                <a:solidFill>
+                  <a:schemeClr val="accent1">
+                    <a:lumMod val="50000"/>
+                  </a:schemeClr>
+                </a:solidFill>
+              </a:endParaRPr>
+            </a:p>
+          </p:txBody>
+        </p:sp>
+        <p:sp>
+          <p:nvSpPr>
+            <p:cNvPr id="216" name="TextBox 215">
+              <a:extLst>
+                <a:ext uri="{FF2B5EF4-FFF2-40B4-BE49-F238E27FC236}">
+                  <a16:creationId xmlns:a16="http://schemas.microsoft.com/office/drawing/2014/main" id="{AB8A6C9F-61A8-454A-9050-148917297722}"/>
+                </a:ext>
+              </a:extLst>
+            </p:cNvPr>
+            <p:cNvSpPr txBox="1"/>
+            <p:nvPr/>
+          </p:nvSpPr>
+          <p:spPr>
+            <a:xfrm>
+              <a:off x="10385075" y="3134261"/>
+              <a:ext cx="357790" cy="369332"/>
+            </a:xfrm>
+            <a:prstGeom prst="rect">
+              <a:avLst/>
+            </a:prstGeom>
+            <a:noFill/>
+          </p:spPr>
+          <p:txBody>
+            <a:bodyPr wrap="none" rtlCol="0">
+              <a:spAutoFit/>
+            </a:bodyPr>
+            <a:lstStyle/>
+            <a:p>
+              <a:r>
+                <a:rPr lang="en-US" dirty="0">
+                  <a:solidFill>
+                    <a:schemeClr val="accent1">
+                      <a:lumMod val="50000"/>
+                    </a:schemeClr>
+                  </a:solidFill>
+                </a:rPr>
+                <a:t>·</a:t>
+              </a:r>
+              <a:r>
+                <a:rPr lang="en-US" altLang="zh-CN" dirty="0">
+                  <a:solidFill>
+                    <a:schemeClr val="accent1">
+                      <a:lumMod val="50000"/>
+                    </a:schemeClr>
+                  </a:solidFill>
+                </a:rPr>
+                <a:t>··</a:t>
+              </a:r>
+              <a:endParaRPr lang="en-CN" dirty="0">
+                <a:solidFill>
+                  <a:schemeClr val="accent1">
+                    <a:lumMod val="50000"/>
+                  </a:schemeClr>
+                </a:solidFill>
+              </a:endParaRPr>
+            </a:p>
+          </p:txBody>
+        </p:sp>
+        <p:sp>
+          <p:nvSpPr>
+            <p:cNvPr id="217" name="Rounded Rectangle 216">
+              <a:extLst>
+                <a:ext uri="{FF2B5EF4-FFF2-40B4-BE49-F238E27FC236}">
+                  <a16:creationId xmlns:a16="http://schemas.microsoft.com/office/drawing/2014/main" id="{53DDA467-4843-714E-BB8A-96AFA11B2B31}"/>
+                </a:ext>
+              </a:extLst>
+            </p:cNvPr>
+            <p:cNvSpPr/>
+            <p:nvPr/>
+          </p:nvSpPr>
+          <p:spPr>
+            <a:xfrm>
+              <a:off x="2576899" y="148503"/>
+              <a:ext cx="1319645" cy="3677328"/>
+            </a:xfrm>
+            <a:prstGeom prst="roundRect">
+              <a:avLst>
+                <a:gd name="adj" fmla="val 6838"/>
+              </a:avLst>
+            </a:prstGeom>
+            <a:noFill/>
+            <a:ln w="19050">
+              <a:solidFill>
+                <a:schemeClr val="tx1"/>
+              </a:solidFill>
+            </a:ln>
+          </p:spPr>
+          <p:style>
+            <a:lnRef idx="2">
+              <a:schemeClr val="accent1">
+                <a:shade val="50000"/>
+              </a:schemeClr>
+            </a:lnRef>
+            <a:fillRef idx="1">
+              <a:schemeClr val="accent1"/>
+            </a:fillRef>
+            <a:effectRef idx="0">
+              <a:schemeClr val="accent1"/>
+            </a:effectRef>
+            <a:fontRef idx="minor">
+              <a:schemeClr val="lt1"/>
+            </a:fontRef>
+          </p:style>
+          <p:txBody>
+            <a:bodyPr rtlCol="0" anchor="ctr"/>
+            <a:lstStyle/>
+            <a:p>
+              <a:pPr algn="ctr"/>
+              <a:endParaRPr lang="en-CN">
+                <a:latin typeface="Times New Roman" panose="02020603050405020304" pitchFamily="18" charset="0"/>
+                <a:cs typeface="Times New Roman" panose="02020603050405020304" pitchFamily="18" charset="0"/>
+              </a:endParaRPr>
+            </a:p>
+          </p:txBody>
+        </p:sp>
+        <p:cxnSp>
+          <p:nvCxnSpPr>
+            <p:cNvPr id="219" name="Straight Connector 218">
+              <a:extLst>
+                <a:ext uri="{FF2B5EF4-FFF2-40B4-BE49-F238E27FC236}">
+                  <a16:creationId xmlns:a16="http://schemas.microsoft.com/office/drawing/2014/main" id="{21E0D2A8-8AF6-F74A-B355-DED7DF8B4D1F}"/>
+                </a:ext>
+              </a:extLst>
+            </p:cNvPr>
+            <p:cNvCxnSpPr/>
+            <p:nvPr/>
+          </p:nvCxnSpPr>
+          <p:spPr>
+            <a:xfrm>
+              <a:off x="6404248" y="4677481"/>
+              <a:ext cx="1319645" cy="0"/>
+            </a:xfrm>
+            <a:prstGeom prst="line">
+              <a:avLst/>
+            </a:prstGeom>
+            <a:ln w="19050">
+              <a:solidFill>
+                <a:schemeClr val="tx1"/>
+              </a:solidFill>
+            </a:ln>
+          </p:spPr>
+          <p:style>
+            <a:lnRef idx="1">
+              <a:schemeClr val="accent1"/>
+            </a:lnRef>
+            <a:fillRef idx="0">
+              <a:schemeClr val="accent1"/>
+            </a:fillRef>
+            <a:effectRef idx="0">
+              <a:schemeClr val="accent1"/>
+            </a:effectRef>
+            <a:fontRef idx="minor">
+              <a:schemeClr val="tx1"/>
+            </a:fontRef>
+          </p:style>
+        </p:cxnSp>
+        <p:sp>
+          <p:nvSpPr>
+            <p:cNvPr id="220" name="Rounded Rectangle 219">
+              <a:extLst>
+                <a:ext uri="{FF2B5EF4-FFF2-40B4-BE49-F238E27FC236}">
+                  <a16:creationId xmlns:a16="http://schemas.microsoft.com/office/drawing/2014/main" id="{B2F6EFB4-D128-444F-8BB6-21B5CEAA3A65}"/>
+                </a:ext>
+              </a:extLst>
+            </p:cNvPr>
+            <p:cNvSpPr/>
+            <p:nvPr/>
+          </p:nvSpPr>
+          <p:spPr>
+            <a:xfrm>
+              <a:off x="6404252" y="4365467"/>
+              <a:ext cx="1319645" cy="1553918"/>
+            </a:xfrm>
+            <a:prstGeom prst="roundRect">
+              <a:avLst>
+                <a:gd name="adj" fmla="val 6838"/>
+              </a:avLst>
+            </a:prstGeom>
+            <a:noFill/>
+            <a:ln w="19050">
+              <a:solidFill>
+                <a:schemeClr val="tx1"/>
+              </a:solidFill>
+            </a:ln>
+          </p:spPr>
+          <p:style>
+            <a:lnRef idx="2">
+              <a:schemeClr val="accent1">
+                <a:shade val="50000"/>
+              </a:schemeClr>
+            </a:lnRef>
+            <a:fillRef idx="1">
+              <a:schemeClr val="accent1"/>
+            </a:fillRef>
+            <a:effectRef idx="0">
+              <a:schemeClr val="accent1"/>
+            </a:effectRef>
+            <a:fontRef idx="minor">
+              <a:schemeClr val="lt1"/>
+            </a:fontRef>
+          </p:style>
+          <p:txBody>
+            <a:bodyPr rtlCol="0" anchor="ctr"/>
+            <a:lstStyle/>
+            <a:p>
+              <a:pPr algn="ctr"/>
+              <a:endParaRPr lang="en-CN">
+                <a:latin typeface="Times New Roman" panose="02020603050405020304" pitchFamily="18" charset="0"/>
+                <a:cs typeface="Times New Roman" panose="02020603050405020304" pitchFamily="18" charset="0"/>
+              </a:endParaRPr>
+            </a:p>
+          </p:txBody>
+        </p:sp>
+        <p:sp>
+          <p:nvSpPr>
+            <p:cNvPr id="221" name="TextBox 220">
+              <a:extLst>
+                <a:ext uri="{FF2B5EF4-FFF2-40B4-BE49-F238E27FC236}">
+                  <a16:creationId xmlns:a16="http://schemas.microsoft.com/office/drawing/2014/main" id="{37471DEA-A8CB-C24C-BB9D-40D04F4A94F7}"/>
+                </a:ext>
+              </a:extLst>
+            </p:cNvPr>
+            <p:cNvSpPr txBox="1"/>
+            <p:nvPr/>
+          </p:nvSpPr>
+          <p:spPr>
+            <a:xfrm>
+              <a:off x="6404248" y="4359261"/>
+              <a:ext cx="1319645" cy="323165"/>
+            </a:xfrm>
+            <a:prstGeom prst="rect">
+              <a:avLst/>
+            </a:prstGeom>
+            <a:noFill/>
+          </p:spPr>
+          <p:txBody>
+            <a:bodyPr wrap="square" rtlCol="0">
+              <a:spAutoFit/>
+            </a:bodyPr>
+            <a:lstStyle/>
+            <a:p>
+              <a:pPr algn="ctr"/>
+              <a:r>
+                <a:rPr lang="en-US" sz="1500" dirty="0"/>
+                <a:t>h</a:t>
+              </a:r>
+              <a:r>
+                <a:rPr lang="en-US" sz="1500" dirty="0">
+                  <a:effectLst/>
+                </a:rPr>
+                <a:t>ash_</a:t>
+              </a:r>
+              <a:r>
+                <a:rPr lang="en-US" altLang="zh-CN" sz="1500" dirty="0"/>
+                <a:t>4</a:t>
+              </a:r>
+              <a:endParaRPr lang="en-US" sz="1500" dirty="0">
+                <a:effectLst/>
+              </a:endParaRPr>
+            </a:p>
+          </p:txBody>
+        </p:sp>
+        <p:sp>
+          <p:nvSpPr>
+            <p:cNvPr id="222" name="Rectangle 221">
+              <a:extLst>
+                <a:ext uri="{FF2B5EF4-FFF2-40B4-BE49-F238E27FC236}">
+                  <a16:creationId xmlns:a16="http://schemas.microsoft.com/office/drawing/2014/main" id="{ECAF4E8F-C39D-1B40-9F96-00385A0FAF2E}"/>
+                </a:ext>
+              </a:extLst>
+            </p:cNvPr>
+            <p:cNvSpPr/>
+            <p:nvPr/>
+          </p:nvSpPr>
+          <p:spPr>
+            <a:xfrm>
+              <a:off x="6590146" y="4940176"/>
+              <a:ext cx="947853" cy="409460"/>
+            </a:xfrm>
+            <a:prstGeom prst="rect">
+              <a:avLst/>
+            </a:prstGeom>
+            <a:noFill/>
+            <a:ln w="19050">
+              <a:solidFill>
+                <a:schemeClr val="accent2"/>
+              </a:solidFill>
+            </a:ln>
+          </p:spPr>
+          <p:style>
+            <a:lnRef idx="2">
+              <a:schemeClr val="accent1">
+                <a:shade val="50000"/>
+              </a:schemeClr>
+            </a:lnRef>
+            <a:fillRef idx="1">
+              <a:schemeClr val="accent1"/>
+            </a:fillRef>
+            <a:effectRef idx="0">
+              <a:schemeClr val="accent1"/>
+            </a:effectRef>
+            <a:fontRef idx="minor">
+              <a:schemeClr val="lt1"/>
+            </a:fontRef>
+          </p:style>
+          <p:txBody>
+            <a:bodyPr rtlCol="0" anchor="ctr"/>
+            <a:lstStyle/>
+            <a:p>
+              <a:pPr algn="ctr"/>
+              <a:endParaRPr lang="en-CN">
+                <a:solidFill>
+                  <a:schemeClr val="accent2">
+                    <a:lumMod val="50000"/>
+                  </a:schemeClr>
+                </a:solidFill>
+              </a:endParaRPr>
+            </a:p>
+          </p:txBody>
+        </p:sp>
+        <p:sp>
+          <p:nvSpPr>
+            <p:cNvPr id="223" name="Rectangle 222">
+              <a:extLst>
+                <a:ext uri="{FF2B5EF4-FFF2-40B4-BE49-F238E27FC236}">
+                  <a16:creationId xmlns:a16="http://schemas.microsoft.com/office/drawing/2014/main" id="{06C38860-94F5-BC42-81EA-5652D94D1C57}"/>
+                </a:ext>
+              </a:extLst>
+            </p:cNvPr>
+            <p:cNvSpPr/>
+            <p:nvPr/>
+          </p:nvSpPr>
+          <p:spPr>
+            <a:xfrm>
+              <a:off x="6672448" y="5000434"/>
+              <a:ext cx="775386" cy="291737"/>
+            </a:xfrm>
+            <a:prstGeom prst="rect">
+              <a:avLst/>
+            </a:prstGeom>
+            <a:noFill/>
+            <a:ln w="19050">
+              <a:solidFill>
+                <a:schemeClr val="accent2"/>
+              </a:solidFill>
+            </a:ln>
+          </p:spPr>
+          <p:style>
+            <a:lnRef idx="2">
+              <a:schemeClr val="accent1">
+                <a:shade val="50000"/>
+              </a:schemeClr>
+            </a:lnRef>
+            <a:fillRef idx="1">
+              <a:schemeClr val="accent1"/>
+            </a:fillRef>
+            <a:effectRef idx="0">
+              <a:schemeClr val="accent1"/>
+            </a:effectRef>
+            <a:fontRef idx="minor">
+              <a:schemeClr val="lt1"/>
+            </a:fontRef>
+          </p:style>
+          <p:txBody>
+            <a:bodyPr rtlCol="0" anchor="ctr"/>
+            <a:lstStyle/>
+            <a:p>
+              <a:pPr algn="ctr"/>
+              <a:r>
+                <a:rPr lang="en-CN" sz="1200" dirty="0">
+                  <a:solidFill>
+                    <a:schemeClr val="accent2">
+                      <a:lumMod val="50000"/>
+                    </a:schemeClr>
+                  </a:solidFill>
+                </a:rPr>
+                <a:t>input_</a:t>
+              </a:r>
+              <a:r>
+                <a:rPr lang="en-US" sz="1200" dirty="0">
+                  <a:solidFill>
+                    <a:schemeClr val="accent2">
+                      <a:lumMod val="50000"/>
+                    </a:schemeClr>
+                  </a:solidFill>
+                </a:rPr>
+                <a:t>0</a:t>
+              </a:r>
+              <a:endParaRPr lang="en-CN" sz="1200" dirty="0">
+                <a:solidFill>
+                  <a:schemeClr val="accent2">
+                    <a:lumMod val="50000"/>
+                  </a:schemeClr>
+                </a:solidFill>
+              </a:endParaRPr>
+            </a:p>
+          </p:txBody>
+        </p:sp>
+        <p:sp>
+          <p:nvSpPr>
+            <p:cNvPr id="224" name="TextBox 223">
+              <a:extLst>
+                <a:ext uri="{FF2B5EF4-FFF2-40B4-BE49-F238E27FC236}">
+                  <a16:creationId xmlns:a16="http://schemas.microsoft.com/office/drawing/2014/main" id="{04D45AE3-A116-CD4E-AF36-7170352CCF3E}"/>
+                </a:ext>
+              </a:extLst>
+            </p:cNvPr>
+            <p:cNvSpPr txBox="1"/>
+            <p:nvPr/>
+          </p:nvSpPr>
+          <p:spPr>
+            <a:xfrm>
+              <a:off x="6404248" y="5925711"/>
+              <a:ext cx="1319645" cy="369332"/>
+            </a:xfrm>
+            <a:prstGeom prst="rect">
+              <a:avLst/>
+            </a:prstGeom>
+            <a:noFill/>
+          </p:spPr>
+          <p:txBody>
+            <a:bodyPr wrap="square" rtlCol="0">
+              <a:spAutoFit/>
+            </a:bodyPr>
+            <a:lstStyle/>
+            <a:p>
+              <a:pPr algn="ctr"/>
+              <a:r>
+                <a:rPr lang="en-CN" b="1" dirty="0">
+                  <a:latin typeface="Times New Roman" panose="02020603050405020304" pitchFamily="18" charset="0"/>
+                  <a:cs typeface="Times New Roman" panose="02020603050405020304" pitchFamily="18" charset="0"/>
+                </a:rPr>
+                <a:t>TX </a:t>
+              </a:r>
+              <a:r>
+                <a:rPr lang="en-US" altLang="zh-CN" b="1" dirty="0">
+                  <a:latin typeface="Times New Roman" panose="02020603050405020304" pitchFamily="18" charset="0"/>
+                  <a:cs typeface="Times New Roman" panose="02020603050405020304" pitchFamily="18" charset="0"/>
+                </a:rPr>
+                <a:t>4</a:t>
+              </a:r>
+            </a:p>
+          </p:txBody>
+        </p:sp>
+        <p:sp>
+          <p:nvSpPr>
+            <p:cNvPr id="227" name="Rectangle 226">
+              <a:extLst>
+                <a:ext uri="{FF2B5EF4-FFF2-40B4-BE49-F238E27FC236}">
+                  <a16:creationId xmlns:a16="http://schemas.microsoft.com/office/drawing/2014/main" id="{AC857872-62F3-D741-877F-EA3DD7FE695F}"/>
+                </a:ext>
+              </a:extLst>
+            </p:cNvPr>
+            <p:cNvSpPr/>
+            <p:nvPr/>
+          </p:nvSpPr>
+          <p:spPr>
+            <a:xfrm>
+              <a:off x="6590146" y="5409895"/>
+              <a:ext cx="947853" cy="409460"/>
+            </a:xfrm>
+            <a:prstGeom prst="rect">
+              <a:avLst/>
+            </a:prstGeom>
+            <a:noFill/>
+            <a:ln w="19050">
+              <a:solidFill>
+                <a:schemeClr val="accent1"/>
+              </a:solidFill>
+            </a:ln>
+          </p:spPr>
+          <p:style>
+            <a:lnRef idx="2">
+              <a:schemeClr val="accent1">
+                <a:shade val="50000"/>
+              </a:schemeClr>
+            </a:lnRef>
+            <a:fillRef idx="1">
+              <a:schemeClr val="accent1"/>
+            </a:fillRef>
+            <a:effectRef idx="0">
+              <a:schemeClr val="accent1"/>
+            </a:effectRef>
+            <a:fontRef idx="minor">
+              <a:schemeClr val="lt1"/>
+            </a:fontRef>
+          </p:style>
+          <p:txBody>
+            <a:bodyPr rtlCol="0" anchor="ctr"/>
+            <a:lstStyle/>
+            <a:p>
+              <a:pPr algn="ctr"/>
+              <a:endParaRPr lang="en-CN"/>
+            </a:p>
+          </p:txBody>
+        </p:sp>
+        <p:sp>
+          <p:nvSpPr>
+            <p:cNvPr id="228" name="Rectangle 227">
+              <a:extLst>
+                <a:ext uri="{FF2B5EF4-FFF2-40B4-BE49-F238E27FC236}">
+                  <a16:creationId xmlns:a16="http://schemas.microsoft.com/office/drawing/2014/main" id="{1FA979D5-AD7F-C246-AB28-F54A3D043CA9}"/>
+                </a:ext>
+              </a:extLst>
+            </p:cNvPr>
+            <p:cNvSpPr/>
+            <p:nvPr/>
+          </p:nvSpPr>
+          <p:spPr>
+            <a:xfrm>
+              <a:off x="6672448" y="5468756"/>
+              <a:ext cx="775386" cy="291737"/>
+            </a:xfrm>
+            <a:prstGeom prst="rect">
+              <a:avLst/>
+            </a:prstGeom>
+            <a:noFill/>
+            <a:ln w="19050">
+              <a:solidFill>
+                <a:schemeClr val="accent1"/>
+              </a:solidFill>
+            </a:ln>
+          </p:spPr>
+          <p:style>
+            <a:lnRef idx="2">
+              <a:schemeClr val="accent1">
+                <a:shade val="50000"/>
+              </a:schemeClr>
+            </a:lnRef>
+            <a:fillRef idx="1">
+              <a:schemeClr val="accent1"/>
+            </a:fillRef>
+            <a:effectRef idx="0">
+              <a:schemeClr val="accent1"/>
+            </a:effectRef>
+            <a:fontRef idx="minor">
+              <a:schemeClr val="lt1"/>
+            </a:fontRef>
+          </p:style>
+          <p:txBody>
+            <a:bodyPr rtlCol="0" anchor="ctr"/>
+            <a:lstStyle/>
+            <a:p>
+              <a:pPr algn="ctr"/>
+              <a:r>
+                <a:rPr lang="en-CN" sz="1200" dirty="0">
+                  <a:solidFill>
+                    <a:schemeClr val="accent1">
+                      <a:lumMod val="50000"/>
+                    </a:schemeClr>
+                  </a:solidFill>
+                </a:rPr>
+                <a:t>output_</a:t>
+              </a:r>
+              <a:r>
+                <a:rPr lang="en-US" sz="1200" dirty="0">
+                  <a:solidFill>
+                    <a:schemeClr val="accent1">
+                      <a:lumMod val="50000"/>
+                    </a:schemeClr>
+                  </a:solidFill>
+                </a:rPr>
+                <a:t>0</a:t>
+              </a:r>
+              <a:endParaRPr lang="en-CN" sz="1200" dirty="0">
+                <a:solidFill>
+                  <a:schemeClr val="accent1">
+                    <a:lumMod val="50000"/>
+                  </a:schemeClr>
+                </a:solidFill>
+              </a:endParaRPr>
+            </a:p>
+          </p:txBody>
+        </p:sp>
+        <p:cxnSp>
+          <p:nvCxnSpPr>
+            <p:cNvPr id="231" name="Elbow Connector 230">
+              <a:extLst>
+                <a:ext uri="{FF2B5EF4-FFF2-40B4-BE49-F238E27FC236}">
+                  <a16:creationId xmlns:a16="http://schemas.microsoft.com/office/drawing/2014/main" id="{A0FE882D-E3F2-FB48-8DB4-4BF301919A69}"/>
+                </a:ext>
+              </a:extLst>
+            </p:cNvPr>
+            <p:cNvCxnSpPr>
+              <a:cxnSpLocks/>
+              <a:stCxn id="102" idx="3"/>
+              <a:endCxn id="223" idx="1"/>
+            </p:cNvCxnSpPr>
+            <p:nvPr/>
+          </p:nvCxnSpPr>
+          <p:spPr>
+            <a:xfrm>
+              <a:off x="5788895" y="2911332"/>
+              <a:ext cx="883553" cy="2234971"/>
+            </a:xfrm>
+            <a:prstGeom prst="bentConnector3">
+              <a:avLst>
+                <a:gd name="adj1" fmla="val 50000"/>
+              </a:avLst>
+            </a:prstGeom>
+            <a:ln w="12700">
+              <a:solidFill>
+                <a:schemeClr val="tx1"/>
+              </a:solidFill>
+              <a:tailEnd type="stealth" w="lg" len="lg"/>
+            </a:ln>
+          </p:spPr>
+          <p:style>
+            <a:lnRef idx="1">
+              <a:schemeClr val="accent1"/>
+            </a:lnRef>
+            <a:fillRef idx="0">
+              <a:schemeClr val="accent1"/>
+            </a:fillRef>
+            <a:effectRef idx="0">
+              <a:schemeClr val="accent1"/>
+            </a:effectRef>
+            <a:fontRef idx="minor">
+              <a:schemeClr val="tx1"/>
+            </a:fontRef>
+          </p:style>
+        </p:cxnSp>
       </p:grpSp>
+      <p:sp>
+        <p:nvSpPr>
+          <p:cNvPr id="237" name="Rounded Rectangle 236">
+            <a:extLst>
+              <a:ext uri="{FF2B5EF4-FFF2-40B4-BE49-F238E27FC236}">
+                <a16:creationId xmlns:a16="http://schemas.microsoft.com/office/drawing/2014/main" id="{3864D9EF-DB38-9547-98A3-57300C4B5BAD}"/>
+              </a:ext>
+            </a:extLst>
+          </p:cNvPr>
+          <p:cNvSpPr/>
+          <p:nvPr/>
+        </p:nvSpPr>
+        <p:spPr>
+          <a:xfrm>
+            <a:off x="1924546" y="48737"/>
+            <a:ext cx="9921254" cy="6384937"/>
+          </a:xfrm>
+          <a:prstGeom prst="roundRect">
+            <a:avLst>
+              <a:gd name="adj" fmla="val 1152"/>
+            </a:avLst>
+          </a:prstGeom>
+          <a:noFill/>
+          <a:ln w="19050">
+            <a:solidFill>
+              <a:schemeClr val="tx1"/>
+            </a:solidFill>
+            <a:prstDash val="dash"/>
+          </a:ln>
+        </p:spPr>
+        <p:style>
+          <a:lnRef idx="2">
+            <a:schemeClr val="accent1">
+              <a:shade val="50000"/>
+            </a:schemeClr>
+          </a:lnRef>
+          <a:fillRef idx="1">
+            <a:schemeClr val="accent1"/>
+          </a:fillRef>
+          <a:effectRef idx="0">
+            <a:schemeClr val="accent1"/>
+          </a:effectRef>
+          <a:fontRef idx="minor">
+            <a:schemeClr val="lt1"/>
+          </a:fontRef>
+        </p:style>
+        <p:txBody>
+          <a:bodyPr rtlCol="0" anchor="ctr"/>
+          <a:lstStyle/>
+          <a:p>
+            <a:pPr algn="ctr"/>
+            <a:endParaRPr lang="en-CN"/>
+          </a:p>
+        </p:txBody>
+      </p:sp>
     </p:spTree>
     <p:extLst>
       <p:ext uri="{BB962C8B-B14F-4D97-AF65-F5344CB8AC3E}">
         <p14:creationId xmlns:p14="http://schemas.microsoft.com/office/powerpoint/2010/main" val="47017450"/>
+      </p:ext>
+    </p:extLst>
+  </p:cSld>
+  <p:clrMapOvr>
+    <a:masterClrMapping/>
+  </p:clrMapOvr>
+</p:sld>
+</file>
+
+<file path=ppt/slides/slide2.xml><?xml version="1.0" encoding="utf-8"?>
+<p:sld xmlns:a="http://schemas.openxmlformats.org/drawingml/2006/main" xmlns:r="http://schemas.openxmlformats.org/officeDocument/2006/relationships" xmlns:p="http://schemas.openxmlformats.org/presentationml/2006/main">
+  <p:cSld>
+    <p:spTree>
+      <p:nvGrpSpPr>
+        <p:cNvPr id="1" name=""/>
+        <p:cNvGrpSpPr/>
+        <p:nvPr/>
+      </p:nvGrpSpPr>
+      <p:grpSpPr>
+        <a:xfrm>
+          <a:off x="0" y="0"/>
+          <a:ext cx="0" cy="0"/>
+          <a:chOff x="0" y="0"/>
+          <a:chExt cx="0" cy="0"/>
+        </a:xfrm>
+      </p:grpSpPr>
+      <p:pic>
+        <p:nvPicPr>
+          <p:cNvPr id="212" name="Picture 211">
+            <a:extLst>
+              <a:ext uri="{FF2B5EF4-FFF2-40B4-BE49-F238E27FC236}">
+                <a16:creationId xmlns:a16="http://schemas.microsoft.com/office/drawing/2014/main" id="{E3641C17-F79D-D549-B904-501DE22990EE}"/>
+              </a:ext>
+            </a:extLst>
+          </p:cNvPr>
+          <p:cNvPicPr>
+            <a:picLocks noChangeAspect="1"/>
+          </p:cNvPicPr>
+          <p:nvPr/>
+        </p:nvPicPr>
+        <p:blipFill>
+          <a:blip r:embed="rId2"/>
+          <a:stretch>
+            <a:fillRect/>
+          </a:stretch>
+        </p:blipFill>
+        <p:spPr>
+          <a:xfrm>
+            <a:off x="1123950" y="222250"/>
+            <a:ext cx="9944100" cy="6413500"/>
+          </a:xfrm>
+          <a:prstGeom prst="rect">
+            <a:avLst/>
+          </a:prstGeom>
+        </p:spPr>
+      </p:pic>
+    </p:spTree>
+    <p:extLst>
+      <p:ext uri="{BB962C8B-B14F-4D97-AF65-F5344CB8AC3E}">
+        <p14:creationId xmlns:p14="http://schemas.microsoft.com/office/powerpoint/2010/main" val="2730330947"/>
       </p:ext>
     </p:extLst>
   </p:cSld>

</xml_diff>

<commit_message>
add: add the Test (#1)
</commit_message>
<xml_diff>
--- a/Homeworks/Homework_1/H1_Proejct/docs/Images.pptx
+++ b/Homeworks/Homework_1/H1_Proejct/docs/Images.pptx
@@ -7,6 +7,7 @@
   <p:sldIdLst>
     <p:sldId id="256" r:id="rId2"/>
     <p:sldId id="257" r:id="rId3"/>
+    <p:sldId id="258" r:id="rId4"/>
   </p:sldIdLst>
   <p:sldSz cx="12192000" cy="6858000"/>
   <p:notesSz cx="6858000" cy="9144000"/>
@@ -7555,8 +7556,8 @@
         </p:blipFill>
         <p:spPr>
           <a:xfrm>
-            <a:off x="1123950" y="222250"/>
-            <a:ext cx="9944100" cy="6413500"/>
+            <a:off x="-50458545" y="-33046154"/>
+            <a:ext cx="113109089" cy="72950307"/>
           </a:xfrm>
           <a:prstGeom prst="rect">
             <a:avLst/>
@@ -7567,6 +7568,4096 @@
     <p:extLst>
       <p:ext uri="{BB962C8B-B14F-4D97-AF65-F5344CB8AC3E}">
         <p14:creationId xmlns:p14="http://schemas.microsoft.com/office/powerpoint/2010/main" val="2730330947"/>
+      </p:ext>
+    </p:extLst>
+  </p:cSld>
+  <p:clrMapOvr>
+    <a:masterClrMapping/>
+  </p:clrMapOvr>
+</p:sld>
+</file>
+
+<file path=ppt/slides/slide3.xml><?xml version="1.0" encoding="utf-8"?>
+<p:sld xmlns:a="http://schemas.openxmlformats.org/drawingml/2006/main" xmlns:r="http://schemas.openxmlformats.org/officeDocument/2006/relationships" xmlns:p="http://schemas.openxmlformats.org/presentationml/2006/main">
+  <p:cSld>
+    <p:spTree>
+      <p:nvGrpSpPr>
+        <p:cNvPr id="1" name=""/>
+        <p:cNvGrpSpPr/>
+        <p:nvPr/>
+      </p:nvGrpSpPr>
+      <p:grpSpPr>
+        <a:xfrm>
+          <a:off x="0" y="0"/>
+          <a:ext cx="0" cy="0"/>
+          <a:chOff x="0" y="0"/>
+          <a:chExt cx="0" cy="0"/>
+        </a:xfrm>
+      </p:grpSpPr>
+      <p:grpSp>
+        <p:nvGrpSpPr>
+          <p:cNvPr id="79" name="Group 78">
+            <a:extLst>
+              <a:ext uri="{FF2B5EF4-FFF2-40B4-BE49-F238E27FC236}">
+                <a16:creationId xmlns:a16="http://schemas.microsoft.com/office/drawing/2014/main" id="{5A046EB9-EAA9-6946-91F8-8CFC11FA85B3}"/>
+              </a:ext>
+            </a:extLst>
+          </p:cNvPr>
+          <p:cNvGrpSpPr/>
+          <p:nvPr/>
+        </p:nvGrpSpPr>
+        <p:grpSpPr>
+          <a:xfrm>
+            <a:off x="283757" y="290456"/>
+            <a:ext cx="2201259" cy="2697372"/>
+            <a:chOff x="283757" y="0"/>
+            <a:chExt cx="2201259" cy="2697372"/>
+          </a:xfrm>
+        </p:grpSpPr>
+        <p:sp>
+          <p:nvSpPr>
+            <p:cNvPr id="5" name="TextBox 4">
+              <a:extLst>
+                <a:ext uri="{FF2B5EF4-FFF2-40B4-BE49-F238E27FC236}">
+                  <a16:creationId xmlns:a16="http://schemas.microsoft.com/office/drawing/2014/main" id="{F82680E9-3721-E740-81DB-71DFED8DD597}"/>
+                </a:ext>
+              </a:extLst>
+            </p:cNvPr>
+            <p:cNvSpPr txBox="1"/>
+            <p:nvPr/>
+          </p:nvSpPr>
+          <p:spPr>
+            <a:xfrm>
+              <a:off x="283758" y="2328040"/>
+              <a:ext cx="2201258" cy="369332"/>
+            </a:xfrm>
+            <a:prstGeom prst="rect">
+              <a:avLst/>
+            </a:prstGeom>
+            <a:noFill/>
+          </p:spPr>
+          <p:txBody>
+            <a:bodyPr wrap="square" rtlCol="0">
+              <a:spAutoFit/>
+            </a:bodyPr>
+            <a:lstStyle/>
+            <a:p>
+              <a:pPr algn="ctr"/>
+              <a:r>
+                <a:rPr lang="en-CN" b="1" dirty="0">
+                  <a:latin typeface="Times New Roman" panose="02020603050405020304" pitchFamily="18" charset="0"/>
+                  <a:cs typeface="Times New Roman" panose="02020603050405020304" pitchFamily="18" charset="0"/>
+                </a:rPr>
+                <a:t>TX 0</a:t>
+              </a:r>
+            </a:p>
+          </p:txBody>
+        </p:sp>
+        <p:cxnSp>
+          <p:nvCxnSpPr>
+            <p:cNvPr id="6" name="Straight Connector 5">
+              <a:extLst>
+                <a:ext uri="{FF2B5EF4-FFF2-40B4-BE49-F238E27FC236}">
+                  <a16:creationId xmlns:a16="http://schemas.microsoft.com/office/drawing/2014/main" id="{16E4CF8D-4809-9543-A4B5-0C91D6984BF1}"/>
+                </a:ext>
+              </a:extLst>
+            </p:cNvPr>
+            <p:cNvCxnSpPr>
+              <a:cxnSpLocks/>
+            </p:cNvCxnSpPr>
+            <p:nvPr/>
+          </p:nvCxnSpPr>
+          <p:spPr>
+            <a:xfrm>
+              <a:off x="283757" y="318220"/>
+              <a:ext cx="2201259" cy="0"/>
+            </a:xfrm>
+            <a:prstGeom prst="line">
+              <a:avLst/>
+            </a:prstGeom>
+            <a:ln w="19050">
+              <a:solidFill>
+                <a:schemeClr val="tx1"/>
+              </a:solidFill>
+            </a:ln>
+          </p:spPr>
+          <p:style>
+            <a:lnRef idx="1">
+              <a:schemeClr val="accent1"/>
+            </a:lnRef>
+            <a:fillRef idx="0">
+              <a:schemeClr val="accent1"/>
+            </a:fillRef>
+            <a:effectRef idx="0">
+              <a:schemeClr val="accent1"/>
+            </a:effectRef>
+            <a:fontRef idx="minor">
+              <a:schemeClr val="tx1"/>
+            </a:fontRef>
+          </p:style>
+        </p:cxnSp>
+        <p:grpSp>
+          <p:nvGrpSpPr>
+            <p:cNvPr id="77" name="Group 76">
+              <a:extLst>
+                <a:ext uri="{FF2B5EF4-FFF2-40B4-BE49-F238E27FC236}">
+                  <a16:creationId xmlns:a16="http://schemas.microsoft.com/office/drawing/2014/main" id="{E29F0042-D086-E149-B64D-7C7086C25840}"/>
+                </a:ext>
+              </a:extLst>
+            </p:cNvPr>
+            <p:cNvGrpSpPr/>
+            <p:nvPr/>
+          </p:nvGrpSpPr>
+          <p:grpSpPr>
+            <a:xfrm>
+              <a:off x="419204" y="438300"/>
+              <a:ext cx="1930361" cy="910988"/>
+              <a:chOff x="376703" y="584325"/>
+              <a:chExt cx="1930361" cy="910988"/>
+            </a:xfrm>
+          </p:grpSpPr>
+          <p:sp>
+            <p:nvSpPr>
+              <p:cNvPr id="8" name="Rectangle 7">
+                <a:extLst>
+                  <a:ext uri="{FF2B5EF4-FFF2-40B4-BE49-F238E27FC236}">
+                    <a16:creationId xmlns:a16="http://schemas.microsoft.com/office/drawing/2014/main" id="{2BC28484-E746-4142-8541-48D31ED6C27A}"/>
+                  </a:ext>
+                </a:extLst>
+              </p:cNvPr>
+              <p:cNvSpPr/>
+              <p:nvPr/>
+            </p:nvSpPr>
+            <p:spPr>
+              <a:xfrm>
+                <a:off x="376703" y="584325"/>
+                <a:ext cx="1930361" cy="910988"/>
+              </a:xfrm>
+              <a:prstGeom prst="rect">
+                <a:avLst/>
+              </a:prstGeom>
+              <a:noFill/>
+              <a:ln w="19050">
+                <a:solidFill>
+                  <a:schemeClr val="accent2"/>
+                </a:solidFill>
+              </a:ln>
+            </p:spPr>
+            <p:style>
+              <a:lnRef idx="2">
+                <a:schemeClr val="accent1">
+                  <a:shade val="50000"/>
+                </a:schemeClr>
+              </a:lnRef>
+              <a:fillRef idx="1">
+                <a:schemeClr val="accent1"/>
+              </a:fillRef>
+              <a:effectRef idx="0">
+                <a:schemeClr val="accent1"/>
+              </a:effectRef>
+              <a:fontRef idx="minor">
+                <a:schemeClr val="lt1"/>
+              </a:fontRef>
+            </p:style>
+            <p:txBody>
+              <a:bodyPr rtlCol="0" anchor="ctr"/>
+              <a:lstStyle/>
+              <a:p>
+                <a:pPr algn="ctr"/>
+                <a:endParaRPr lang="en-CN">
+                  <a:solidFill>
+                    <a:schemeClr val="accent2">
+                      <a:lumMod val="50000"/>
+                    </a:schemeClr>
+                  </a:solidFill>
+                </a:endParaRPr>
+              </a:p>
+            </p:txBody>
+          </p:sp>
+          <p:sp>
+            <p:nvSpPr>
+              <p:cNvPr id="10" name="Rectangle 9">
+                <a:extLst>
+                  <a:ext uri="{FF2B5EF4-FFF2-40B4-BE49-F238E27FC236}">
+                    <a16:creationId xmlns:a16="http://schemas.microsoft.com/office/drawing/2014/main" id="{1E44751F-AFD0-2343-8FEE-704BA4454EB8}"/>
+                  </a:ext>
+                </a:extLst>
+              </p:cNvPr>
+              <p:cNvSpPr/>
+              <p:nvPr/>
+            </p:nvSpPr>
+            <p:spPr>
+              <a:xfrm>
+                <a:off x="482828" y="698725"/>
+                <a:ext cx="1718110" cy="682187"/>
+              </a:xfrm>
+              <a:prstGeom prst="rect">
+                <a:avLst/>
+              </a:prstGeom>
+              <a:noFill/>
+              <a:ln w="19050">
+                <a:solidFill>
+                  <a:schemeClr val="accent2"/>
+                </a:solidFill>
+              </a:ln>
+            </p:spPr>
+            <p:style>
+              <a:lnRef idx="2">
+                <a:schemeClr val="accent1">
+                  <a:shade val="50000"/>
+                </a:schemeClr>
+              </a:lnRef>
+              <a:fillRef idx="1">
+                <a:schemeClr val="accent1"/>
+              </a:fillRef>
+              <a:effectRef idx="0">
+                <a:schemeClr val="accent1"/>
+              </a:effectRef>
+              <a:fontRef idx="minor">
+                <a:schemeClr val="lt1"/>
+              </a:fontRef>
+            </p:style>
+            <p:txBody>
+              <a:bodyPr rtlCol="0" anchor="ctr"/>
+              <a:lstStyle/>
+              <a:p>
+                <a:pPr algn="ctr"/>
+                <a:r>
+                  <a:rPr lang="en-CN" sz="1200" dirty="0">
+                    <a:solidFill>
+                      <a:schemeClr val="accent2">
+                        <a:lumMod val="50000"/>
+                      </a:schemeClr>
+                    </a:solidFill>
+                  </a:rPr>
+                  <a:t>input_</a:t>
+                </a:r>
+                <a:r>
+                  <a:rPr lang="en-US" sz="1200" dirty="0">
+                    <a:solidFill>
+                      <a:schemeClr val="accent2">
+                        <a:lumMod val="50000"/>
+                      </a:schemeClr>
+                    </a:solidFill>
+                  </a:rPr>
+                  <a:t>0</a:t>
+                </a:r>
+              </a:p>
+              <a:p>
+                <a:pPr algn="ctr"/>
+                <a:r>
+                  <a:rPr lang="en-US" sz="900" b="1" u="sng" dirty="0">
+                    <a:solidFill>
+                      <a:schemeClr val="accent2">
+                        <a:lumMod val="50000"/>
+                      </a:schemeClr>
+                    </a:solidFill>
+                    <a:effectLst/>
+                  </a:rPr>
+                  <a:t>prevTxHash</a:t>
+                </a:r>
+                <a:r>
+                  <a:rPr lang="en-US" sz="900" dirty="0">
+                    <a:solidFill>
+                      <a:schemeClr val="accent2">
+                        <a:lumMod val="50000"/>
+                      </a:schemeClr>
+                    </a:solidFill>
+                    <a:effectLst/>
+                  </a:rPr>
+                  <a:t>=[0]</a:t>
+                </a:r>
+              </a:p>
+              <a:p>
+                <a:pPr algn="ctr"/>
+                <a:r>
+                  <a:rPr lang="en-US" sz="900" b="1" u="sng" dirty="0">
+                    <a:solidFill>
+                      <a:schemeClr val="accent2">
+                        <a:lumMod val="50000"/>
+                      </a:schemeClr>
+                    </a:solidFill>
+                    <a:effectLst/>
+                  </a:rPr>
+                  <a:t>outputIndex</a:t>
+                </a:r>
+                <a:r>
+                  <a:rPr lang="en-US" sz="900" dirty="0">
+                    <a:solidFill>
+                      <a:schemeClr val="accent2">
+                        <a:lumMod val="50000"/>
+                      </a:schemeClr>
+                    </a:solidFill>
+                  </a:rPr>
+                  <a:t>=0</a:t>
+                </a:r>
+              </a:p>
+              <a:p>
+                <a:pPr algn="ctr"/>
+                <a:r>
+                  <a:rPr lang="en-US" sz="900" b="1" u="sng" dirty="0">
+                    <a:solidFill>
+                      <a:schemeClr val="accent2">
+                        <a:lumMod val="50000"/>
+                      </a:schemeClr>
+                    </a:solidFill>
+                  </a:rPr>
+                  <a:t>s</a:t>
+                </a:r>
+                <a:r>
+                  <a:rPr lang="en-US" sz="900" b="1" u="sng" dirty="0">
+                    <a:solidFill>
+                      <a:schemeClr val="accent2">
+                        <a:lumMod val="50000"/>
+                      </a:schemeClr>
+                    </a:solidFill>
+                    <a:effectLst/>
+                  </a:rPr>
+                  <a:t>ignature</a:t>
+                </a:r>
+                <a:r>
+                  <a:rPr lang="en-US" sz="900" dirty="0">
+                    <a:solidFill>
+                      <a:schemeClr val="accent2">
+                        <a:lumMod val="50000"/>
+                      </a:schemeClr>
+                    </a:solidFill>
+                  </a:rPr>
+                  <a:t>=sig(</a:t>
+                </a:r>
+                <a:r>
+                  <a:rPr lang="en-US" sz="900" dirty="0" err="1">
+                    <a:solidFill>
+                      <a:schemeClr val="accent2">
+                        <a:lumMod val="50000"/>
+                      </a:schemeClr>
+                    </a:solidFill>
+                    <a:effectLst/>
+                  </a:rPr>
+                  <a:t>kScrooge_sk</a:t>
+                </a:r>
+                <a:r>
+                  <a:rPr lang="en-US" sz="900" dirty="0">
+                    <a:solidFill>
+                      <a:schemeClr val="accent2">
+                        <a:lumMod val="50000"/>
+                      </a:schemeClr>
+                    </a:solidFill>
+                    <a:effectLst/>
+                  </a:rPr>
+                  <a:t>, 0</a:t>
+                </a:r>
+                <a:r>
+                  <a:rPr lang="en-US" sz="900" dirty="0">
+                    <a:solidFill>
+                      <a:schemeClr val="accent2">
+                        <a:lumMod val="50000"/>
+                      </a:schemeClr>
+                    </a:solidFill>
+                  </a:rPr>
+                  <a:t>)</a:t>
+                </a:r>
+                <a:endParaRPr lang="en-US" sz="900" dirty="0">
+                  <a:solidFill>
+                    <a:schemeClr val="accent2">
+                      <a:lumMod val="50000"/>
+                    </a:schemeClr>
+                  </a:solidFill>
+                  <a:effectLst/>
+                </a:endParaRPr>
+              </a:p>
+            </p:txBody>
+          </p:sp>
+        </p:grpSp>
+        <p:grpSp>
+          <p:nvGrpSpPr>
+            <p:cNvPr id="78" name="Group 77">
+              <a:extLst>
+                <a:ext uri="{FF2B5EF4-FFF2-40B4-BE49-F238E27FC236}">
+                  <a16:creationId xmlns:a16="http://schemas.microsoft.com/office/drawing/2014/main" id="{580533A2-0494-CB4B-8609-B2B36B3E9709}"/>
+                </a:ext>
+              </a:extLst>
+            </p:cNvPr>
+            <p:cNvGrpSpPr/>
+            <p:nvPr/>
+          </p:nvGrpSpPr>
+          <p:grpSpPr>
+            <a:xfrm>
+              <a:off x="419204" y="1451419"/>
+              <a:ext cx="1930361" cy="774490"/>
+              <a:chOff x="376703" y="1692392"/>
+              <a:chExt cx="1930361" cy="774490"/>
+            </a:xfrm>
+          </p:grpSpPr>
+          <p:sp>
+            <p:nvSpPr>
+              <p:cNvPr id="9" name="Rectangle 8">
+                <a:extLst>
+                  <a:ext uri="{FF2B5EF4-FFF2-40B4-BE49-F238E27FC236}">
+                    <a16:creationId xmlns:a16="http://schemas.microsoft.com/office/drawing/2014/main" id="{53701028-450B-5F49-A041-DCD3CA1E4CEC}"/>
+                  </a:ext>
+                </a:extLst>
+              </p:cNvPr>
+              <p:cNvSpPr/>
+              <p:nvPr/>
+            </p:nvSpPr>
+            <p:spPr>
+              <a:xfrm>
+                <a:off x="376703" y="1692392"/>
+                <a:ext cx="1930361" cy="774490"/>
+              </a:xfrm>
+              <a:prstGeom prst="rect">
+                <a:avLst/>
+              </a:prstGeom>
+              <a:noFill/>
+              <a:ln w="19050">
+                <a:solidFill>
+                  <a:schemeClr val="accent1"/>
+                </a:solidFill>
+              </a:ln>
+            </p:spPr>
+            <p:style>
+              <a:lnRef idx="2">
+                <a:schemeClr val="accent1">
+                  <a:shade val="50000"/>
+                </a:schemeClr>
+              </a:lnRef>
+              <a:fillRef idx="1">
+                <a:schemeClr val="accent1"/>
+              </a:fillRef>
+              <a:effectRef idx="0">
+                <a:schemeClr val="accent1"/>
+              </a:effectRef>
+              <a:fontRef idx="minor">
+                <a:schemeClr val="lt1"/>
+              </a:fontRef>
+            </p:style>
+            <p:txBody>
+              <a:bodyPr rtlCol="0" anchor="ctr"/>
+              <a:lstStyle/>
+              <a:p>
+                <a:pPr algn="ctr"/>
+                <a:endParaRPr lang="en-CN"/>
+              </a:p>
+            </p:txBody>
+          </p:sp>
+          <p:sp>
+            <p:nvSpPr>
+              <p:cNvPr id="13" name="Rectangle 12">
+                <a:extLst>
+                  <a:ext uri="{FF2B5EF4-FFF2-40B4-BE49-F238E27FC236}">
+                    <a16:creationId xmlns:a16="http://schemas.microsoft.com/office/drawing/2014/main" id="{99F84DCD-A37D-C644-A02C-5BA03099E2E8}"/>
+                  </a:ext>
+                </a:extLst>
+              </p:cNvPr>
+              <p:cNvSpPr/>
+              <p:nvPr/>
+            </p:nvSpPr>
+            <p:spPr>
+              <a:xfrm>
+                <a:off x="476808" y="1791837"/>
+                <a:ext cx="1718108" cy="576129"/>
+              </a:xfrm>
+              <a:prstGeom prst="rect">
+                <a:avLst/>
+              </a:prstGeom>
+              <a:noFill/>
+              <a:ln w="19050">
+                <a:solidFill>
+                  <a:schemeClr val="accent1"/>
+                </a:solidFill>
+              </a:ln>
+            </p:spPr>
+            <p:style>
+              <a:lnRef idx="2">
+                <a:schemeClr val="accent1">
+                  <a:shade val="50000"/>
+                </a:schemeClr>
+              </a:lnRef>
+              <a:fillRef idx="1">
+                <a:schemeClr val="accent1"/>
+              </a:fillRef>
+              <a:effectRef idx="0">
+                <a:schemeClr val="accent1"/>
+              </a:effectRef>
+              <a:fontRef idx="minor">
+                <a:schemeClr val="lt1"/>
+              </a:fontRef>
+            </p:style>
+            <p:txBody>
+              <a:bodyPr rtlCol="0" anchor="ctr"/>
+              <a:lstStyle/>
+              <a:p>
+                <a:pPr algn="ctr"/>
+                <a:r>
+                  <a:rPr lang="en-CN" sz="1200" dirty="0">
+                    <a:solidFill>
+                      <a:schemeClr val="accent1">
+                        <a:lumMod val="50000"/>
+                      </a:schemeClr>
+                    </a:solidFill>
+                  </a:rPr>
+                  <a:t>output_</a:t>
+                </a:r>
+                <a:r>
+                  <a:rPr lang="en-US" sz="1200" dirty="0">
+                    <a:solidFill>
+                      <a:schemeClr val="accent1">
+                        <a:lumMod val="50000"/>
+                      </a:schemeClr>
+                    </a:solidFill>
+                  </a:rPr>
+                  <a:t>0</a:t>
+                </a:r>
+              </a:p>
+              <a:p>
+                <a:pPr algn="ctr"/>
+                <a:r>
+                  <a:rPr lang="en-US" sz="900" b="1" u="sng" dirty="0">
+                    <a:solidFill>
+                      <a:schemeClr val="accent1">
+                        <a:lumMod val="50000"/>
+                      </a:schemeClr>
+                    </a:solidFill>
+                    <a:effectLst/>
+                  </a:rPr>
+                  <a:t>value</a:t>
+                </a:r>
+                <a:r>
+                  <a:rPr lang="en-US" altLang="zh-CN" sz="900" dirty="0">
+                    <a:solidFill>
+                      <a:schemeClr val="accent1">
+                        <a:lumMod val="50000"/>
+                      </a:schemeClr>
+                    </a:solidFill>
+                    <a:effectLst/>
+                  </a:rPr>
+                  <a:t>=10</a:t>
+                </a:r>
+                <a:endParaRPr lang="en-US" sz="900" dirty="0">
+                  <a:solidFill>
+                    <a:schemeClr val="accent1">
+                      <a:lumMod val="50000"/>
+                    </a:schemeClr>
+                  </a:solidFill>
+                  <a:effectLst/>
+                </a:endParaRPr>
+              </a:p>
+              <a:p>
+                <a:pPr algn="ctr"/>
+                <a:r>
+                  <a:rPr lang="en-US" sz="900" b="1" u="sng" dirty="0">
+                    <a:solidFill>
+                      <a:schemeClr val="accent1">
+                        <a:lumMod val="50000"/>
+                      </a:schemeClr>
+                    </a:solidFill>
+                    <a:effectLst/>
+                  </a:rPr>
+                  <a:t>address</a:t>
+                </a:r>
+                <a:r>
+                  <a:rPr lang="en-US" altLang="zh-CN" sz="900" dirty="0">
+                    <a:solidFill>
+                      <a:schemeClr val="accent1">
+                        <a:lumMod val="50000"/>
+                      </a:schemeClr>
+                    </a:solidFill>
+                    <a:effectLst/>
+                  </a:rPr>
+                  <a:t>=</a:t>
+                </a:r>
+                <a:r>
+                  <a:rPr lang="en-US" sz="900" dirty="0">
+                    <a:solidFill>
+                      <a:schemeClr val="accent1">
+                        <a:lumMod val="50000"/>
+                      </a:schemeClr>
+                    </a:solidFill>
+                    <a:effectLst/>
+                  </a:rPr>
+                  <a:t> </a:t>
+                </a:r>
+                <a:r>
+                  <a:rPr lang="en-US" sz="900" dirty="0" err="1">
+                    <a:solidFill>
+                      <a:schemeClr val="accent1">
+                        <a:lumMod val="50000"/>
+                      </a:schemeClr>
+                    </a:solidFill>
+                    <a:effectLst/>
+                  </a:rPr>
+                  <a:t>kScrooge</a:t>
+                </a:r>
+                <a:r>
+                  <a:rPr lang="en-CN" sz="900" dirty="0">
+                    <a:solidFill>
+                      <a:schemeClr val="accent1">
+                        <a:lumMod val="50000"/>
+                      </a:schemeClr>
+                    </a:solidFill>
+                  </a:rPr>
+                  <a:t>_pk</a:t>
+                </a:r>
+              </a:p>
+            </p:txBody>
+          </p:sp>
+        </p:grpSp>
+        <p:sp>
+          <p:nvSpPr>
+            <p:cNvPr id="62" name="Rounded Rectangle 61">
+              <a:extLst>
+                <a:ext uri="{FF2B5EF4-FFF2-40B4-BE49-F238E27FC236}">
+                  <a16:creationId xmlns:a16="http://schemas.microsoft.com/office/drawing/2014/main" id="{858AB99D-7DB4-0643-AAB9-92CF48DA6DEF}"/>
+                </a:ext>
+              </a:extLst>
+            </p:cNvPr>
+            <p:cNvSpPr/>
+            <p:nvPr/>
+          </p:nvSpPr>
+          <p:spPr>
+            <a:xfrm>
+              <a:off x="283757" y="0"/>
+              <a:ext cx="2201259" cy="2334409"/>
+            </a:xfrm>
+            <a:prstGeom prst="roundRect">
+              <a:avLst>
+                <a:gd name="adj" fmla="val 3417"/>
+              </a:avLst>
+            </a:prstGeom>
+            <a:noFill/>
+            <a:ln w="19050">
+              <a:solidFill>
+                <a:schemeClr val="tx1"/>
+              </a:solidFill>
+            </a:ln>
+          </p:spPr>
+          <p:style>
+            <a:lnRef idx="2">
+              <a:schemeClr val="accent1">
+                <a:shade val="50000"/>
+              </a:schemeClr>
+            </a:lnRef>
+            <a:fillRef idx="1">
+              <a:schemeClr val="accent1"/>
+            </a:fillRef>
+            <a:effectRef idx="0">
+              <a:schemeClr val="accent1"/>
+            </a:effectRef>
+            <a:fontRef idx="minor">
+              <a:schemeClr val="lt1"/>
+            </a:fontRef>
+          </p:style>
+          <p:txBody>
+            <a:bodyPr rtlCol="0" anchor="ctr"/>
+            <a:lstStyle/>
+            <a:p>
+              <a:pPr algn="ctr"/>
+              <a:endParaRPr lang="en-CN">
+                <a:latin typeface="Times New Roman" panose="02020603050405020304" pitchFamily="18" charset="0"/>
+                <a:cs typeface="Times New Roman" panose="02020603050405020304" pitchFamily="18" charset="0"/>
+              </a:endParaRPr>
+            </a:p>
+          </p:txBody>
+        </p:sp>
+        <p:sp>
+          <p:nvSpPr>
+            <p:cNvPr id="76" name="TextBox 75">
+              <a:extLst>
+                <a:ext uri="{FF2B5EF4-FFF2-40B4-BE49-F238E27FC236}">
+                  <a16:creationId xmlns:a16="http://schemas.microsoft.com/office/drawing/2014/main" id="{7F4C29A0-45DD-AF4E-8225-395C6D05EE61}"/>
+                </a:ext>
+              </a:extLst>
+            </p:cNvPr>
+            <p:cNvSpPr txBox="1"/>
+            <p:nvPr/>
+          </p:nvSpPr>
+          <p:spPr>
+            <a:xfrm>
+              <a:off x="283757" y="6206"/>
+              <a:ext cx="2201259" cy="323165"/>
+            </a:xfrm>
+            <a:prstGeom prst="rect">
+              <a:avLst/>
+            </a:prstGeom>
+            <a:noFill/>
+          </p:spPr>
+          <p:txBody>
+            <a:bodyPr wrap="square" rtlCol="0">
+              <a:spAutoFit/>
+            </a:bodyPr>
+            <a:lstStyle/>
+            <a:p>
+              <a:pPr algn="ctr"/>
+              <a:r>
+                <a:rPr lang="en-US" sz="1500" dirty="0"/>
+                <a:t>h</a:t>
+              </a:r>
+              <a:r>
+                <a:rPr lang="en-US" sz="1500" dirty="0">
+                  <a:effectLst/>
+                </a:rPr>
+                <a:t>ash_0</a:t>
+              </a:r>
+            </a:p>
+          </p:txBody>
+        </p:sp>
+      </p:grpSp>
+      <p:sp>
+        <p:nvSpPr>
+          <p:cNvPr id="81" name="TextBox 80">
+            <a:extLst>
+              <a:ext uri="{FF2B5EF4-FFF2-40B4-BE49-F238E27FC236}">
+                <a16:creationId xmlns:a16="http://schemas.microsoft.com/office/drawing/2014/main" id="{C7D1305B-D499-2D43-98C5-B6B8DF3560CA}"/>
+              </a:ext>
+            </a:extLst>
+          </p:cNvPr>
+          <p:cNvSpPr txBox="1"/>
+          <p:nvPr/>
+        </p:nvSpPr>
+        <p:spPr>
+          <a:xfrm>
+            <a:off x="2942684" y="3295098"/>
+            <a:ext cx="2201258" cy="369332"/>
+          </a:xfrm>
+          <a:prstGeom prst="rect">
+            <a:avLst/>
+          </a:prstGeom>
+          <a:noFill/>
+        </p:spPr>
+        <p:txBody>
+          <a:bodyPr wrap="square" rtlCol="0">
+            <a:spAutoFit/>
+          </a:bodyPr>
+          <a:lstStyle/>
+          <a:p>
+            <a:pPr algn="ctr"/>
+            <a:r>
+              <a:rPr lang="en-CN" b="1" dirty="0">
+                <a:latin typeface="Times New Roman" panose="02020603050405020304" pitchFamily="18" charset="0"/>
+                <a:cs typeface="Times New Roman" panose="02020603050405020304" pitchFamily="18" charset="0"/>
+              </a:rPr>
+              <a:t>TX 1</a:t>
+            </a:r>
+          </a:p>
+        </p:txBody>
+      </p:sp>
+      <p:cxnSp>
+        <p:nvCxnSpPr>
+          <p:cNvPr id="82" name="Straight Connector 81">
+            <a:extLst>
+              <a:ext uri="{FF2B5EF4-FFF2-40B4-BE49-F238E27FC236}">
+                <a16:creationId xmlns:a16="http://schemas.microsoft.com/office/drawing/2014/main" id="{35CB150F-AFFE-134B-A307-087632675807}"/>
+              </a:ext>
+            </a:extLst>
+          </p:cNvPr>
+          <p:cNvCxnSpPr>
+            <a:cxnSpLocks/>
+          </p:cNvCxnSpPr>
+          <p:nvPr/>
+        </p:nvCxnSpPr>
+        <p:spPr>
+          <a:xfrm>
+            <a:off x="2942688" y="609278"/>
+            <a:ext cx="2201259" cy="0"/>
+          </a:xfrm>
+          <a:prstGeom prst="line">
+            <a:avLst/>
+          </a:prstGeom>
+          <a:ln w="19050">
+            <a:solidFill>
+              <a:schemeClr val="tx1"/>
+            </a:solidFill>
+          </a:ln>
+        </p:spPr>
+        <p:style>
+          <a:lnRef idx="1">
+            <a:schemeClr val="accent1"/>
+          </a:lnRef>
+          <a:fillRef idx="0">
+            <a:schemeClr val="accent1"/>
+          </a:fillRef>
+          <a:effectRef idx="0">
+            <a:schemeClr val="accent1"/>
+          </a:effectRef>
+          <a:fontRef idx="minor">
+            <a:schemeClr val="tx1"/>
+          </a:fontRef>
+        </p:style>
+      </p:cxnSp>
+      <p:grpSp>
+        <p:nvGrpSpPr>
+          <p:cNvPr id="83" name="Group 82">
+            <a:extLst>
+              <a:ext uri="{FF2B5EF4-FFF2-40B4-BE49-F238E27FC236}">
+                <a16:creationId xmlns:a16="http://schemas.microsoft.com/office/drawing/2014/main" id="{2F390F6F-912B-FC42-9EF5-9069A6B08A70}"/>
+              </a:ext>
+            </a:extLst>
+          </p:cNvPr>
+          <p:cNvGrpSpPr/>
+          <p:nvPr/>
+        </p:nvGrpSpPr>
+        <p:grpSpPr>
+          <a:xfrm>
+            <a:off x="3078135" y="729358"/>
+            <a:ext cx="1930361" cy="910988"/>
+            <a:chOff x="376703" y="584325"/>
+            <a:chExt cx="1930361" cy="910988"/>
+          </a:xfrm>
+        </p:grpSpPr>
+        <p:sp>
+          <p:nvSpPr>
+            <p:cNvPr id="89" name="Rectangle 88">
+              <a:extLst>
+                <a:ext uri="{FF2B5EF4-FFF2-40B4-BE49-F238E27FC236}">
+                  <a16:creationId xmlns:a16="http://schemas.microsoft.com/office/drawing/2014/main" id="{11A82A4D-F9CC-674D-9D88-F98CC3F5E69C}"/>
+                </a:ext>
+              </a:extLst>
+            </p:cNvPr>
+            <p:cNvSpPr/>
+            <p:nvPr/>
+          </p:nvSpPr>
+          <p:spPr>
+            <a:xfrm>
+              <a:off x="376703" y="584325"/>
+              <a:ext cx="1930361" cy="910988"/>
+            </a:xfrm>
+            <a:prstGeom prst="rect">
+              <a:avLst/>
+            </a:prstGeom>
+            <a:noFill/>
+            <a:ln w="19050">
+              <a:solidFill>
+                <a:schemeClr val="accent2"/>
+              </a:solidFill>
+            </a:ln>
+          </p:spPr>
+          <p:style>
+            <a:lnRef idx="2">
+              <a:schemeClr val="accent1">
+                <a:shade val="50000"/>
+              </a:schemeClr>
+            </a:lnRef>
+            <a:fillRef idx="1">
+              <a:schemeClr val="accent1"/>
+            </a:fillRef>
+            <a:effectRef idx="0">
+              <a:schemeClr val="accent1"/>
+            </a:effectRef>
+            <a:fontRef idx="minor">
+              <a:schemeClr val="lt1"/>
+            </a:fontRef>
+          </p:style>
+          <p:txBody>
+            <a:bodyPr rtlCol="0" anchor="ctr"/>
+            <a:lstStyle/>
+            <a:p>
+              <a:pPr algn="ctr"/>
+              <a:endParaRPr lang="en-CN">
+                <a:solidFill>
+                  <a:schemeClr val="accent2">
+                    <a:lumMod val="50000"/>
+                  </a:schemeClr>
+                </a:solidFill>
+              </a:endParaRPr>
+            </a:p>
+          </p:txBody>
+        </p:sp>
+        <p:sp>
+          <p:nvSpPr>
+            <p:cNvPr id="90" name="Rectangle 89">
+              <a:extLst>
+                <a:ext uri="{FF2B5EF4-FFF2-40B4-BE49-F238E27FC236}">
+                  <a16:creationId xmlns:a16="http://schemas.microsoft.com/office/drawing/2014/main" id="{BFDF1995-0209-DF44-92CB-8F5C48250178}"/>
+                </a:ext>
+              </a:extLst>
+            </p:cNvPr>
+            <p:cNvSpPr/>
+            <p:nvPr/>
+          </p:nvSpPr>
+          <p:spPr>
+            <a:xfrm>
+              <a:off x="482828" y="698725"/>
+              <a:ext cx="1718110" cy="682187"/>
+            </a:xfrm>
+            <a:prstGeom prst="rect">
+              <a:avLst/>
+            </a:prstGeom>
+            <a:noFill/>
+            <a:ln w="19050">
+              <a:solidFill>
+                <a:schemeClr val="accent2"/>
+              </a:solidFill>
+            </a:ln>
+          </p:spPr>
+          <p:style>
+            <a:lnRef idx="2">
+              <a:schemeClr val="accent1">
+                <a:shade val="50000"/>
+              </a:schemeClr>
+            </a:lnRef>
+            <a:fillRef idx="1">
+              <a:schemeClr val="accent1"/>
+            </a:fillRef>
+            <a:effectRef idx="0">
+              <a:schemeClr val="accent1"/>
+            </a:effectRef>
+            <a:fontRef idx="minor">
+              <a:schemeClr val="lt1"/>
+            </a:fontRef>
+          </p:style>
+          <p:txBody>
+            <a:bodyPr rtlCol="0" anchor="ctr"/>
+            <a:lstStyle/>
+            <a:p>
+              <a:pPr algn="ctr"/>
+              <a:r>
+                <a:rPr lang="en-CN" sz="1200" dirty="0">
+                  <a:solidFill>
+                    <a:schemeClr val="accent2">
+                      <a:lumMod val="50000"/>
+                    </a:schemeClr>
+                  </a:solidFill>
+                </a:rPr>
+                <a:t>input_</a:t>
+              </a:r>
+              <a:r>
+                <a:rPr lang="en-US" sz="1200" dirty="0">
+                  <a:solidFill>
+                    <a:schemeClr val="accent2">
+                      <a:lumMod val="50000"/>
+                    </a:schemeClr>
+                  </a:solidFill>
+                </a:rPr>
+                <a:t>0</a:t>
+              </a:r>
+            </a:p>
+            <a:p>
+              <a:pPr algn="ctr"/>
+              <a:r>
+                <a:rPr lang="en-US" sz="900" b="1" u="sng" dirty="0">
+                  <a:solidFill>
+                    <a:schemeClr val="accent2">
+                      <a:lumMod val="50000"/>
+                    </a:schemeClr>
+                  </a:solidFill>
+                  <a:effectLst/>
+                </a:rPr>
+                <a:t>prevTxHash</a:t>
+              </a:r>
+              <a:r>
+                <a:rPr lang="en-US" sz="900" dirty="0">
+                  <a:solidFill>
+                    <a:schemeClr val="accent2">
+                      <a:lumMod val="50000"/>
+                    </a:schemeClr>
+                  </a:solidFill>
+                  <a:effectLst/>
+                </a:rPr>
+                <a:t>=hash_0</a:t>
+              </a:r>
+            </a:p>
+            <a:p>
+              <a:pPr algn="ctr"/>
+              <a:r>
+                <a:rPr lang="en-US" sz="900" b="1" u="sng" dirty="0">
+                  <a:solidFill>
+                    <a:schemeClr val="accent2">
+                      <a:lumMod val="50000"/>
+                    </a:schemeClr>
+                  </a:solidFill>
+                  <a:effectLst/>
+                </a:rPr>
+                <a:t>outputIndex</a:t>
+              </a:r>
+              <a:r>
+                <a:rPr lang="en-US" sz="900" dirty="0">
+                  <a:solidFill>
+                    <a:schemeClr val="accent2">
+                      <a:lumMod val="50000"/>
+                    </a:schemeClr>
+                  </a:solidFill>
+                </a:rPr>
+                <a:t>=0</a:t>
+              </a:r>
+            </a:p>
+            <a:p>
+              <a:pPr algn="ctr"/>
+              <a:r>
+                <a:rPr lang="en-US" sz="900" b="1" u="sng" dirty="0">
+                  <a:solidFill>
+                    <a:schemeClr val="accent2">
+                      <a:lumMod val="50000"/>
+                    </a:schemeClr>
+                  </a:solidFill>
+                </a:rPr>
+                <a:t>s</a:t>
+              </a:r>
+              <a:r>
+                <a:rPr lang="en-US" sz="900" b="1" u="sng" dirty="0">
+                  <a:solidFill>
+                    <a:schemeClr val="accent2">
+                      <a:lumMod val="50000"/>
+                    </a:schemeClr>
+                  </a:solidFill>
+                  <a:effectLst/>
+                </a:rPr>
+                <a:t>ignature</a:t>
+              </a:r>
+              <a:r>
+                <a:rPr lang="en-US" sz="900" dirty="0">
+                  <a:solidFill>
+                    <a:schemeClr val="accent2">
+                      <a:lumMod val="50000"/>
+                    </a:schemeClr>
+                  </a:solidFill>
+                </a:rPr>
+                <a:t>=sig(</a:t>
+              </a:r>
+              <a:r>
+                <a:rPr lang="en-US" sz="900" dirty="0" err="1">
+                  <a:solidFill>
+                    <a:schemeClr val="accent2">
+                      <a:lumMod val="50000"/>
+                    </a:schemeClr>
+                  </a:solidFill>
+                </a:rPr>
+                <a:t>k</a:t>
+              </a:r>
+              <a:r>
+                <a:rPr lang="en-US" sz="900" dirty="0" err="1">
+                  <a:solidFill>
+                    <a:schemeClr val="accent2">
+                      <a:lumMod val="50000"/>
+                    </a:schemeClr>
+                  </a:solidFill>
+                  <a:effectLst/>
+                </a:rPr>
+                <a:t>Scrooge_sk</a:t>
+              </a:r>
+              <a:r>
+                <a:rPr lang="en-US" sz="900" dirty="0">
+                  <a:solidFill>
+                    <a:schemeClr val="accent2">
+                      <a:lumMod val="50000"/>
+                    </a:schemeClr>
+                  </a:solidFill>
+                  <a:effectLst/>
+                </a:rPr>
+                <a:t>, 0</a:t>
+              </a:r>
+              <a:r>
+                <a:rPr lang="en-US" sz="900" dirty="0">
+                  <a:solidFill>
+                    <a:schemeClr val="accent2">
+                      <a:lumMod val="50000"/>
+                    </a:schemeClr>
+                  </a:solidFill>
+                </a:rPr>
+                <a:t>)</a:t>
+              </a:r>
+              <a:endParaRPr lang="en-US" sz="900" dirty="0">
+                <a:solidFill>
+                  <a:schemeClr val="accent2">
+                    <a:lumMod val="50000"/>
+                  </a:schemeClr>
+                </a:solidFill>
+                <a:effectLst/>
+              </a:endParaRPr>
+            </a:p>
+          </p:txBody>
+        </p:sp>
+      </p:grpSp>
+      <p:sp>
+        <p:nvSpPr>
+          <p:cNvPr id="87" name="Rectangle 86">
+            <a:extLst>
+              <a:ext uri="{FF2B5EF4-FFF2-40B4-BE49-F238E27FC236}">
+                <a16:creationId xmlns:a16="http://schemas.microsoft.com/office/drawing/2014/main" id="{25B98FAF-020C-7C4E-9FB9-49A16C7C65A2}"/>
+              </a:ext>
+            </a:extLst>
+          </p:cNvPr>
+          <p:cNvSpPr/>
+          <p:nvPr/>
+        </p:nvSpPr>
+        <p:spPr>
+          <a:xfrm>
+            <a:off x="3078135" y="1741875"/>
+            <a:ext cx="1930361" cy="1410116"/>
+          </a:xfrm>
+          <a:prstGeom prst="rect">
+            <a:avLst/>
+          </a:prstGeom>
+          <a:noFill/>
+          <a:ln w="19050">
+            <a:solidFill>
+              <a:schemeClr val="accent1"/>
+            </a:solidFill>
+          </a:ln>
+        </p:spPr>
+        <p:style>
+          <a:lnRef idx="2">
+            <a:schemeClr val="accent1">
+              <a:shade val="50000"/>
+            </a:schemeClr>
+          </a:lnRef>
+          <a:fillRef idx="1">
+            <a:schemeClr val="accent1"/>
+          </a:fillRef>
+          <a:effectRef idx="0">
+            <a:schemeClr val="accent1"/>
+          </a:effectRef>
+          <a:fontRef idx="minor">
+            <a:schemeClr val="lt1"/>
+          </a:fontRef>
+        </p:style>
+        <p:txBody>
+          <a:bodyPr rtlCol="0" anchor="ctr"/>
+          <a:lstStyle/>
+          <a:p>
+            <a:pPr algn="ctr"/>
+            <a:endParaRPr lang="en-CN"/>
+          </a:p>
+        </p:txBody>
+      </p:sp>
+      <p:sp>
+        <p:nvSpPr>
+          <p:cNvPr id="88" name="Rectangle 87">
+            <a:extLst>
+              <a:ext uri="{FF2B5EF4-FFF2-40B4-BE49-F238E27FC236}">
+                <a16:creationId xmlns:a16="http://schemas.microsoft.com/office/drawing/2014/main" id="{9DDC877A-44E1-5943-90E4-5D7ADFB0BEBC}"/>
+              </a:ext>
+            </a:extLst>
+          </p:cNvPr>
+          <p:cNvSpPr/>
+          <p:nvPr/>
+        </p:nvSpPr>
+        <p:spPr>
+          <a:xfrm>
+            <a:off x="3184262" y="1841055"/>
+            <a:ext cx="1718108" cy="576129"/>
+          </a:xfrm>
+          <a:prstGeom prst="rect">
+            <a:avLst/>
+          </a:prstGeom>
+          <a:noFill/>
+          <a:ln w="19050">
+            <a:solidFill>
+              <a:schemeClr val="accent1"/>
+            </a:solidFill>
+          </a:ln>
+        </p:spPr>
+        <p:style>
+          <a:lnRef idx="2">
+            <a:schemeClr val="accent1">
+              <a:shade val="50000"/>
+            </a:schemeClr>
+          </a:lnRef>
+          <a:fillRef idx="1">
+            <a:schemeClr val="accent1"/>
+          </a:fillRef>
+          <a:effectRef idx="0">
+            <a:schemeClr val="accent1"/>
+          </a:effectRef>
+          <a:fontRef idx="minor">
+            <a:schemeClr val="lt1"/>
+          </a:fontRef>
+        </p:style>
+        <p:txBody>
+          <a:bodyPr rtlCol="0" anchor="ctr"/>
+          <a:lstStyle/>
+          <a:p>
+            <a:pPr algn="ctr"/>
+            <a:r>
+              <a:rPr lang="en-CN" sz="1200" dirty="0">
+                <a:solidFill>
+                  <a:schemeClr val="accent1">
+                    <a:lumMod val="50000"/>
+                  </a:schemeClr>
+                </a:solidFill>
+              </a:rPr>
+              <a:t>output_</a:t>
+            </a:r>
+            <a:r>
+              <a:rPr lang="en-US" sz="1200" dirty="0">
+                <a:solidFill>
+                  <a:schemeClr val="accent1">
+                    <a:lumMod val="50000"/>
+                  </a:schemeClr>
+                </a:solidFill>
+              </a:rPr>
+              <a:t>0</a:t>
+            </a:r>
+          </a:p>
+          <a:p>
+            <a:pPr algn="ctr"/>
+            <a:r>
+              <a:rPr lang="en-US" sz="900" b="1" u="sng" dirty="0">
+                <a:solidFill>
+                  <a:schemeClr val="accent1">
+                    <a:lumMod val="50000"/>
+                  </a:schemeClr>
+                </a:solidFill>
+                <a:effectLst/>
+              </a:rPr>
+              <a:t>value</a:t>
+            </a:r>
+            <a:r>
+              <a:rPr lang="en-US" altLang="zh-CN" sz="900" dirty="0">
+                <a:solidFill>
+                  <a:schemeClr val="accent1">
+                    <a:lumMod val="50000"/>
+                  </a:schemeClr>
+                </a:solidFill>
+                <a:effectLst/>
+              </a:rPr>
+              <a:t>=9</a:t>
+            </a:r>
+            <a:endParaRPr lang="en-US" sz="900" dirty="0">
+              <a:solidFill>
+                <a:schemeClr val="accent1">
+                  <a:lumMod val="50000"/>
+                </a:schemeClr>
+              </a:solidFill>
+              <a:effectLst/>
+            </a:endParaRPr>
+          </a:p>
+          <a:p>
+            <a:pPr algn="ctr"/>
+            <a:r>
+              <a:rPr lang="en-US" sz="900" b="1" u="sng" dirty="0">
+                <a:solidFill>
+                  <a:schemeClr val="accent1">
+                    <a:lumMod val="50000"/>
+                  </a:schemeClr>
+                </a:solidFill>
+                <a:effectLst/>
+              </a:rPr>
+              <a:t>address</a:t>
+            </a:r>
+            <a:r>
+              <a:rPr lang="en-US" altLang="zh-CN" sz="900" dirty="0">
+                <a:solidFill>
+                  <a:schemeClr val="accent1">
+                    <a:lumMod val="50000"/>
+                  </a:schemeClr>
+                </a:solidFill>
+                <a:effectLst/>
+              </a:rPr>
+              <a:t>=</a:t>
+            </a:r>
+            <a:r>
+              <a:rPr lang="en-US" sz="900" dirty="0">
+                <a:solidFill>
+                  <a:schemeClr val="accent1">
+                    <a:lumMod val="50000"/>
+                  </a:schemeClr>
+                </a:solidFill>
+                <a:effectLst/>
+              </a:rPr>
+              <a:t> </a:t>
+            </a:r>
+            <a:r>
+              <a:rPr lang="en-US" sz="900" dirty="0" err="1">
+                <a:solidFill>
+                  <a:schemeClr val="accent1">
+                    <a:lumMod val="50000"/>
+                  </a:schemeClr>
+                </a:solidFill>
+                <a:effectLst/>
+              </a:rPr>
+              <a:t>kAlice</a:t>
+            </a:r>
+            <a:r>
+              <a:rPr lang="en-CN" sz="900" dirty="0">
+                <a:solidFill>
+                  <a:schemeClr val="accent1">
+                    <a:lumMod val="50000"/>
+                  </a:schemeClr>
+                </a:solidFill>
+              </a:rPr>
+              <a:t>_pk</a:t>
+            </a:r>
+          </a:p>
+        </p:txBody>
+      </p:sp>
+      <p:sp>
+        <p:nvSpPr>
+          <p:cNvPr id="85" name="Rounded Rectangle 84">
+            <a:extLst>
+              <a:ext uri="{FF2B5EF4-FFF2-40B4-BE49-F238E27FC236}">
+                <a16:creationId xmlns:a16="http://schemas.microsoft.com/office/drawing/2014/main" id="{55EFA0FE-AD73-4E46-8A2F-684B967DF7C6}"/>
+              </a:ext>
+            </a:extLst>
+          </p:cNvPr>
+          <p:cNvSpPr/>
+          <p:nvPr/>
+        </p:nvSpPr>
+        <p:spPr>
+          <a:xfrm>
+            <a:off x="2942688" y="291058"/>
+            <a:ext cx="2201259" cy="3000782"/>
+          </a:xfrm>
+          <a:prstGeom prst="roundRect">
+            <a:avLst>
+              <a:gd name="adj" fmla="val 3417"/>
+            </a:avLst>
+          </a:prstGeom>
+          <a:noFill/>
+          <a:ln w="19050">
+            <a:solidFill>
+              <a:schemeClr val="tx1"/>
+            </a:solidFill>
+          </a:ln>
+        </p:spPr>
+        <p:style>
+          <a:lnRef idx="2">
+            <a:schemeClr val="accent1">
+              <a:shade val="50000"/>
+            </a:schemeClr>
+          </a:lnRef>
+          <a:fillRef idx="1">
+            <a:schemeClr val="accent1"/>
+          </a:fillRef>
+          <a:effectRef idx="0">
+            <a:schemeClr val="accent1"/>
+          </a:effectRef>
+          <a:fontRef idx="minor">
+            <a:schemeClr val="lt1"/>
+          </a:fontRef>
+        </p:style>
+        <p:txBody>
+          <a:bodyPr rtlCol="0" anchor="ctr"/>
+          <a:lstStyle/>
+          <a:p>
+            <a:pPr algn="ctr"/>
+            <a:endParaRPr lang="en-CN">
+              <a:latin typeface="Times New Roman" panose="02020603050405020304" pitchFamily="18" charset="0"/>
+              <a:cs typeface="Times New Roman" panose="02020603050405020304" pitchFamily="18" charset="0"/>
+            </a:endParaRPr>
+          </a:p>
+        </p:txBody>
+      </p:sp>
+      <p:sp>
+        <p:nvSpPr>
+          <p:cNvPr id="86" name="TextBox 85">
+            <a:extLst>
+              <a:ext uri="{FF2B5EF4-FFF2-40B4-BE49-F238E27FC236}">
+                <a16:creationId xmlns:a16="http://schemas.microsoft.com/office/drawing/2014/main" id="{848EEDB2-AF42-D64C-9D91-AE51B7A1E1DA}"/>
+              </a:ext>
+            </a:extLst>
+          </p:cNvPr>
+          <p:cNvSpPr txBox="1"/>
+          <p:nvPr/>
+        </p:nvSpPr>
+        <p:spPr>
+          <a:xfrm>
+            <a:off x="2942688" y="297264"/>
+            <a:ext cx="2201259" cy="323165"/>
+          </a:xfrm>
+          <a:prstGeom prst="rect">
+            <a:avLst/>
+          </a:prstGeom>
+          <a:noFill/>
+        </p:spPr>
+        <p:txBody>
+          <a:bodyPr wrap="square" rtlCol="0">
+            <a:spAutoFit/>
+          </a:bodyPr>
+          <a:lstStyle/>
+          <a:p>
+            <a:pPr algn="ctr"/>
+            <a:r>
+              <a:rPr lang="en-US" sz="1500" dirty="0"/>
+              <a:t>h</a:t>
+            </a:r>
+            <a:r>
+              <a:rPr lang="en-US" sz="1500" dirty="0">
+                <a:effectLst/>
+              </a:rPr>
+              <a:t>ash_1</a:t>
+            </a:r>
+          </a:p>
+        </p:txBody>
+      </p:sp>
+      <p:sp>
+        <p:nvSpPr>
+          <p:cNvPr id="98" name="Rectangle 97">
+            <a:extLst>
+              <a:ext uri="{FF2B5EF4-FFF2-40B4-BE49-F238E27FC236}">
+                <a16:creationId xmlns:a16="http://schemas.microsoft.com/office/drawing/2014/main" id="{4D4D3A1D-0793-2D4E-AD71-74B4A7FD93BD}"/>
+              </a:ext>
+            </a:extLst>
+          </p:cNvPr>
+          <p:cNvSpPr/>
+          <p:nvPr/>
+        </p:nvSpPr>
+        <p:spPr>
+          <a:xfrm>
+            <a:off x="3184260" y="2469657"/>
+            <a:ext cx="1718108" cy="576129"/>
+          </a:xfrm>
+          <a:prstGeom prst="rect">
+            <a:avLst/>
+          </a:prstGeom>
+          <a:noFill/>
+          <a:ln w="19050">
+            <a:solidFill>
+              <a:schemeClr val="accent1"/>
+            </a:solidFill>
+          </a:ln>
+        </p:spPr>
+        <p:style>
+          <a:lnRef idx="2">
+            <a:schemeClr val="accent1">
+              <a:shade val="50000"/>
+            </a:schemeClr>
+          </a:lnRef>
+          <a:fillRef idx="1">
+            <a:schemeClr val="accent1"/>
+          </a:fillRef>
+          <a:effectRef idx="0">
+            <a:schemeClr val="accent1"/>
+          </a:effectRef>
+          <a:fontRef idx="minor">
+            <a:schemeClr val="lt1"/>
+          </a:fontRef>
+        </p:style>
+        <p:txBody>
+          <a:bodyPr rtlCol="0" anchor="ctr"/>
+          <a:lstStyle/>
+          <a:p>
+            <a:pPr algn="ctr"/>
+            <a:r>
+              <a:rPr lang="en-CN" sz="1200" dirty="0">
+                <a:solidFill>
+                  <a:schemeClr val="accent1">
+                    <a:lumMod val="50000"/>
+                  </a:schemeClr>
+                </a:solidFill>
+              </a:rPr>
+              <a:t>output_</a:t>
+            </a:r>
+            <a:r>
+              <a:rPr lang="en-US" sz="1200" dirty="0">
+                <a:solidFill>
+                  <a:schemeClr val="accent1">
+                    <a:lumMod val="50000"/>
+                  </a:schemeClr>
+                </a:solidFill>
+              </a:rPr>
+              <a:t>0</a:t>
+            </a:r>
+          </a:p>
+          <a:p>
+            <a:pPr algn="ctr"/>
+            <a:r>
+              <a:rPr lang="en-US" sz="900" b="1" u="sng" dirty="0">
+                <a:solidFill>
+                  <a:schemeClr val="accent1">
+                    <a:lumMod val="50000"/>
+                  </a:schemeClr>
+                </a:solidFill>
+                <a:effectLst/>
+              </a:rPr>
+              <a:t>value</a:t>
+            </a:r>
+            <a:r>
+              <a:rPr lang="en-US" altLang="zh-CN" sz="900" dirty="0">
+                <a:solidFill>
+                  <a:schemeClr val="accent1">
+                    <a:lumMod val="50000"/>
+                  </a:schemeClr>
+                </a:solidFill>
+                <a:effectLst/>
+              </a:rPr>
+              <a:t>=1</a:t>
+            </a:r>
+            <a:endParaRPr lang="en-US" sz="900" dirty="0">
+              <a:solidFill>
+                <a:schemeClr val="accent1">
+                  <a:lumMod val="50000"/>
+                </a:schemeClr>
+              </a:solidFill>
+              <a:effectLst/>
+            </a:endParaRPr>
+          </a:p>
+          <a:p>
+            <a:pPr algn="ctr"/>
+            <a:r>
+              <a:rPr lang="en-US" sz="900" b="1" u="sng" dirty="0">
+                <a:solidFill>
+                  <a:schemeClr val="accent1">
+                    <a:lumMod val="50000"/>
+                  </a:schemeClr>
+                </a:solidFill>
+                <a:effectLst/>
+              </a:rPr>
+              <a:t>address</a:t>
+            </a:r>
+            <a:r>
+              <a:rPr lang="en-US" altLang="zh-CN" sz="900" dirty="0">
+                <a:solidFill>
+                  <a:schemeClr val="accent1">
+                    <a:lumMod val="50000"/>
+                  </a:schemeClr>
+                </a:solidFill>
+                <a:effectLst/>
+              </a:rPr>
+              <a:t>=</a:t>
+            </a:r>
+            <a:r>
+              <a:rPr lang="en-US" sz="900" dirty="0">
+                <a:solidFill>
+                  <a:schemeClr val="accent1">
+                    <a:lumMod val="50000"/>
+                  </a:schemeClr>
+                </a:solidFill>
+                <a:effectLst/>
+              </a:rPr>
+              <a:t> </a:t>
+            </a:r>
+            <a:r>
+              <a:rPr lang="en-US" sz="900" dirty="0" err="1">
+                <a:solidFill>
+                  <a:schemeClr val="accent1">
+                    <a:lumMod val="50000"/>
+                  </a:schemeClr>
+                </a:solidFill>
+                <a:effectLst/>
+              </a:rPr>
+              <a:t>kScorrge</a:t>
+            </a:r>
+            <a:r>
+              <a:rPr lang="en-CN" sz="900" dirty="0">
+                <a:solidFill>
+                  <a:schemeClr val="accent1">
+                    <a:lumMod val="50000"/>
+                  </a:schemeClr>
+                </a:solidFill>
+              </a:rPr>
+              <a:t>_pk</a:t>
+            </a:r>
+          </a:p>
+        </p:txBody>
+      </p:sp>
+      <p:sp>
+        <p:nvSpPr>
+          <p:cNvPr id="101" name="TextBox 100">
+            <a:extLst>
+              <a:ext uri="{FF2B5EF4-FFF2-40B4-BE49-F238E27FC236}">
+                <a16:creationId xmlns:a16="http://schemas.microsoft.com/office/drawing/2014/main" id="{459196C1-E33F-0D4B-8339-B29E137FB2CA}"/>
+              </a:ext>
+            </a:extLst>
+          </p:cNvPr>
+          <p:cNvSpPr txBox="1"/>
+          <p:nvPr/>
+        </p:nvSpPr>
+        <p:spPr>
+          <a:xfrm>
+            <a:off x="5603411" y="3295098"/>
+            <a:ext cx="2201258" cy="369332"/>
+          </a:xfrm>
+          <a:prstGeom prst="rect">
+            <a:avLst/>
+          </a:prstGeom>
+          <a:noFill/>
+        </p:spPr>
+        <p:txBody>
+          <a:bodyPr wrap="square" rtlCol="0">
+            <a:spAutoFit/>
+          </a:bodyPr>
+          <a:lstStyle/>
+          <a:p>
+            <a:pPr algn="ctr"/>
+            <a:r>
+              <a:rPr lang="en-CN" b="1" dirty="0">
+                <a:latin typeface="Times New Roman" panose="02020603050405020304" pitchFamily="18" charset="0"/>
+                <a:cs typeface="Times New Roman" panose="02020603050405020304" pitchFamily="18" charset="0"/>
+              </a:rPr>
+              <a:t>TX 2</a:t>
+            </a:r>
+          </a:p>
+        </p:txBody>
+      </p:sp>
+      <p:cxnSp>
+        <p:nvCxnSpPr>
+          <p:cNvPr id="102" name="Straight Connector 101">
+            <a:extLst>
+              <a:ext uri="{FF2B5EF4-FFF2-40B4-BE49-F238E27FC236}">
+                <a16:creationId xmlns:a16="http://schemas.microsoft.com/office/drawing/2014/main" id="{184DB177-257A-F948-98A7-9F61FBF4A7CA}"/>
+              </a:ext>
+            </a:extLst>
+          </p:cNvPr>
+          <p:cNvCxnSpPr>
+            <a:cxnSpLocks/>
+          </p:cNvCxnSpPr>
+          <p:nvPr/>
+        </p:nvCxnSpPr>
+        <p:spPr>
+          <a:xfrm>
+            <a:off x="5601619" y="608676"/>
+            <a:ext cx="2201259" cy="0"/>
+          </a:xfrm>
+          <a:prstGeom prst="line">
+            <a:avLst/>
+          </a:prstGeom>
+          <a:ln w="19050">
+            <a:solidFill>
+              <a:schemeClr val="tx1"/>
+            </a:solidFill>
+          </a:ln>
+        </p:spPr>
+        <p:style>
+          <a:lnRef idx="1">
+            <a:schemeClr val="accent1"/>
+          </a:lnRef>
+          <a:fillRef idx="0">
+            <a:schemeClr val="accent1"/>
+          </a:fillRef>
+          <a:effectRef idx="0">
+            <a:schemeClr val="accent1"/>
+          </a:effectRef>
+          <a:fontRef idx="minor">
+            <a:schemeClr val="tx1"/>
+          </a:fontRef>
+        </p:style>
+      </p:cxnSp>
+      <p:grpSp>
+        <p:nvGrpSpPr>
+          <p:cNvPr id="103" name="Group 102">
+            <a:extLst>
+              <a:ext uri="{FF2B5EF4-FFF2-40B4-BE49-F238E27FC236}">
+                <a16:creationId xmlns:a16="http://schemas.microsoft.com/office/drawing/2014/main" id="{249C0176-5F70-B949-9D76-5AB4B8F7709E}"/>
+              </a:ext>
+            </a:extLst>
+          </p:cNvPr>
+          <p:cNvGrpSpPr/>
+          <p:nvPr/>
+        </p:nvGrpSpPr>
+        <p:grpSpPr>
+          <a:xfrm>
+            <a:off x="5737066" y="728756"/>
+            <a:ext cx="1930361" cy="910988"/>
+            <a:chOff x="376703" y="584325"/>
+            <a:chExt cx="1930361" cy="910988"/>
+          </a:xfrm>
+        </p:grpSpPr>
+        <p:sp>
+          <p:nvSpPr>
+            <p:cNvPr id="109" name="Rectangle 108">
+              <a:extLst>
+                <a:ext uri="{FF2B5EF4-FFF2-40B4-BE49-F238E27FC236}">
+                  <a16:creationId xmlns:a16="http://schemas.microsoft.com/office/drawing/2014/main" id="{C44A770C-199D-C349-A808-09DD03F8F1E1}"/>
+                </a:ext>
+              </a:extLst>
+            </p:cNvPr>
+            <p:cNvSpPr/>
+            <p:nvPr/>
+          </p:nvSpPr>
+          <p:spPr>
+            <a:xfrm>
+              <a:off x="376703" y="584325"/>
+              <a:ext cx="1930361" cy="910988"/>
+            </a:xfrm>
+            <a:prstGeom prst="rect">
+              <a:avLst/>
+            </a:prstGeom>
+            <a:noFill/>
+            <a:ln w="19050">
+              <a:solidFill>
+                <a:schemeClr val="accent2"/>
+              </a:solidFill>
+            </a:ln>
+          </p:spPr>
+          <p:style>
+            <a:lnRef idx="2">
+              <a:schemeClr val="accent1">
+                <a:shade val="50000"/>
+              </a:schemeClr>
+            </a:lnRef>
+            <a:fillRef idx="1">
+              <a:schemeClr val="accent1"/>
+            </a:fillRef>
+            <a:effectRef idx="0">
+              <a:schemeClr val="accent1"/>
+            </a:effectRef>
+            <a:fontRef idx="minor">
+              <a:schemeClr val="lt1"/>
+            </a:fontRef>
+          </p:style>
+          <p:txBody>
+            <a:bodyPr rtlCol="0" anchor="ctr"/>
+            <a:lstStyle/>
+            <a:p>
+              <a:pPr algn="ctr"/>
+              <a:endParaRPr lang="en-CN">
+                <a:solidFill>
+                  <a:schemeClr val="accent2">
+                    <a:lumMod val="50000"/>
+                  </a:schemeClr>
+                </a:solidFill>
+              </a:endParaRPr>
+            </a:p>
+          </p:txBody>
+        </p:sp>
+        <p:sp>
+          <p:nvSpPr>
+            <p:cNvPr id="110" name="Rectangle 109">
+              <a:extLst>
+                <a:ext uri="{FF2B5EF4-FFF2-40B4-BE49-F238E27FC236}">
+                  <a16:creationId xmlns:a16="http://schemas.microsoft.com/office/drawing/2014/main" id="{9BA342C8-484D-394D-949E-27A30E8C77D5}"/>
+                </a:ext>
+              </a:extLst>
+            </p:cNvPr>
+            <p:cNvSpPr/>
+            <p:nvPr/>
+          </p:nvSpPr>
+          <p:spPr>
+            <a:xfrm>
+              <a:off x="482828" y="698725"/>
+              <a:ext cx="1718110" cy="682187"/>
+            </a:xfrm>
+            <a:prstGeom prst="rect">
+              <a:avLst/>
+            </a:prstGeom>
+            <a:noFill/>
+            <a:ln w="19050">
+              <a:solidFill>
+                <a:schemeClr val="accent2"/>
+              </a:solidFill>
+            </a:ln>
+          </p:spPr>
+          <p:style>
+            <a:lnRef idx="2">
+              <a:schemeClr val="accent1">
+                <a:shade val="50000"/>
+              </a:schemeClr>
+            </a:lnRef>
+            <a:fillRef idx="1">
+              <a:schemeClr val="accent1"/>
+            </a:fillRef>
+            <a:effectRef idx="0">
+              <a:schemeClr val="accent1"/>
+            </a:effectRef>
+            <a:fontRef idx="minor">
+              <a:schemeClr val="lt1"/>
+            </a:fontRef>
+          </p:style>
+          <p:txBody>
+            <a:bodyPr rtlCol="0" anchor="ctr"/>
+            <a:lstStyle/>
+            <a:p>
+              <a:pPr algn="ctr"/>
+              <a:r>
+                <a:rPr lang="en-CN" sz="1200" dirty="0">
+                  <a:solidFill>
+                    <a:schemeClr val="accent2">
+                      <a:lumMod val="50000"/>
+                    </a:schemeClr>
+                  </a:solidFill>
+                </a:rPr>
+                <a:t>input_</a:t>
+              </a:r>
+              <a:r>
+                <a:rPr lang="en-US" sz="1200" dirty="0">
+                  <a:solidFill>
+                    <a:schemeClr val="accent2">
+                      <a:lumMod val="50000"/>
+                    </a:schemeClr>
+                  </a:solidFill>
+                </a:rPr>
+                <a:t>0</a:t>
+              </a:r>
+            </a:p>
+            <a:p>
+              <a:pPr algn="ctr"/>
+              <a:r>
+                <a:rPr lang="en-US" sz="900" b="1" u="sng" dirty="0">
+                  <a:solidFill>
+                    <a:schemeClr val="accent2">
+                      <a:lumMod val="50000"/>
+                    </a:schemeClr>
+                  </a:solidFill>
+                  <a:effectLst/>
+                </a:rPr>
+                <a:t>prevTxHash</a:t>
+              </a:r>
+              <a:r>
+                <a:rPr lang="en-US" sz="900" dirty="0">
+                  <a:solidFill>
+                    <a:schemeClr val="accent2">
+                      <a:lumMod val="50000"/>
+                    </a:schemeClr>
+                  </a:solidFill>
+                  <a:effectLst/>
+                </a:rPr>
+                <a:t>=hash_1</a:t>
+              </a:r>
+            </a:p>
+            <a:p>
+              <a:pPr algn="ctr"/>
+              <a:r>
+                <a:rPr lang="en-US" sz="900" b="1" u="sng" dirty="0">
+                  <a:solidFill>
+                    <a:schemeClr val="accent2">
+                      <a:lumMod val="50000"/>
+                    </a:schemeClr>
+                  </a:solidFill>
+                  <a:effectLst/>
+                </a:rPr>
+                <a:t>outputIndex</a:t>
+              </a:r>
+              <a:r>
+                <a:rPr lang="en-US" sz="900" dirty="0">
+                  <a:solidFill>
+                    <a:schemeClr val="accent2">
+                      <a:lumMod val="50000"/>
+                    </a:schemeClr>
+                  </a:solidFill>
+                </a:rPr>
+                <a:t>=0</a:t>
+              </a:r>
+            </a:p>
+            <a:p>
+              <a:pPr algn="ctr"/>
+              <a:r>
+                <a:rPr lang="en-US" sz="900" b="1" u="sng" dirty="0">
+                  <a:solidFill>
+                    <a:schemeClr val="accent2">
+                      <a:lumMod val="50000"/>
+                    </a:schemeClr>
+                  </a:solidFill>
+                </a:rPr>
+                <a:t>s</a:t>
+              </a:r>
+              <a:r>
+                <a:rPr lang="en-US" sz="900" b="1" u="sng" dirty="0">
+                  <a:solidFill>
+                    <a:schemeClr val="accent2">
+                      <a:lumMod val="50000"/>
+                    </a:schemeClr>
+                  </a:solidFill>
+                  <a:effectLst/>
+                </a:rPr>
+                <a:t>ignature</a:t>
+              </a:r>
+              <a:r>
+                <a:rPr lang="en-US" sz="900" dirty="0">
+                  <a:solidFill>
+                    <a:schemeClr val="accent2">
+                      <a:lumMod val="50000"/>
+                    </a:schemeClr>
+                  </a:solidFill>
+                </a:rPr>
+                <a:t>=sig(</a:t>
+              </a:r>
+              <a:r>
+                <a:rPr lang="en-US" sz="900" dirty="0" err="1">
+                  <a:solidFill>
+                    <a:schemeClr val="accent2">
+                      <a:lumMod val="50000"/>
+                    </a:schemeClr>
+                  </a:solidFill>
+                  <a:effectLst/>
+                </a:rPr>
+                <a:t>kAlice_sk</a:t>
+              </a:r>
+              <a:r>
+                <a:rPr lang="en-US" sz="900" dirty="0">
+                  <a:solidFill>
+                    <a:schemeClr val="accent2">
+                      <a:lumMod val="50000"/>
+                    </a:schemeClr>
+                  </a:solidFill>
+                  <a:effectLst/>
+                </a:rPr>
+                <a:t>, 0</a:t>
+              </a:r>
+              <a:r>
+                <a:rPr lang="en-US" sz="900" dirty="0">
+                  <a:solidFill>
+                    <a:schemeClr val="accent2">
+                      <a:lumMod val="50000"/>
+                    </a:schemeClr>
+                  </a:solidFill>
+                </a:rPr>
+                <a:t>)</a:t>
+              </a:r>
+              <a:endParaRPr lang="en-US" sz="900" dirty="0">
+                <a:solidFill>
+                  <a:schemeClr val="accent2">
+                    <a:lumMod val="50000"/>
+                  </a:schemeClr>
+                </a:solidFill>
+                <a:effectLst/>
+              </a:endParaRPr>
+            </a:p>
+          </p:txBody>
+        </p:sp>
+      </p:grpSp>
+      <p:sp>
+        <p:nvSpPr>
+          <p:cNvPr id="107" name="Rectangle 106">
+            <a:extLst>
+              <a:ext uri="{FF2B5EF4-FFF2-40B4-BE49-F238E27FC236}">
+                <a16:creationId xmlns:a16="http://schemas.microsoft.com/office/drawing/2014/main" id="{20D85791-CA6A-894B-BFB3-73B2B0683E3D}"/>
+              </a:ext>
+            </a:extLst>
+          </p:cNvPr>
+          <p:cNvSpPr/>
+          <p:nvPr/>
+        </p:nvSpPr>
+        <p:spPr>
+          <a:xfrm>
+            <a:off x="5737066" y="1741873"/>
+            <a:ext cx="1930361" cy="1404183"/>
+          </a:xfrm>
+          <a:prstGeom prst="rect">
+            <a:avLst/>
+          </a:prstGeom>
+          <a:noFill/>
+          <a:ln w="19050">
+            <a:solidFill>
+              <a:schemeClr val="accent1"/>
+            </a:solidFill>
+          </a:ln>
+        </p:spPr>
+        <p:style>
+          <a:lnRef idx="2">
+            <a:schemeClr val="accent1">
+              <a:shade val="50000"/>
+            </a:schemeClr>
+          </a:lnRef>
+          <a:fillRef idx="1">
+            <a:schemeClr val="accent1"/>
+          </a:fillRef>
+          <a:effectRef idx="0">
+            <a:schemeClr val="accent1"/>
+          </a:effectRef>
+          <a:fontRef idx="minor">
+            <a:schemeClr val="lt1"/>
+          </a:fontRef>
+        </p:style>
+        <p:txBody>
+          <a:bodyPr rtlCol="0" anchor="ctr"/>
+          <a:lstStyle/>
+          <a:p>
+            <a:pPr algn="ctr"/>
+            <a:endParaRPr lang="en-CN"/>
+          </a:p>
+        </p:txBody>
+      </p:sp>
+      <p:sp>
+        <p:nvSpPr>
+          <p:cNvPr id="108" name="Rectangle 107">
+            <a:extLst>
+              <a:ext uri="{FF2B5EF4-FFF2-40B4-BE49-F238E27FC236}">
+                <a16:creationId xmlns:a16="http://schemas.microsoft.com/office/drawing/2014/main" id="{20145891-CA78-4843-B88D-A333D89A809B}"/>
+              </a:ext>
+            </a:extLst>
+          </p:cNvPr>
+          <p:cNvSpPr/>
+          <p:nvPr/>
+        </p:nvSpPr>
+        <p:spPr>
+          <a:xfrm>
+            <a:off x="5837171" y="1840153"/>
+            <a:ext cx="1718108" cy="576129"/>
+          </a:xfrm>
+          <a:prstGeom prst="rect">
+            <a:avLst/>
+          </a:prstGeom>
+          <a:noFill/>
+          <a:ln w="19050">
+            <a:solidFill>
+              <a:schemeClr val="accent1"/>
+            </a:solidFill>
+          </a:ln>
+        </p:spPr>
+        <p:style>
+          <a:lnRef idx="2">
+            <a:schemeClr val="accent1">
+              <a:shade val="50000"/>
+            </a:schemeClr>
+          </a:lnRef>
+          <a:fillRef idx="1">
+            <a:schemeClr val="accent1"/>
+          </a:fillRef>
+          <a:effectRef idx="0">
+            <a:schemeClr val="accent1"/>
+          </a:effectRef>
+          <a:fontRef idx="minor">
+            <a:schemeClr val="lt1"/>
+          </a:fontRef>
+        </p:style>
+        <p:txBody>
+          <a:bodyPr rtlCol="0" anchor="ctr"/>
+          <a:lstStyle/>
+          <a:p>
+            <a:pPr algn="ctr"/>
+            <a:r>
+              <a:rPr lang="en-CN" sz="1200" dirty="0">
+                <a:solidFill>
+                  <a:schemeClr val="accent1">
+                    <a:lumMod val="50000"/>
+                  </a:schemeClr>
+                </a:solidFill>
+              </a:rPr>
+              <a:t>output_</a:t>
+            </a:r>
+            <a:r>
+              <a:rPr lang="en-US" sz="1200" dirty="0">
+                <a:solidFill>
+                  <a:schemeClr val="accent1">
+                    <a:lumMod val="50000"/>
+                  </a:schemeClr>
+                </a:solidFill>
+              </a:rPr>
+              <a:t>0</a:t>
+            </a:r>
+          </a:p>
+          <a:p>
+            <a:pPr algn="ctr"/>
+            <a:r>
+              <a:rPr lang="en-US" sz="900" b="1" u="sng" dirty="0">
+                <a:solidFill>
+                  <a:schemeClr val="accent1">
+                    <a:lumMod val="50000"/>
+                  </a:schemeClr>
+                </a:solidFill>
+                <a:effectLst/>
+              </a:rPr>
+              <a:t>value</a:t>
+            </a:r>
+            <a:r>
+              <a:rPr lang="en-US" altLang="zh-CN" sz="900" dirty="0">
+                <a:solidFill>
+                  <a:schemeClr val="accent1">
+                    <a:lumMod val="50000"/>
+                  </a:schemeClr>
+                </a:solidFill>
+                <a:effectLst/>
+              </a:rPr>
+              <a:t>=8</a:t>
+            </a:r>
+            <a:endParaRPr lang="en-US" sz="900" dirty="0">
+              <a:solidFill>
+                <a:schemeClr val="accent1">
+                  <a:lumMod val="50000"/>
+                </a:schemeClr>
+              </a:solidFill>
+              <a:effectLst/>
+            </a:endParaRPr>
+          </a:p>
+          <a:p>
+            <a:pPr algn="ctr"/>
+            <a:r>
+              <a:rPr lang="en-US" sz="900" b="1" u="sng" dirty="0">
+                <a:solidFill>
+                  <a:schemeClr val="accent1">
+                    <a:lumMod val="50000"/>
+                  </a:schemeClr>
+                </a:solidFill>
+                <a:effectLst/>
+              </a:rPr>
+              <a:t>address</a:t>
+            </a:r>
+            <a:r>
+              <a:rPr lang="en-US" altLang="zh-CN" sz="900" dirty="0">
+                <a:solidFill>
+                  <a:schemeClr val="accent1">
+                    <a:lumMod val="50000"/>
+                  </a:schemeClr>
+                </a:solidFill>
+                <a:effectLst/>
+              </a:rPr>
+              <a:t>=</a:t>
+            </a:r>
+            <a:r>
+              <a:rPr lang="en-US" sz="900" dirty="0">
+                <a:solidFill>
+                  <a:schemeClr val="accent1">
+                    <a:lumMod val="50000"/>
+                  </a:schemeClr>
+                </a:solidFill>
+                <a:effectLst/>
+              </a:rPr>
+              <a:t> </a:t>
+            </a:r>
+            <a:r>
+              <a:rPr lang="en-US" sz="900" dirty="0" err="1">
+                <a:solidFill>
+                  <a:schemeClr val="accent1">
+                    <a:lumMod val="50000"/>
+                  </a:schemeClr>
+                </a:solidFill>
+                <a:effectLst/>
+              </a:rPr>
+              <a:t>kBob</a:t>
+            </a:r>
+            <a:r>
+              <a:rPr lang="en-CN" sz="900" dirty="0">
+                <a:solidFill>
+                  <a:schemeClr val="accent1">
+                    <a:lumMod val="50000"/>
+                  </a:schemeClr>
+                </a:solidFill>
+              </a:rPr>
+              <a:t>_pk</a:t>
+            </a:r>
+          </a:p>
+        </p:txBody>
+      </p:sp>
+      <p:sp>
+        <p:nvSpPr>
+          <p:cNvPr id="105" name="Rounded Rectangle 104">
+            <a:extLst>
+              <a:ext uri="{FF2B5EF4-FFF2-40B4-BE49-F238E27FC236}">
+                <a16:creationId xmlns:a16="http://schemas.microsoft.com/office/drawing/2014/main" id="{85EB9172-2BDE-1F4C-84BA-5EC37EAB90A5}"/>
+              </a:ext>
+            </a:extLst>
+          </p:cNvPr>
+          <p:cNvSpPr/>
+          <p:nvPr/>
+        </p:nvSpPr>
+        <p:spPr>
+          <a:xfrm>
+            <a:off x="5601619" y="290456"/>
+            <a:ext cx="2201259" cy="3000782"/>
+          </a:xfrm>
+          <a:prstGeom prst="roundRect">
+            <a:avLst>
+              <a:gd name="adj" fmla="val 3417"/>
+            </a:avLst>
+          </a:prstGeom>
+          <a:noFill/>
+          <a:ln w="19050">
+            <a:solidFill>
+              <a:schemeClr val="tx1"/>
+            </a:solidFill>
+          </a:ln>
+        </p:spPr>
+        <p:style>
+          <a:lnRef idx="2">
+            <a:schemeClr val="accent1">
+              <a:shade val="50000"/>
+            </a:schemeClr>
+          </a:lnRef>
+          <a:fillRef idx="1">
+            <a:schemeClr val="accent1"/>
+          </a:fillRef>
+          <a:effectRef idx="0">
+            <a:schemeClr val="accent1"/>
+          </a:effectRef>
+          <a:fontRef idx="minor">
+            <a:schemeClr val="lt1"/>
+          </a:fontRef>
+        </p:style>
+        <p:txBody>
+          <a:bodyPr rtlCol="0" anchor="ctr"/>
+          <a:lstStyle/>
+          <a:p>
+            <a:pPr algn="ctr"/>
+            <a:endParaRPr lang="en-CN">
+              <a:latin typeface="Times New Roman" panose="02020603050405020304" pitchFamily="18" charset="0"/>
+              <a:cs typeface="Times New Roman" panose="02020603050405020304" pitchFamily="18" charset="0"/>
+            </a:endParaRPr>
+          </a:p>
+        </p:txBody>
+      </p:sp>
+      <p:sp>
+        <p:nvSpPr>
+          <p:cNvPr id="106" name="TextBox 105">
+            <a:extLst>
+              <a:ext uri="{FF2B5EF4-FFF2-40B4-BE49-F238E27FC236}">
+                <a16:creationId xmlns:a16="http://schemas.microsoft.com/office/drawing/2014/main" id="{50F3EAA9-5EFF-E047-AB19-6290CE36D8FC}"/>
+              </a:ext>
+            </a:extLst>
+          </p:cNvPr>
+          <p:cNvSpPr txBox="1"/>
+          <p:nvPr/>
+        </p:nvSpPr>
+        <p:spPr>
+          <a:xfrm>
+            <a:off x="5601619" y="296662"/>
+            <a:ext cx="2201259" cy="323165"/>
+          </a:xfrm>
+          <a:prstGeom prst="rect">
+            <a:avLst/>
+          </a:prstGeom>
+          <a:noFill/>
+        </p:spPr>
+        <p:txBody>
+          <a:bodyPr wrap="square" rtlCol="0">
+            <a:spAutoFit/>
+          </a:bodyPr>
+          <a:lstStyle/>
+          <a:p>
+            <a:pPr algn="ctr"/>
+            <a:r>
+              <a:rPr lang="en-US" sz="1500" dirty="0"/>
+              <a:t>h</a:t>
+            </a:r>
+            <a:r>
+              <a:rPr lang="en-US" sz="1500" dirty="0">
+                <a:effectLst/>
+              </a:rPr>
+              <a:t>ash_2</a:t>
+            </a:r>
+          </a:p>
+        </p:txBody>
+      </p:sp>
+      <p:cxnSp>
+        <p:nvCxnSpPr>
+          <p:cNvPr id="114" name="Elbow Connector 113">
+            <a:extLst>
+              <a:ext uri="{FF2B5EF4-FFF2-40B4-BE49-F238E27FC236}">
+                <a16:creationId xmlns:a16="http://schemas.microsoft.com/office/drawing/2014/main" id="{A06DD8C1-632D-F743-B940-60A38CB5DCFE}"/>
+              </a:ext>
+            </a:extLst>
+          </p:cNvPr>
+          <p:cNvCxnSpPr>
+            <a:cxnSpLocks/>
+            <a:stCxn id="13" idx="3"/>
+            <a:endCxn id="90" idx="1"/>
+          </p:cNvCxnSpPr>
+          <p:nvPr/>
+        </p:nvCxnSpPr>
+        <p:spPr>
+          <a:xfrm flipV="1">
+            <a:off x="2237417" y="1184852"/>
+            <a:ext cx="946843" cy="944533"/>
+          </a:xfrm>
+          <a:prstGeom prst="bentConnector3">
+            <a:avLst>
+              <a:gd name="adj1" fmla="val 50000"/>
+            </a:avLst>
+          </a:prstGeom>
+          <a:ln w="12700">
+            <a:solidFill>
+              <a:schemeClr val="tx1"/>
+            </a:solidFill>
+            <a:tailEnd type="stealth" w="lg" len="lg"/>
+          </a:ln>
+        </p:spPr>
+        <p:style>
+          <a:lnRef idx="1">
+            <a:schemeClr val="accent1"/>
+          </a:lnRef>
+          <a:fillRef idx="0">
+            <a:schemeClr val="accent1"/>
+          </a:fillRef>
+          <a:effectRef idx="0">
+            <a:schemeClr val="accent1"/>
+          </a:effectRef>
+          <a:fontRef idx="minor">
+            <a:schemeClr val="tx1"/>
+          </a:fontRef>
+        </p:style>
+      </p:cxnSp>
+      <p:cxnSp>
+        <p:nvCxnSpPr>
+          <p:cNvPr id="117" name="Elbow Connector 116">
+            <a:extLst>
+              <a:ext uri="{FF2B5EF4-FFF2-40B4-BE49-F238E27FC236}">
+                <a16:creationId xmlns:a16="http://schemas.microsoft.com/office/drawing/2014/main" id="{E7C41331-5D77-724D-85BC-557A8B00A6D4}"/>
+              </a:ext>
+            </a:extLst>
+          </p:cNvPr>
+          <p:cNvCxnSpPr>
+            <a:cxnSpLocks/>
+            <a:stCxn id="88" idx="3"/>
+            <a:endCxn id="110" idx="1"/>
+          </p:cNvCxnSpPr>
+          <p:nvPr/>
+        </p:nvCxnSpPr>
+        <p:spPr>
+          <a:xfrm flipV="1">
+            <a:off x="4902370" y="1184250"/>
+            <a:ext cx="940821" cy="944870"/>
+          </a:xfrm>
+          <a:prstGeom prst="bentConnector3">
+            <a:avLst>
+              <a:gd name="adj1" fmla="val 50000"/>
+            </a:avLst>
+          </a:prstGeom>
+          <a:ln w="12700">
+            <a:solidFill>
+              <a:schemeClr val="tx1"/>
+            </a:solidFill>
+            <a:tailEnd type="stealth" w="lg" len="lg"/>
+          </a:ln>
+        </p:spPr>
+        <p:style>
+          <a:lnRef idx="1">
+            <a:schemeClr val="accent1"/>
+          </a:lnRef>
+          <a:fillRef idx="0">
+            <a:schemeClr val="accent1"/>
+          </a:fillRef>
+          <a:effectRef idx="0">
+            <a:schemeClr val="accent1"/>
+          </a:effectRef>
+          <a:fontRef idx="minor">
+            <a:schemeClr val="tx1"/>
+          </a:fontRef>
+        </p:style>
+      </p:cxnSp>
+      <p:grpSp>
+        <p:nvGrpSpPr>
+          <p:cNvPr id="121" name="Group 120">
+            <a:extLst>
+              <a:ext uri="{FF2B5EF4-FFF2-40B4-BE49-F238E27FC236}">
+                <a16:creationId xmlns:a16="http://schemas.microsoft.com/office/drawing/2014/main" id="{482B1CF0-E250-FC41-B587-5EE6BC3D4DD9}"/>
+              </a:ext>
+            </a:extLst>
+          </p:cNvPr>
+          <p:cNvGrpSpPr/>
+          <p:nvPr/>
+        </p:nvGrpSpPr>
+        <p:grpSpPr>
+          <a:xfrm>
+            <a:off x="5601619" y="3703681"/>
+            <a:ext cx="2201259" cy="2697372"/>
+            <a:chOff x="283757" y="0"/>
+            <a:chExt cx="2201259" cy="2697372"/>
+          </a:xfrm>
+        </p:grpSpPr>
+        <p:sp>
+          <p:nvSpPr>
+            <p:cNvPr id="122" name="TextBox 121">
+              <a:extLst>
+                <a:ext uri="{FF2B5EF4-FFF2-40B4-BE49-F238E27FC236}">
+                  <a16:creationId xmlns:a16="http://schemas.microsoft.com/office/drawing/2014/main" id="{8C98575A-5C35-9042-9B9E-0BB690431D78}"/>
+                </a:ext>
+              </a:extLst>
+            </p:cNvPr>
+            <p:cNvSpPr txBox="1"/>
+            <p:nvPr/>
+          </p:nvSpPr>
+          <p:spPr>
+            <a:xfrm>
+              <a:off x="283758" y="2328040"/>
+              <a:ext cx="2201258" cy="369332"/>
+            </a:xfrm>
+            <a:prstGeom prst="rect">
+              <a:avLst/>
+            </a:prstGeom>
+            <a:noFill/>
+          </p:spPr>
+          <p:txBody>
+            <a:bodyPr wrap="square" rtlCol="0">
+              <a:spAutoFit/>
+            </a:bodyPr>
+            <a:lstStyle/>
+            <a:p>
+              <a:pPr algn="ctr"/>
+              <a:r>
+                <a:rPr lang="en-CN" b="1" dirty="0">
+                  <a:latin typeface="Times New Roman" panose="02020603050405020304" pitchFamily="18" charset="0"/>
+                  <a:cs typeface="Times New Roman" panose="02020603050405020304" pitchFamily="18" charset="0"/>
+                </a:rPr>
+                <a:t>TX 3</a:t>
+              </a:r>
+            </a:p>
+          </p:txBody>
+        </p:sp>
+        <p:cxnSp>
+          <p:nvCxnSpPr>
+            <p:cNvPr id="123" name="Straight Connector 122">
+              <a:extLst>
+                <a:ext uri="{FF2B5EF4-FFF2-40B4-BE49-F238E27FC236}">
+                  <a16:creationId xmlns:a16="http://schemas.microsoft.com/office/drawing/2014/main" id="{1C91F8B9-BD7E-9547-9961-8E7331D2B916}"/>
+                </a:ext>
+              </a:extLst>
+            </p:cNvPr>
+            <p:cNvCxnSpPr>
+              <a:cxnSpLocks/>
+            </p:cNvCxnSpPr>
+            <p:nvPr/>
+          </p:nvCxnSpPr>
+          <p:spPr>
+            <a:xfrm>
+              <a:off x="283757" y="318220"/>
+              <a:ext cx="2201259" cy="0"/>
+            </a:xfrm>
+            <a:prstGeom prst="line">
+              <a:avLst/>
+            </a:prstGeom>
+            <a:ln w="19050">
+              <a:solidFill>
+                <a:schemeClr val="tx1"/>
+              </a:solidFill>
+            </a:ln>
+          </p:spPr>
+          <p:style>
+            <a:lnRef idx="1">
+              <a:schemeClr val="accent1"/>
+            </a:lnRef>
+            <a:fillRef idx="0">
+              <a:schemeClr val="accent1"/>
+            </a:fillRef>
+            <a:effectRef idx="0">
+              <a:schemeClr val="accent1"/>
+            </a:effectRef>
+            <a:fontRef idx="minor">
+              <a:schemeClr val="tx1"/>
+            </a:fontRef>
+          </p:style>
+        </p:cxnSp>
+        <p:grpSp>
+          <p:nvGrpSpPr>
+            <p:cNvPr id="124" name="Group 123">
+              <a:extLst>
+                <a:ext uri="{FF2B5EF4-FFF2-40B4-BE49-F238E27FC236}">
+                  <a16:creationId xmlns:a16="http://schemas.microsoft.com/office/drawing/2014/main" id="{1FDAE7EE-D407-414A-902B-EB5A471C591E}"/>
+                </a:ext>
+              </a:extLst>
+            </p:cNvPr>
+            <p:cNvGrpSpPr/>
+            <p:nvPr/>
+          </p:nvGrpSpPr>
+          <p:grpSpPr>
+            <a:xfrm>
+              <a:off x="419204" y="438300"/>
+              <a:ext cx="1930361" cy="910988"/>
+              <a:chOff x="376703" y="584325"/>
+              <a:chExt cx="1930361" cy="910988"/>
+            </a:xfrm>
+          </p:grpSpPr>
+          <p:sp>
+            <p:nvSpPr>
+              <p:cNvPr id="130" name="Rectangle 129">
+                <a:extLst>
+                  <a:ext uri="{FF2B5EF4-FFF2-40B4-BE49-F238E27FC236}">
+                    <a16:creationId xmlns:a16="http://schemas.microsoft.com/office/drawing/2014/main" id="{59FDD32A-3E6F-3640-9BB9-10141565E548}"/>
+                  </a:ext>
+                </a:extLst>
+              </p:cNvPr>
+              <p:cNvSpPr/>
+              <p:nvPr/>
+            </p:nvSpPr>
+            <p:spPr>
+              <a:xfrm>
+                <a:off x="376703" y="584325"/>
+                <a:ext cx="1930361" cy="910988"/>
+              </a:xfrm>
+              <a:prstGeom prst="rect">
+                <a:avLst/>
+              </a:prstGeom>
+              <a:noFill/>
+              <a:ln w="19050">
+                <a:solidFill>
+                  <a:schemeClr val="accent2"/>
+                </a:solidFill>
+              </a:ln>
+            </p:spPr>
+            <p:style>
+              <a:lnRef idx="2">
+                <a:schemeClr val="accent1">
+                  <a:shade val="50000"/>
+                </a:schemeClr>
+              </a:lnRef>
+              <a:fillRef idx="1">
+                <a:schemeClr val="accent1"/>
+              </a:fillRef>
+              <a:effectRef idx="0">
+                <a:schemeClr val="accent1"/>
+              </a:effectRef>
+              <a:fontRef idx="minor">
+                <a:schemeClr val="lt1"/>
+              </a:fontRef>
+            </p:style>
+            <p:txBody>
+              <a:bodyPr rtlCol="0" anchor="ctr"/>
+              <a:lstStyle/>
+              <a:p>
+                <a:pPr algn="ctr"/>
+                <a:endParaRPr lang="en-CN">
+                  <a:solidFill>
+                    <a:schemeClr val="accent2">
+                      <a:lumMod val="50000"/>
+                    </a:schemeClr>
+                  </a:solidFill>
+                </a:endParaRPr>
+              </a:p>
+            </p:txBody>
+          </p:sp>
+          <p:sp>
+            <p:nvSpPr>
+              <p:cNvPr id="131" name="Rectangle 130">
+                <a:extLst>
+                  <a:ext uri="{FF2B5EF4-FFF2-40B4-BE49-F238E27FC236}">
+                    <a16:creationId xmlns:a16="http://schemas.microsoft.com/office/drawing/2014/main" id="{692E749F-8C3F-B247-9BEE-068D723FD578}"/>
+                  </a:ext>
+                </a:extLst>
+              </p:cNvPr>
+              <p:cNvSpPr/>
+              <p:nvPr/>
+            </p:nvSpPr>
+            <p:spPr>
+              <a:xfrm>
+                <a:off x="482828" y="698725"/>
+                <a:ext cx="1718110" cy="682187"/>
+              </a:xfrm>
+              <a:prstGeom prst="rect">
+                <a:avLst/>
+              </a:prstGeom>
+              <a:noFill/>
+              <a:ln w="19050">
+                <a:solidFill>
+                  <a:schemeClr val="accent2"/>
+                </a:solidFill>
+              </a:ln>
+            </p:spPr>
+            <p:style>
+              <a:lnRef idx="2">
+                <a:schemeClr val="accent1">
+                  <a:shade val="50000"/>
+                </a:schemeClr>
+              </a:lnRef>
+              <a:fillRef idx="1">
+                <a:schemeClr val="accent1"/>
+              </a:fillRef>
+              <a:effectRef idx="0">
+                <a:schemeClr val="accent1"/>
+              </a:effectRef>
+              <a:fontRef idx="minor">
+                <a:schemeClr val="lt1"/>
+              </a:fontRef>
+            </p:style>
+            <p:txBody>
+              <a:bodyPr rtlCol="0" anchor="ctr"/>
+              <a:lstStyle/>
+              <a:p>
+                <a:pPr algn="ctr"/>
+                <a:r>
+                  <a:rPr lang="en-CN" sz="1200" dirty="0">
+                    <a:solidFill>
+                      <a:schemeClr val="accent2">
+                        <a:lumMod val="50000"/>
+                      </a:schemeClr>
+                    </a:solidFill>
+                  </a:rPr>
+                  <a:t>input_</a:t>
+                </a:r>
+                <a:r>
+                  <a:rPr lang="en-US" sz="1200" dirty="0">
+                    <a:solidFill>
+                      <a:schemeClr val="accent2">
+                        <a:lumMod val="50000"/>
+                      </a:schemeClr>
+                    </a:solidFill>
+                  </a:rPr>
+                  <a:t>0</a:t>
+                </a:r>
+              </a:p>
+              <a:p>
+                <a:pPr algn="ctr"/>
+                <a:r>
+                  <a:rPr lang="en-US" sz="900" b="1" u="sng" dirty="0">
+                    <a:solidFill>
+                      <a:schemeClr val="accent2">
+                        <a:lumMod val="50000"/>
+                      </a:schemeClr>
+                    </a:solidFill>
+                    <a:effectLst/>
+                  </a:rPr>
+                  <a:t>prevTxHash</a:t>
+                </a:r>
+                <a:r>
+                  <a:rPr lang="en-US" sz="900" dirty="0">
+                    <a:solidFill>
+                      <a:schemeClr val="accent2">
+                        <a:lumMod val="50000"/>
+                      </a:schemeClr>
+                    </a:solidFill>
+                    <a:effectLst/>
+                  </a:rPr>
+                  <a:t>=hash_1</a:t>
+                </a:r>
+              </a:p>
+              <a:p>
+                <a:pPr algn="ctr"/>
+                <a:r>
+                  <a:rPr lang="en-US" sz="900" b="1" u="sng" dirty="0">
+                    <a:solidFill>
+                      <a:srgbClr val="FF0000"/>
+                    </a:solidFill>
+                    <a:effectLst/>
+                  </a:rPr>
+                  <a:t>outputIndex</a:t>
+                </a:r>
+                <a:r>
+                  <a:rPr lang="en-US" sz="900" dirty="0">
+                    <a:solidFill>
+                      <a:srgbClr val="FF0000"/>
+                    </a:solidFill>
+                  </a:rPr>
+                  <a:t>=</a:t>
+                </a:r>
+                <a:r>
+                  <a:rPr lang="en-US" altLang="zh-CN" sz="900" dirty="0">
+                    <a:solidFill>
+                      <a:srgbClr val="FF0000"/>
+                    </a:solidFill>
+                  </a:rPr>
+                  <a:t>2</a:t>
+                </a:r>
+                <a:endParaRPr lang="en-US" sz="900" dirty="0">
+                  <a:solidFill>
+                    <a:srgbClr val="FF0000"/>
+                  </a:solidFill>
+                </a:endParaRPr>
+              </a:p>
+              <a:p>
+                <a:pPr algn="ctr"/>
+                <a:r>
+                  <a:rPr lang="en-US" sz="900" b="1" u="sng" dirty="0">
+                    <a:solidFill>
+                      <a:schemeClr val="accent2">
+                        <a:lumMod val="50000"/>
+                      </a:schemeClr>
+                    </a:solidFill>
+                  </a:rPr>
+                  <a:t>s</a:t>
+                </a:r>
+                <a:r>
+                  <a:rPr lang="en-US" sz="900" b="1" u="sng" dirty="0">
+                    <a:solidFill>
+                      <a:schemeClr val="accent2">
+                        <a:lumMod val="50000"/>
+                      </a:schemeClr>
+                    </a:solidFill>
+                    <a:effectLst/>
+                  </a:rPr>
+                  <a:t>ignature</a:t>
+                </a:r>
+                <a:r>
+                  <a:rPr lang="en-US" sz="900" dirty="0">
+                    <a:solidFill>
+                      <a:schemeClr val="accent2">
+                        <a:lumMod val="50000"/>
+                      </a:schemeClr>
+                    </a:solidFill>
+                  </a:rPr>
+                  <a:t>=sig(</a:t>
+                </a:r>
+                <a:r>
+                  <a:rPr lang="en-US" sz="900" dirty="0" err="1">
+                    <a:solidFill>
+                      <a:schemeClr val="accent2">
+                        <a:lumMod val="50000"/>
+                      </a:schemeClr>
+                    </a:solidFill>
+                    <a:effectLst/>
+                  </a:rPr>
+                  <a:t>kAlice_sk</a:t>
+                </a:r>
+                <a:r>
+                  <a:rPr lang="en-US" sz="900" dirty="0">
+                    <a:solidFill>
+                      <a:schemeClr val="accent2">
+                        <a:lumMod val="50000"/>
+                      </a:schemeClr>
+                    </a:solidFill>
+                    <a:effectLst/>
+                  </a:rPr>
+                  <a:t>, 0</a:t>
+                </a:r>
+                <a:r>
+                  <a:rPr lang="en-US" sz="900" dirty="0">
+                    <a:solidFill>
+                      <a:schemeClr val="accent2">
+                        <a:lumMod val="50000"/>
+                      </a:schemeClr>
+                    </a:solidFill>
+                  </a:rPr>
+                  <a:t>)</a:t>
+                </a:r>
+                <a:endParaRPr lang="en-US" sz="900" dirty="0">
+                  <a:solidFill>
+                    <a:schemeClr val="accent2">
+                      <a:lumMod val="50000"/>
+                    </a:schemeClr>
+                  </a:solidFill>
+                  <a:effectLst/>
+                </a:endParaRPr>
+              </a:p>
+            </p:txBody>
+          </p:sp>
+        </p:grpSp>
+        <p:grpSp>
+          <p:nvGrpSpPr>
+            <p:cNvPr id="125" name="Group 124">
+              <a:extLst>
+                <a:ext uri="{FF2B5EF4-FFF2-40B4-BE49-F238E27FC236}">
+                  <a16:creationId xmlns:a16="http://schemas.microsoft.com/office/drawing/2014/main" id="{2DFB819B-0683-7742-8E58-7BBFAEAABDF0}"/>
+                </a:ext>
+              </a:extLst>
+            </p:cNvPr>
+            <p:cNvGrpSpPr/>
+            <p:nvPr/>
+          </p:nvGrpSpPr>
+          <p:grpSpPr>
+            <a:xfrm>
+              <a:off x="419204" y="1451419"/>
+              <a:ext cx="1930361" cy="774490"/>
+              <a:chOff x="376703" y="1692392"/>
+              <a:chExt cx="1930361" cy="774490"/>
+            </a:xfrm>
+          </p:grpSpPr>
+          <p:sp>
+            <p:nvSpPr>
+              <p:cNvPr id="128" name="Rectangle 127">
+                <a:extLst>
+                  <a:ext uri="{FF2B5EF4-FFF2-40B4-BE49-F238E27FC236}">
+                    <a16:creationId xmlns:a16="http://schemas.microsoft.com/office/drawing/2014/main" id="{2129337D-7579-124E-A752-C6EE92F2E086}"/>
+                  </a:ext>
+                </a:extLst>
+              </p:cNvPr>
+              <p:cNvSpPr/>
+              <p:nvPr/>
+            </p:nvSpPr>
+            <p:spPr>
+              <a:xfrm>
+                <a:off x="376703" y="1692392"/>
+                <a:ext cx="1930361" cy="774490"/>
+              </a:xfrm>
+              <a:prstGeom prst="rect">
+                <a:avLst/>
+              </a:prstGeom>
+              <a:noFill/>
+              <a:ln w="19050">
+                <a:solidFill>
+                  <a:schemeClr val="accent1"/>
+                </a:solidFill>
+              </a:ln>
+            </p:spPr>
+            <p:style>
+              <a:lnRef idx="2">
+                <a:schemeClr val="accent1">
+                  <a:shade val="50000"/>
+                </a:schemeClr>
+              </a:lnRef>
+              <a:fillRef idx="1">
+                <a:schemeClr val="accent1"/>
+              </a:fillRef>
+              <a:effectRef idx="0">
+                <a:schemeClr val="accent1"/>
+              </a:effectRef>
+              <a:fontRef idx="minor">
+                <a:schemeClr val="lt1"/>
+              </a:fontRef>
+            </p:style>
+            <p:txBody>
+              <a:bodyPr rtlCol="0" anchor="ctr"/>
+              <a:lstStyle/>
+              <a:p>
+                <a:pPr algn="ctr"/>
+                <a:endParaRPr lang="en-CN"/>
+              </a:p>
+            </p:txBody>
+          </p:sp>
+          <p:sp>
+            <p:nvSpPr>
+              <p:cNvPr id="129" name="Rectangle 128">
+                <a:extLst>
+                  <a:ext uri="{FF2B5EF4-FFF2-40B4-BE49-F238E27FC236}">
+                    <a16:creationId xmlns:a16="http://schemas.microsoft.com/office/drawing/2014/main" id="{88582C0E-D5D6-E743-B8E9-85B2E91CCAB0}"/>
+                  </a:ext>
+                </a:extLst>
+              </p:cNvPr>
+              <p:cNvSpPr/>
+              <p:nvPr/>
+            </p:nvSpPr>
+            <p:spPr>
+              <a:xfrm>
+                <a:off x="476808" y="1791837"/>
+                <a:ext cx="1718108" cy="576129"/>
+              </a:xfrm>
+              <a:prstGeom prst="rect">
+                <a:avLst/>
+              </a:prstGeom>
+              <a:noFill/>
+              <a:ln w="19050">
+                <a:solidFill>
+                  <a:schemeClr val="accent1"/>
+                </a:solidFill>
+              </a:ln>
+            </p:spPr>
+            <p:style>
+              <a:lnRef idx="2">
+                <a:schemeClr val="accent1">
+                  <a:shade val="50000"/>
+                </a:schemeClr>
+              </a:lnRef>
+              <a:fillRef idx="1">
+                <a:schemeClr val="accent1"/>
+              </a:fillRef>
+              <a:effectRef idx="0">
+                <a:schemeClr val="accent1"/>
+              </a:effectRef>
+              <a:fontRef idx="minor">
+                <a:schemeClr val="lt1"/>
+              </a:fontRef>
+            </p:style>
+            <p:txBody>
+              <a:bodyPr rtlCol="0" anchor="ctr"/>
+              <a:lstStyle/>
+              <a:p>
+                <a:pPr algn="ctr"/>
+                <a:r>
+                  <a:rPr lang="en-CN" sz="1200" dirty="0">
+                    <a:solidFill>
+                      <a:schemeClr val="accent1">
+                        <a:lumMod val="50000"/>
+                      </a:schemeClr>
+                    </a:solidFill>
+                  </a:rPr>
+                  <a:t>output_</a:t>
+                </a:r>
+                <a:r>
+                  <a:rPr lang="en-US" sz="1200" dirty="0">
+                    <a:solidFill>
+                      <a:schemeClr val="accent1">
+                        <a:lumMod val="50000"/>
+                      </a:schemeClr>
+                    </a:solidFill>
+                  </a:rPr>
+                  <a:t>0</a:t>
+                </a:r>
+              </a:p>
+              <a:p>
+                <a:pPr algn="ctr"/>
+                <a:r>
+                  <a:rPr lang="en-US" sz="900" b="1" u="sng" dirty="0">
+                    <a:solidFill>
+                      <a:schemeClr val="accent1">
+                        <a:lumMod val="50000"/>
+                      </a:schemeClr>
+                    </a:solidFill>
+                    <a:effectLst/>
+                  </a:rPr>
+                  <a:t>value</a:t>
+                </a:r>
+                <a:r>
+                  <a:rPr lang="en-US" altLang="zh-CN" sz="900" dirty="0">
+                    <a:solidFill>
+                      <a:schemeClr val="accent1">
+                        <a:lumMod val="50000"/>
+                      </a:schemeClr>
+                    </a:solidFill>
+                    <a:effectLst/>
+                  </a:rPr>
+                  <a:t>=9</a:t>
+                </a:r>
+                <a:endParaRPr lang="en-US" sz="900" dirty="0">
+                  <a:solidFill>
+                    <a:schemeClr val="accent1">
+                      <a:lumMod val="50000"/>
+                    </a:schemeClr>
+                  </a:solidFill>
+                  <a:effectLst/>
+                </a:endParaRPr>
+              </a:p>
+              <a:p>
+                <a:pPr algn="ctr"/>
+                <a:r>
+                  <a:rPr lang="en-US" sz="900" b="1" u="sng" dirty="0">
+                    <a:solidFill>
+                      <a:schemeClr val="accent1">
+                        <a:lumMod val="50000"/>
+                      </a:schemeClr>
+                    </a:solidFill>
+                    <a:effectLst/>
+                  </a:rPr>
+                  <a:t>address</a:t>
+                </a:r>
+                <a:r>
+                  <a:rPr lang="en-US" altLang="zh-CN" sz="900" dirty="0">
+                    <a:solidFill>
+                      <a:schemeClr val="accent1">
+                        <a:lumMod val="50000"/>
+                      </a:schemeClr>
+                    </a:solidFill>
+                    <a:effectLst/>
+                  </a:rPr>
+                  <a:t>=</a:t>
+                </a:r>
+                <a:r>
+                  <a:rPr lang="en-US" sz="900" dirty="0">
+                    <a:solidFill>
+                      <a:schemeClr val="accent1">
+                        <a:lumMod val="50000"/>
+                      </a:schemeClr>
+                    </a:solidFill>
+                    <a:effectLst/>
+                  </a:rPr>
+                  <a:t> </a:t>
+                </a:r>
+                <a:r>
+                  <a:rPr lang="en-US" sz="900" dirty="0" err="1">
+                    <a:solidFill>
+                      <a:schemeClr val="accent1">
+                        <a:lumMod val="50000"/>
+                      </a:schemeClr>
+                    </a:solidFill>
+                    <a:effectLst/>
+                  </a:rPr>
+                  <a:t>kScrooge</a:t>
+                </a:r>
+                <a:r>
+                  <a:rPr lang="en-CN" sz="900" dirty="0">
+                    <a:solidFill>
+                      <a:schemeClr val="accent1">
+                        <a:lumMod val="50000"/>
+                      </a:schemeClr>
+                    </a:solidFill>
+                  </a:rPr>
+                  <a:t>_pk</a:t>
+                </a:r>
+              </a:p>
+            </p:txBody>
+          </p:sp>
+        </p:grpSp>
+        <p:sp>
+          <p:nvSpPr>
+            <p:cNvPr id="126" name="Rounded Rectangle 125">
+              <a:extLst>
+                <a:ext uri="{FF2B5EF4-FFF2-40B4-BE49-F238E27FC236}">
+                  <a16:creationId xmlns:a16="http://schemas.microsoft.com/office/drawing/2014/main" id="{AA2A7585-9F4D-D246-87BC-2AD1E7EABE7F}"/>
+                </a:ext>
+              </a:extLst>
+            </p:cNvPr>
+            <p:cNvSpPr/>
+            <p:nvPr/>
+          </p:nvSpPr>
+          <p:spPr>
+            <a:xfrm>
+              <a:off x="283757" y="0"/>
+              <a:ext cx="2201259" cy="2334409"/>
+            </a:xfrm>
+            <a:prstGeom prst="roundRect">
+              <a:avLst>
+                <a:gd name="adj" fmla="val 3417"/>
+              </a:avLst>
+            </a:prstGeom>
+            <a:noFill/>
+            <a:ln w="19050">
+              <a:solidFill>
+                <a:schemeClr val="tx1"/>
+              </a:solidFill>
+            </a:ln>
+          </p:spPr>
+          <p:style>
+            <a:lnRef idx="2">
+              <a:schemeClr val="accent1">
+                <a:shade val="50000"/>
+              </a:schemeClr>
+            </a:lnRef>
+            <a:fillRef idx="1">
+              <a:schemeClr val="accent1"/>
+            </a:fillRef>
+            <a:effectRef idx="0">
+              <a:schemeClr val="accent1"/>
+            </a:effectRef>
+            <a:fontRef idx="minor">
+              <a:schemeClr val="lt1"/>
+            </a:fontRef>
+          </p:style>
+          <p:txBody>
+            <a:bodyPr rtlCol="0" anchor="ctr"/>
+            <a:lstStyle/>
+            <a:p>
+              <a:pPr algn="ctr"/>
+              <a:endParaRPr lang="en-CN">
+                <a:latin typeface="Times New Roman" panose="02020603050405020304" pitchFamily="18" charset="0"/>
+                <a:cs typeface="Times New Roman" panose="02020603050405020304" pitchFamily="18" charset="0"/>
+              </a:endParaRPr>
+            </a:p>
+          </p:txBody>
+        </p:sp>
+        <p:sp>
+          <p:nvSpPr>
+            <p:cNvPr id="127" name="TextBox 126">
+              <a:extLst>
+                <a:ext uri="{FF2B5EF4-FFF2-40B4-BE49-F238E27FC236}">
+                  <a16:creationId xmlns:a16="http://schemas.microsoft.com/office/drawing/2014/main" id="{D56F9D86-8CC9-5840-B072-999F039559EA}"/>
+                </a:ext>
+              </a:extLst>
+            </p:cNvPr>
+            <p:cNvSpPr txBox="1"/>
+            <p:nvPr/>
+          </p:nvSpPr>
+          <p:spPr>
+            <a:xfrm>
+              <a:off x="283757" y="6206"/>
+              <a:ext cx="2201259" cy="323165"/>
+            </a:xfrm>
+            <a:prstGeom prst="rect">
+              <a:avLst/>
+            </a:prstGeom>
+            <a:noFill/>
+          </p:spPr>
+          <p:txBody>
+            <a:bodyPr wrap="square" rtlCol="0">
+              <a:spAutoFit/>
+            </a:bodyPr>
+            <a:lstStyle/>
+            <a:p>
+              <a:pPr algn="ctr"/>
+              <a:r>
+                <a:rPr lang="en-US" sz="1500" dirty="0"/>
+                <a:t>h</a:t>
+              </a:r>
+              <a:r>
+                <a:rPr lang="en-US" sz="1500" dirty="0">
+                  <a:effectLst/>
+                </a:rPr>
+                <a:t>ash_3</a:t>
+              </a:r>
+            </a:p>
+          </p:txBody>
+        </p:sp>
+      </p:grpSp>
+      <p:cxnSp>
+        <p:nvCxnSpPr>
+          <p:cNvPr id="132" name="Elbow Connector 131">
+            <a:extLst>
+              <a:ext uri="{FF2B5EF4-FFF2-40B4-BE49-F238E27FC236}">
+                <a16:creationId xmlns:a16="http://schemas.microsoft.com/office/drawing/2014/main" id="{1F69C90A-0036-5947-BAC0-404C853E2FCD}"/>
+              </a:ext>
+            </a:extLst>
+          </p:cNvPr>
+          <p:cNvCxnSpPr>
+            <a:cxnSpLocks/>
+            <a:stCxn id="88" idx="3"/>
+            <a:endCxn id="131" idx="1"/>
+          </p:cNvCxnSpPr>
+          <p:nvPr/>
+        </p:nvCxnSpPr>
+        <p:spPr>
+          <a:xfrm>
+            <a:off x="4902370" y="2129120"/>
+            <a:ext cx="940821" cy="2468355"/>
+          </a:xfrm>
+          <a:prstGeom prst="bentConnector3">
+            <a:avLst>
+              <a:gd name="adj1" fmla="val 50000"/>
+            </a:avLst>
+          </a:prstGeom>
+          <a:ln w="12700">
+            <a:solidFill>
+              <a:srgbClr val="FF0000"/>
+            </a:solidFill>
+            <a:tailEnd type="stealth" w="lg" len="lg"/>
+          </a:ln>
+        </p:spPr>
+        <p:style>
+          <a:lnRef idx="1">
+            <a:schemeClr val="accent1"/>
+          </a:lnRef>
+          <a:fillRef idx="0">
+            <a:schemeClr val="accent1"/>
+          </a:fillRef>
+          <a:effectRef idx="0">
+            <a:schemeClr val="accent1"/>
+          </a:effectRef>
+          <a:fontRef idx="minor">
+            <a:schemeClr val="tx1"/>
+          </a:fontRef>
+        </p:style>
+      </p:cxnSp>
+      <p:sp>
+        <p:nvSpPr>
+          <p:cNvPr id="135" name="Rectangle 134">
+            <a:extLst>
+              <a:ext uri="{FF2B5EF4-FFF2-40B4-BE49-F238E27FC236}">
+                <a16:creationId xmlns:a16="http://schemas.microsoft.com/office/drawing/2014/main" id="{DB38875A-E437-AF4B-9813-E01058C6861B}"/>
+              </a:ext>
+            </a:extLst>
+          </p:cNvPr>
+          <p:cNvSpPr/>
+          <p:nvPr/>
+        </p:nvSpPr>
+        <p:spPr>
+          <a:xfrm>
+            <a:off x="5837171" y="2468259"/>
+            <a:ext cx="1718108" cy="576129"/>
+          </a:xfrm>
+          <a:prstGeom prst="rect">
+            <a:avLst/>
+          </a:prstGeom>
+          <a:noFill/>
+          <a:ln w="19050">
+            <a:solidFill>
+              <a:schemeClr val="accent1"/>
+            </a:solidFill>
+          </a:ln>
+        </p:spPr>
+        <p:style>
+          <a:lnRef idx="2">
+            <a:schemeClr val="accent1">
+              <a:shade val="50000"/>
+            </a:schemeClr>
+          </a:lnRef>
+          <a:fillRef idx="1">
+            <a:schemeClr val="accent1"/>
+          </a:fillRef>
+          <a:effectRef idx="0">
+            <a:schemeClr val="accent1"/>
+          </a:effectRef>
+          <a:fontRef idx="minor">
+            <a:schemeClr val="lt1"/>
+          </a:fontRef>
+        </p:style>
+        <p:txBody>
+          <a:bodyPr rtlCol="0" anchor="ctr"/>
+          <a:lstStyle/>
+          <a:p>
+            <a:pPr algn="ctr"/>
+            <a:r>
+              <a:rPr lang="en-CN" sz="1200" dirty="0">
+                <a:solidFill>
+                  <a:schemeClr val="accent1">
+                    <a:lumMod val="50000"/>
+                  </a:schemeClr>
+                </a:solidFill>
+              </a:rPr>
+              <a:t>output_</a:t>
+            </a:r>
+            <a:r>
+              <a:rPr lang="en-US" sz="1200" dirty="0">
+                <a:solidFill>
+                  <a:schemeClr val="accent1">
+                    <a:lumMod val="50000"/>
+                  </a:schemeClr>
+                </a:solidFill>
+              </a:rPr>
+              <a:t>1</a:t>
+            </a:r>
+          </a:p>
+          <a:p>
+            <a:pPr algn="ctr"/>
+            <a:r>
+              <a:rPr lang="en-US" sz="900" b="1" u="sng" dirty="0">
+                <a:solidFill>
+                  <a:schemeClr val="accent1">
+                    <a:lumMod val="50000"/>
+                  </a:schemeClr>
+                </a:solidFill>
+                <a:effectLst/>
+              </a:rPr>
+              <a:t>value</a:t>
+            </a:r>
+            <a:r>
+              <a:rPr lang="en-US" altLang="zh-CN" sz="900" dirty="0">
+                <a:solidFill>
+                  <a:schemeClr val="accent1">
+                    <a:lumMod val="50000"/>
+                  </a:schemeClr>
+                </a:solidFill>
+                <a:effectLst/>
+              </a:rPr>
+              <a:t>=1</a:t>
+            </a:r>
+            <a:endParaRPr lang="en-US" sz="900" dirty="0">
+              <a:solidFill>
+                <a:schemeClr val="accent1">
+                  <a:lumMod val="50000"/>
+                </a:schemeClr>
+              </a:solidFill>
+              <a:effectLst/>
+            </a:endParaRPr>
+          </a:p>
+          <a:p>
+            <a:pPr algn="ctr"/>
+            <a:r>
+              <a:rPr lang="en-US" sz="900" b="1" u="sng" dirty="0">
+                <a:solidFill>
+                  <a:schemeClr val="accent1">
+                    <a:lumMod val="50000"/>
+                  </a:schemeClr>
+                </a:solidFill>
+                <a:effectLst/>
+              </a:rPr>
+              <a:t>address</a:t>
+            </a:r>
+            <a:r>
+              <a:rPr lang="en-US" altLang="zh-CN" sz="900" dirty="0">
+                <a:solidFill>
+                  <a:schemeClr val="accent1">
+                    <a:lumMod val="50000"/>
+                  </a:schemeClr>
+                </a:solidFill>
+                <a:effectLst/>
+              </a:rPr>
+              <a:t>=</a:t>
+            </a:r>
+            <a:r>
+              <a:rPr lang="en-US" sz="900" dirty="0">
+                <a:solidFill>
+                  <a:schemeClr val="accent1">
+                    <a:lumMod val="50000"/>
+                  </a:schemeClr>
+                </a:solidFill>
+                <a:effectLst/>
+              </a:rPr>
+              <a:t> </a:t>
+            </a:r>
+            <a:r>
+              <a:rPr lang="en-US" sz="900" dirty="0" err="1">
+                <a:solidFill>
+                  <a:schemeClr val="accent1">
+                    <a:lumMod val="50000"/>
+                  </a:schemeClr>
+                </a:solidFill>
+                <a:effectLst/>
+              </a:rPr>
+              <a:t>kAlice</a:t>
+            </a:r>
+            <a:r>
+              <a:rPr lang="en-CN" sz="900" dirty="0">
+                <a:solidFill>
+                  <a:schemeClr val="accent1">
+                    <a:lumMod val="50000"/>
+                  </a:schemeClr>
+                </a:solidFill>
+              </a:rPr>
+              <a:t>_pk</a:t>
+            </a:r>
+          </a:p>
+        </p:txBody>
+      </p:sp>
+      <p:cxnSp>
+        <p:nvCxnSpPr>
+          <p:cNvPr id="147" name="Straight Connector 146">
+            <a:extLst>
+              <a:ext uri="{FF2B5EF4-FFF2-40B4-BE49-F238E27FC236}">
+                <a16:creationId xmlns:a16="http://schemas.microsoft.com/office/drawing/2014/main" id="{1F1AEEED-98CF-B34E-9E94-D3CD621CE9A1}"/>
+              </a:ext>
+            </a:extLst>
+          </p:cNvPr>
+          <p:cNvCxnSpPr>
+            <a:cxnSpLocks/>
+          </p:cNvCxnSpPr>
+          <p:nvPr/>
+        </p:nvCxnSpPr>
+        <p:spPr>
+          <a:xfrm>
+            <a:off x="283757" y="3692530"/>
+            <a:ext cx="2201259" cy="0"/>
+          </a:xfrm>
+          <a:prstGeom prst="line">
+            <a:avLst/>
+          </a:prstGeom>
+          <a:ln w="19050">
+            <a:solidFill>
+              <a:schemeClr val="tx1"/>
+            </a:solidFill>
+          </a:ln>
+        </p:spPr>
+        <p:style>
+          <a:lnRef idx="1">
+            <a:schemeClr val="accent1"/>
+          </a:lnRef>
+          <a:fillRef idx="0">
+            <a:schemeClr val="accent1"/>
+          </a:fillRef>
+          <a:effectRef idx="0">
+            <a:schemeClr val="accent1"/>
+          </a:effectRef>
+          <a:fontRef idx="minor">
+            <a:schemeClr val="tx1"/>
+          </a:fontRef>
+        </p:style>
+      </p:cxnSp>
+      <p:grpSp>
+        <p:nvGrpSpPr>
+          <p:cNvPr id="148" name="Group 147">
+            <a:extLst>
+              <a:ext uri="{FF2B5EF4-FFF2-40B4-BE49-F238E27FC236}">
+                <a16:creationId xmlns:a16="http://schemas.microsoft.com/office/drawing/2014/main" id="{4E4EFF45-D4EF-1E44-97C2-047F5F9EE134}"/>
+              </a:ext>
+            </a:extLst>
+          </p:cNvPr>
+          <p:cNvGrpSpPr/>
+          <p:nvPr/>
+        </p:nvGrpSpPr>
+        <p:grpSpPr>
+          <a:xfrm>
+            <a:off x="419204" y="3812610"/>
+            <a:ext cx="1930361" cy="910988"/>
+            <a:chOff x="376703" y="584325"/>
+            <a:chExt cx="1930361" cy="910988"/>
+          </a:xfrm>
+        </p:grpSpPr>
+        <p:sp>
+          <p:nvSpPr>
+            <p:cNvPr id="149" name="Rectangle 148">
+              <a:extLst>
+                <a:ext uri="{FF2B5EF4-FFF2-40B4-BE49-F238E27FC236}">
+                  <a16:creationId xmlns:a16="http://schemas.microsoft.com/office/drawing/2014/main" id="{64F9DC0A-0AAD-184E-8BA8-39FDF068329D}"/>
+                </a:ext>
+              </a:extLst>
+            </p:cNvPr>
+            <p:cNvSpPr/>
+            <p:nvPr/>
+          </p:nvSpPr>
+          <p:spPr>
+            <a:xfrm>
+              <a:off x="376703" y="584325"/>
+              <a:ext cx="1930361" cy="910988"/>
+            </a:xfrm>
+            <a:prstGeom prst="rect">
+              <a:avLst/>
+            </a:prstGeom>
+            <a:noFill/>
+            <a:ln w="19050">
+              <a:solidFill>
+                <a:schemeClr val="accent2"/>
+              </a:solidFill>
+            </a:ln>
+          </p:spPr>
+          <p:style>
+            <a:lnRef idx="2">
+              <a:schemeClr val="accent1">
+                <a:shade val="50000"/>
+              </a:schemeClr>
+            </a:lnRef>
+            <a:fillRef idx="1">
+              <a:schemeClr val="accent1"/>
+            </a:fillRef>
+            <a:effectRef idx="0">
+              <a:schemeClr val="accent1"/>
+            </a:effectRef>
+            <a:fontRef idx="minor">
+              <a:schemeClr val="lt1"/>
+            </a:fontRef>
+          </p:style>
+          <p:txBody>
+            <a:bodyPr rtlCol="0" anchor="ctr"/>
+            <a:lstStyle/>
+            <a:p>
+              <a:pPr algn="ctr"/>
+              <a:endParaRPr lang="en-CN">
+                <a:solidFill>
+                  <a:schemeClr val="accent2">
+                    <a:lumMod val="50000"/>
+                  </a:schemeClr>
+                </a:solidFill>
+              </a:endParaRPr>
+            </a:p>
+          </p:txBody>
+        </p:sp>
+        <p:sp>
+          <p:nvSpPr>
+            <p:cNvPr id="150" name="Rectangle 149">
+              <a:extLst>
+                <a:ext uri="{FF2B5EF4-FFF2-40B4-BE49-F238E27FC236}">
+                  <a16:creationId xmlns:a16="http://schemas.microsoft.com/office/drawing/2014/main" id="{112932C6-1EE9-9847-851B-9821949E6CE8}"/>
+                </a:ext>
+              </a:extLst>
+            </p:cNvPr>
+            <p:cNvSpPr/>
+            <p:nvPr/>
+          </p:nvSpPr>
+          <p:spPr>
+            <a:xfrm>
+              <a:off x="482828" y="698725"/>
+              <a:ext cx="1718110" cy="682187"/>
+            </a:xfrm>
+            <a:prstGeom prst="rect">
+              <a:avLst/>
+            </a:prstGeom>
+            <a:noFill/>
+            <a:ln w="19050">
+              <a:solidFill>
+                <a:schemeClr val="accent2"/>
+              </a:solidFill>
+            </a:ln>
+          </p:spPr>
+          <p:style>
+            <a:lnRef idx="2">
+              <a:schemeClr val="accent1">
+                <a:shade val="50000"/>
+              </a:schemeClr>
+            </a:lnRef>
+            <a:fillRef idx="1">
+              <a:schemeClr val="accent1"/>
+            </a:fillRef>
+            <a:effectRef idx="0">
+              <a:schemeClr val="accent1"/>
+            </a:effectRef>
+            <a:fontRef idx="minor">
+              <a:schemeClr val="lt1"/>
+            </a:fontRef>
+          </p:style>
+          <p:txBody>
+            <a:bodyPr rtlCol="0" anchor="ctr"/>
+            <a:lstStyle/>
+            <a:p>
+              <a:pPr algn="ctr"/>
+              <a:r>
+                <a:rPr lang="en-CN" sz="1200" dirty="0">
+                  <a:solidFill>
+                    <a:schemeClr val="accent2">
+                      <a:lumMod val="50000"/>
+                    </a:schemeClr>
+                  </a:solidFill>
+                </a:rPr>
+                <a:t>input_</a:t>
+              </a:r>
+              <a:r>
+                <a:rPr lang="en-US" sz="1200" dirty="0">
+                  <a:solidFill>
+                    <a:schemeClr val="accent2">
+                      <a:lumMod val="50000"/>
+                    </a:schemeClr>
+                  </a:solidFill>
+                </a:rPr>
+                <a:t>0</a:t>
+              </a:r>
+            </a:p>
+            <a:p>
+              <a:pPr algn="ctr"/>
+              <a:r>
+                <a:rPr lang="en-US" sz="900" b="1" u="sng" dirty="0">
+                  <a:solidFill>
+                    <a:schemeClr val="accent2">
+                      <a:lumMod val="50000"/>
+                    </a:schemeClr>
+                  </a:solidFill>
+                  <a:effectLst/>
+                </a:rPr>
+                <a:t>prevTxHash</a:t>
+              </a:r>
+              <a:r>
+                <a:rPr lang="en-US" sz="900" dirty="0">
+                  <a:solidFill>
+                    <a:schemeClr val="accent2">
+                      <a:lumMod val="50000"/>
+                    </a:schemeClr>
+                  </a:solidFill>
+                  <a:effectLst/>
+                </a:rPr>
+                <a:t>=hash_1</a:t>
+              </a:r>
+            </a:p>
+            <a:p>
+              <a:pPr algn="ctr"/>
+              <a:r>
+                <a:rPr lang="en-US" sz="900" b="1" u="sng" dirty="0">
+                  <a:solidFill>
+                    <a:schemeClr val="accent2">
+                      <a:lumMod val="50000"/>
+                    </a:schemeClr>
+                  </a:solidFill>
+                  <a:effectLst/>
+                </a:rPr>
+                <a:t>outputIndex</a:t>
+              </a:r>
+              <a:r>
+                <a:rPr lang="en-US" sz="900" dirty="0">
+                  <a:solidFill>
+                    <a:schemeClr val="accent2">
+                      <a:lumMod val="50000"/>
+                    </a:schemeClr>
+                  </a:solidFill>
+                </a:rPr>
+                <a:t>=0</a:t>
+              </a:r>
+            </a:p>
+            <a:p>
+              <a:pPr algn="ctr"/>
+              <a:r>
+                <a:rPr lang="en-US" sz="900" b="1" u="sng" dirty="0">
+                  <a:solidFill>
+                    <a:srgbClr val="FF0000"/>
+                  </a:solidFill>
+                </a:rPr>
+                <a:t>s</a:t>
+              </a:r>
+              <a:r>
+                <a:rPr lang="en-US" sz="900" b="1" u="sng" dirty="0">
+                  <a:solidFill>
+                    <a:srgbClr val="FF0000"/>
+                  </a:solidFill>
+                  <a:effectLst/>
+                </a:rPr>
+                <a:t>ignature</a:t>
+              </a:r>
+              <a:r>
+                <a:rPr lang="en-US" sz="900" dirty="0">
+                  <a:solidFill>
+                    <a:srgbClr val="FF0000"/>
+                  </a:solidFill>
+                </a:rPr>
+                <a:t>=sig(</a:t>
+              </a:r>
+              <a:r>
+                <a:rPr lang="en-US" sz="900" dirty="0" err="1">
+                  <a:solidFill>
+                    <a:srgbClr val="FF0000"/>
+                  </a:solidFill>
+                  <a:effectLst/>
+                </a:rPr>
+                <a:t>kScrooge_sk</a:t>
+              </a:r>
+              <a:r>
+                <a:rPr lang="en-US" sz="900" dirty="0">
+                  <a:solidFill>
+                    <a:srgbClr val="FF0000"/>
+                  </a:solidFill>
+                  <a:effectLst/>
+                </a:rPr>
+                <a:t>, 0</a:t>
+              </a:r>
+              <a:r>
+                <a:rPr lang="en-US" sz="900" dirty="0">
+                  <a:solidFill>
+                    <a:srgbClr val="FF0000"/>
+                  </a:solidFill>
+                </a:rPr>
+                <a:t>)</a:t>
+              </a:r>
+              <a:endParaRPr lang="en-US" sz="900" dirty="0">
+                <a:solidFill>
+                  <a:srgbClr val="FF0000"/>
+                </a:solidFill>
+                <a:effectLst/>
+              </a:endParaRPr>
+            </a:p>
+          </p:txBody>
+        </p:sp>
+      </p:grpSp>
+      <p:sp>
+        <p:nvSpPr>
+          <p:cNvPr id="151" name="Rectangle 150">
+            <a:extLst>
+              <a:ext uri="{FF2B5EF4-FFF2-40B4-BE49-F238E27FC236}">
+                <a16:creationId xmlns:a16="http://schemas.microsoft.com/office/drawing/2014/main" id="{37E68D14-E25A-0445-93CF-A8EAF2B25364}"/>
+              </a:ext>
+            </a:extLst>
+          </p:cNvPr>
+          <p:cNvSpPr/>
+          <p:nvPr/>
+        </p:nvSpPr>
+        <p:spPr>
+          <a:xfrm>
+            <a:off x="419204" y="4825727"/>
+            <a:ext cx="1930361" cy="1404183"/>
+          </a:xfrm>
+          <a:prstGeom prst="rect">
+            <a:avLst/>
+          </a:prstGeom>
+          <a:noFill/>
+          <a:ln w="19050">
+            <a:solidFill>
+              <a:schemeClr val="accent1"/>
+            </a:solidFill>
+          </a:ln>
+        </p:spPr>
+        <p:style>
+          <a:lnRef idx="2">
+            <a:schemeClr val="accent1">
+              <a:shade val="50000"/>
+            </a:schemeClr>
+          </a:lnRef>
+          <a:fillRef idx="1">
+            <a:schemeClr val="accent1"/>
+          </a:fillRef>
+          <a:effectRef idx="0">
+            <a:schemeClr val="accent1"/>
+          </a:effectRef>
+          <a:fontRef idx="minor">
+            <a:schemeClr val="lt1"/>
+          </a:fontRef>
+        </p:style>
+        <p:txBody>
+          <a:bodyPr rtlCol="0" anchor="ctr"/>
+          <a:lstStyle/>
+          <a:p>
+            <a:pPr algn="ctr"/>
+            <a:endParaRPr lang="en-CN"/>
+          </a:p>
+        </p:txBody>
+      </p:sp>
+      <p:sp>
+        <p:nvSpPr>
+          <p:cNvPr id="152" name="Rectangle 151">
+            <a:extLst>
+              <a:ext uri="{FF2B5EF4-FFF2-40B4-BE49-F238E27FC236}">
+                <a16:creationId xmlns:a16="http://schemas.microsoft.com/office/drawing/2014/main" id="{99A552F5-64FC-AB44-9A3F-2ED2D883AD4A}"/>
+              </a:ext>
+            </a:extLst>
+          </p:cNvPr>
+          <p:cNvSpPr/>
+          <p:nvPr/>
+        </p:nvSpPr>
+        <p:spPr>
+          <a:xfrm>
+            <a:off x="519309" y="4924007"/>
+            <a:ext cx="1718108" cy="576129"/>
+          </a:xfrm>
+          <a:prstGeom prst="rect">
+            <a:avLst/>
+          </a:prstGeom>
+          <a:noFill/>
+          <a:ln w="19050">
+            <a:solidFill>
+              <a:schemeClr val="accent1"/>
+            </a:solidFill>
+          </a:ln>
+        </p:spPr>
+        <p:style>
+          <a:lnRef idx="2">
+            <a:schemeClr val="accent1">
+              <a:shade val="50000"/>
+            </a:schemeClr>
+          </a:lnRef>
+          <a:fillRef idx="1">
+            <a:schemeClr val="accent1"/>
+          </a:fillRef>
+          <a:effectRef idx="0">
+            <a:schemeClr val="accent1"/>
+          </a:effectRef>
+          <a:fontRef idx="minor">
+            <a:schemeClr val="lt1"/>
+          </a:fontRef>
+        </p:style>
+        <p:txBody>
+          <a:bodyPr rtlCol="0" anchor="ctr"/>
+          <a:lstStyle/>
+          <a:p>
+            <a:pPr algn="ctr"/>
+            <a:r>
+              <a:rPr lang="en-CN" sz="1200" dirty="0">
+                <a:solidFill>
+                  <a:schemeClr val="accent1">
+                    <a:lumMod val="50000"/>
+                  </a:schemeClr>
+                </a:solidFill>
+              </a:rPr>
+              <a:t>output_</a:t>
+            </a:r>
+            <a:r>
+              <a:rPr lang="en-US" sz="1200" dirty="0">
+                <a:solidFill>
+                  <a:schemeClr val="accent1">
+                    <a:lumMod val="50000"/>
+                  </a:schemeClr>
+                </a:solidFill>
+              </a:rPr>
+              <a:t>0</a:t>
+            </a:r>
+          </a:p>
+          <a:p>
+            <a:pPr algn="ctr"/>
+            <a:r>
+              <a:rPr lang="en-US" sz="900" b="1" u="sng" dirty="0">
+                <a:solidFill>
+                  <a:schemeClr val="accent1">
+                    <a:lumMod val="50000"/>
+                  </a:schemeClr>
+                </a:solidFill>
+                <a:effectLst/>
+              </a:rPr>
+              <a:t>value</a:t>
+            </a:r>
+            <a:r>
+              <a:rPr lang="en-US" altLang="zh-CN" sz="900" dirty="0">
+                <a:solidFill>
+                  <a:schemeClr val="accent1">
+                    <a:lumMod val="50000"/>
+                  </a:schemeClr>
+                </a:solidFill>
+                <a:effectLst/>
+              </a:rPr>
+              <a:t>=3</a:t>
+            </a:r>
+            <a:endParaRPr lang="en-US" sz="900" dirty="0">
+              <a:solidFill>
+                <a:schemeClr val="accent1">
+                  <a:lumMod val="50000"/>
+                </a:schemeClr>
+              </a:solidFill>
+              <a:effectLst/>
+            </a:endParaRPr>
+          </a:p>
+          <a:p>
+            <a:pPr algn="ctr"/>
+            <a:r>
+              <a:rPr lang="en-US" sz="900" b="1" u="sng" dirty="0">
+                <a:solidFill>
+                  <a:schemeClr val="accent1">
+                    <a:lumMod val="50000"/>
+                  </a:schemeClr>
+                </a:solidFill>
+                <a:effectLst/>
+              </a:rPr>
+              <a:t>address</a:t>
+            </a:r>
+            <a:r>
+              <a:rPr lang="en-US" altLang="zh-CN" sz="900" dirty="0">
+                <a:solidFill>
+                  <a:schemeClr val="accent1">
+                    <a:lumMod val="50000"/>
+                  </a:schemeClr>
+                </a:solidFill>
+                <a:effectLst/>
+              </a:rPr>
+              <a:t>=</a:t>
+            </a:r>
+            <a:r>
+              <a:rPr lang="en-US" sz="900" dirty="0">
+                <a:solidFill>
+                  <a:schemeClr val="accent1">
+                    <a:lumMod val="50000"/>
+                  </a:schemeClr>
+                </a:solidFill>
+                <a:effectLst/>
+              </a:rPr>
+              <a:t> </a:t>
+            </a:r>
+            <a:r>
+              <a:rPr lang="en-US" sz="900" dirty="0" err="1">
+                <a:solidFill>
+                  <a:schemeClr val="accent1">
+                    <a:lumMod val="50000"/>
+                  </a:schemeClr>
+                </a:solidFill>
+                <a:effectLst/>
+              </a:rPr>
+              <a:t>kBob</a:t>
+            </a:r>
+            <a:r>
+              <a:rPr lang="en-CN" sz="900" dirty="0">
+                <a:solidFill>
+                  <a:schemeClr val="accent1">
+                    <a:lumMod val="50000"/>
+                  </a:schemeClr>
+                </a:solidFill>
+              </a:rPr>
+              <a:t>_pk</a:t>
+            </a:r>
+          </a:p>
+        </p:txBody>
+      </p:sp>
+      <p:sp>
+        <p:nvSpPr>
+          <p:cNvPr id="153" name="Rounded Rectangle 152">
+            <a:extLst>
+              <a:ext uri="{FF2B5EF4-FFF2-40B4-BE49-F238E27FC236}">
+                <a16:creationId xmlns:a16="http://schemas.microsoft.com/office/drawing/2014/main" id="{CC5B2A76-8AE0-6B4D-92ED-1D8D116F2E46}"/>
+              </a:ext>
+            </a:extLst>
+          </p:cNvPr>
+          <p:cNvSpPr/>
+          <p:nvPr/>
+        </p:nvSpPr>
+        <p:spPr>
+          <a:xfrm>
+            <a:off x="283757" y="3374310"/>
+            <a:ext cx="2201259" cy="3000782"/>
+          </a:xfrm>
+          <a:prstGeom prst="roundRect">
+            <a:avLst>
+              <a:gd name="adj" fmla="val 3417"/>
+            </a:avLst>
+          </a:prstGeom>
+          <a:noFill/>
+          <a:ln w="19050">
+            <a:solidFill>
+              <a:schemeClr val="tx1"/>
+            </a:solidFill>
+          </a:ln>
+        </p:spPr>
+        <p:style>
+          <a:lnRef idx="2">
+            <a:schemeClr val="accent1">
+              <a:shade val="50000"/>
+            </a:schemeClr>
+          </a:lnRef>
+          <a:fillRef idx="1">
+            <a:schemeClr val="accent1"/>
+          </a:fillRef>
+          <a:effectRef idx="0">
+            <a:schemeClr val="accent1"/>
+          </a:effectRef>
+          <a:fontRef idx="minor">
+            <a:schemeClr val="lt1"/>
+          </a:fontRef>
+        </p:style>
+        <p:txBody>
+          <a:bodyPr rtlCol="0" anchor="ctr"/>
+          <a:lstStyle/>
+          <a:p>
+            <a:pPr algn="ctr"/>
+            <a:endParaRPr lang="en-CN">
+              <a:latin typeface="Times New Roman" panose="02020603050405020304" pitchFamily="18" charset="0"/>
+              <a:cs typeface="Times New Roman" panose="02020603050405020304" pitchFamily="18" charset="0"/>
+            </a:endParaRPr>
+          </a:p>
+        </p:txBody>
+      </p:sp>
+      <p:sp>
+        <p:nvSpPr>
+          <p:cNvPr id="154" name="TextBox 153">
+            <a:extLst>
+              <a:ext uri="{FF2B5EF4-FFF2-40B4-BE49-F238E27FC236}">
+                <a16:creationId xmlns:a16="http://schemas.microsoft.com/office/drawing/2014/main" id="{20F4EB79-DFEC-C74D-8F33-D62C240CC4C7}"/>
+              </a:ext>
+            </a:extLst>
+          </p:cNvPr>
+          <p:cNvSpPr txBox="1"/>
+          <p:nvPr/>
+        </p:nvSpPr>
+        <p:spPr>
+          <a:xfrm>
+            <a:off x="283757" y="3380516"/>
+            <a:ext cx="2201259" cy="323165"/>
+          </a:xfrm>
+          <a:prstGeom prst="rect">
+            <a:avLst/>
+          </a:prstGeom>
+          <a:noFill/>
+        </p:spPr>
+        <p:txBody>
+          <a:bodyPr wrap="square" rtlCol="0">
+            <a:spAutoFit/>
+          </a:bodyPr>
+          <a:lstStyle/>
+          <a:p>
+            <a:pPr algn="ctr"/>
+            <a:r>
+              <a:rPr lang="en-US" sz="1500" dirty="0"/>
+              <a:t>h</a:t>
+            </a:r>
+            <a:r>
+              <a:rPr lang="en-US" sz="1500" dirty="0">
+                <a:effectLst/>
+              </a:rPr>
+              <a:t>ash_2</a:t>
+            </a:r>
+          </a:p>
+        </p:txBody>
+      </p:sp>
+      <p:sp>
+        <p:nvSpPr>
+          <p:cNvPr id="155" name="Rectangle 154">
+            <a:extLst>
+              <a:ext uri="{FF2B5EF4-FFF2-40B4-BE49-F238E27FC236}">
+                <a16:creationId xmlns:a16="http://schemas.microsoft.com/office/drawing/2014/main" id="{D7E612D1-DD74-6E4E-9DC2-774B43B7EBAA}"/>
+              </a:ext>
+            </a:extLst>
+          </p:cNvPr>
+          <p:cNvSpPr/>
+          <p:nvPr/>
+        </p:nvSpPr>
+        <p:spPr>
+          <a:xfrm>
+            <a:off x="519309" y="5552113"/>
+            <a:ext cx="1718108" cy="576129"/>
+          </a:xfrm>
+          <a:prstGeom prst="rect">
+            <a:avLst/>
+          </a:prstGeom>
+          <a:noFill/>
+          <a:ln w="19050">
+            <a:solidFill>
+              <a:schemeClr val="accent1"/>
+            </a:solidFill>
+          </a:ln>
+        </p:spPr>
+        <p:style>
+          <a:lnRef idx="2">
+            <a:schemeClr val="accent1">
+              <a:shade val="50000"/>
+            </a:schemeClr>
+          </a:lnRef>
+          <a:fillRef idx="1">
+            <a:schemeClr val="accent1"/>
+          </a:fillRef>
+          <a:effectRef idx="0">
+            <a:schemeClr val="accent1"/>
+          </a:effectRef>
+          <a:fontRef idx="minor">
+            <a:schemeClr val="lt1"/>
+          </a:fontRef>
+        </p:style>
+        <p:txBody>
+          <a:bodyPr rtlCol="0" anchor="ctr"/>
+          <a:lstStyle/>
+          <a:p>
+            <a:pPr algn="ctr"/>
+            <a:r>
+              <a:rPr lang="en-CN" sz="1200" dirty="0">
+                <a:solidFill>
+                  <a:schemeClr val="accent1">
+                    <a:lumMod val="50000"/>
+                  </a:schemeClr>
+                </a:solidFill>
+              </a:rPr>
+              <a:t>output_</a:t>
+            </a:r>
+            <a:r>
+              <a:rPr lang="en-US" sz="1200" dirty="0">
+                <a:solidFill>
+                  <a:schemeClr val="accent1">
+                    <a:lumMod val="50000"/>
+                  </a:schemeClr>
+                </a:solidFill>
+              </a:rPr>
+              <a:t>1</a:t>
+            </a:r>
+          </a:p>
+          <a:p>
+            <a:pPr algn="ctr"/>
+            <a:r>
+              <a:rPr lang="en-US" sz="900" b="1" u="sng" dirty="0">
+                <a:solidFill>
+                  <a:schemeClr val="accent1">
+                    <a:lumMod val="50000"/>
+                  </a:schemeClr>
+                </a:solidFill>
+                <a:effectLst/>
+              </a:rPr>
+              <a:t>value</a:t>
+            </a:r>
+            <a:r>
+              <a:rPr lang="en-US" altLang="zh-CN" sz="900" dirty="0">
+                <a:solidFill>
+                  <a:schemeClr val="accent1">
+                    <a:lumMod val="50000"/>
+                  </a:schemeClr>
+                </a:solidFill>
+                <a:effectLst/>
+              </a:rPr>
+              <a:t>=6</a:t>
+            </a:r>
+            <a:endParaRPr lang="en-US" sz="900" dirty="0">
+              <a:solidFill>
+                <a:schemeClr val="accent1">
+                  <a:lumMod val="50000"/>
+                </a:schemeClr>
+              </a:solidFill>
+              <a:effectLst/>
+            </a:endParaRPr>
+          </a:p>
+          <a:p>
+            <a:pPr algn="ctr"/>
+            <a:r>
+              <a:rPr lang="en-US" sz="900" b="1" u="sng" dirty="0">
+                <a:solidFill>
+                  <a:schemeClr val="accent1">
+                    <a:lumMod val="50000"/>
+                  </a:schemeClr>
+                </a:solidFill>
+                <a:effectLst/>
+              </a:rPr>
+              <a:t>address</a:t>
+            </a:r>
+            <a:r>
+              <a:rPr lang="en-US" altLang="zh-CN" sz="900" dirty="0">
+                <a:solidFill>
+                  <a:schemeClr val="accent1">
+                    <a:lumMod val="50000"/>
+                  </a:schemeClr>
+                </a:solidFill>
+                <a:effectLst/>
+              </a:rPr>
+              <a:t>=</a:t>
+            </a:r>
+            <a:r>
+              <a:rPr lang="en-US" sz="900" dirty="0">
+                <a:solidFill>
+                  <a:schemeClr val="accent1">
+                    <a:lumMod val="50000"/>
+                  </a:schemeClr>
+                </a:solidFill>
+                <a:effectLst/>
+              </a:rPr>
+              <a:t> </a:t>
+            </a:r>
+            <a:r>
+              <a:rPr lang="en-US" sz="900" dirty="0" err="1">
+                <a:solidFill>
+                  <a:schemeClr val="accent1">
+                    <a:lumMod val="50000"/>
+                  </a:schemeClr>
+                </a:solidFill>
+                <a:effectLst/>
+              </a:rPr>
+              <a:t>kAlice</a:t>
+            </a:r>
+            <a:r>
+              <a:rPr lang="en-CN" sz="900" dirty="0">
+                <a:solidFill>
+                  <a:schemeClr val="accent1">
+                    <a:lumMod val="50000"/>
+                  </a:schemeClr>
+                </a:solidFill>
+              </a:rPr>
+              <a:t>_pk</a:t>
+            </a:r>
+          </a:p>
+        </p:txBody>
+      </p:sp>
+      <p:cxnSp>
+        <p:nvCxnSpPr>
+          <p:cNvPr id="156" name="Elbow Connector 155">
+            <a:extLst>
+              <a:ext uri="{FF2B5EF4-FFF2-40B4-BE49-F238E27FC236}">
+                <a16:creationId xmlns:a16="http://schemas.microsoft.com/office/drawing/2014/main" id="{B450EA99-EA9C-224E-BB1E-D8CA7EE4A0CE}"/>
+              </a:ext>
+            </a:extLst>
+          </p:cNvPr>
+          <p:cNvCxnSpPr>
+            <a:cxnSpLocks/>
+            <a:stCxn id="88" idx="1"/>
+            <a:endCxn id="150" idx="3"/>
+          </p:cNvCxnSpPr>
+          <p:nvPr/>
+        </p:nvCxnSpPr>
+        <p:spPr>
+          <a:xfrm rot="10800000" flipV="1">
+            <a:off x="2243440" y="2129120"/>
+            <a:ext cx="940823" cy="2138984"/>
+          </a:xfrm>
+          <a:prstGeom prst="bentConnector3">
+            <a:avLst>
+              <a:gd name="adj1" fmla="val 38893"/>
+            </a:avLst>
+          </a:prstGeom>
+          <a:ln w="12700">
+            <a:solidFill>
+              <a:srgbClr val="FF0000"/>
+            </a:solidFill>
+            <a:tailEnd type="stealth" w="lg" len="lg"/>
+          </a:ln>
+        </p:spPr>
+        <p:style>
+          <a:lnRef idx="1">
+            <a:schemeClr val="accent1"/>
+          </a:lnRef>
+          <a:fillRef idx="0">
+            <a:schemeClr val="accent1"/>
+          </a:fillRef>
+          <a:effectRef idx="0">
+            <a:schemeClr val="accent1"/>
+          </a:effectRef>
+          <a:fontRef idx="minor">
+            <a:schemeClr val="tx1"/>
+          </a:fontRef>
+        </p:style>
+      </p:cxnSp>
+    </p:spTree>
+    <p:extLst>
+      <p:ext uri="{BB962C8B-B14F-4D97-AF65-F5344CB8AC3E}">
+        <p14:creationId xmlns:p14="http://schemas.microsoft.com/office/powerpoint/2010/main" val="173910263"/>
       </p:ext>
     </p:extLst>
   </p:cSld>

</xml_diff>